<commit_message>
Update Images and formula
</commit_message>
<xml_diff>
--- a/project presentation/images.pptx
+++ b/project presentation/images.pptx
@@ -6,6 +6,11 @@
   </p:sldMasterIdLst>
   <p:sldIdLst>
     <p:sldId id="256" r:id="rId2"/>
+    <p:sldId id="260" r:id="rId3"/>
+    <p:sldId id="261" r:id="rId4"/>
+    <p:sldId id="257" r:id="rId5"/>
+    <p:sldId id="258" r:id="rId6"/>
+    <p:sldId id="259" r:id="rId7"/>
   </p:sldIdLst>
   <p:sldSz cx="12192000" cy="6858000"/>
   <p:notesSz cx="6858000" cy="9144000"/>
@@ -104,6 +109,11 @@
       </a:defRPr>
     </a:lvl9pPr>
   </p:defaultTextStyle>
+  <p:extLst>
+    <p:ext uri="{EFAFB233-063F-42B5-8137-9DF3F51BA10A}">
+      <p15:sldGuideLst xmlns:p15="http://schemas.microsoft.com/office/powerpoint/2012/main"/>
+    </p:ext>
+  </p:extLst>
 </p:presentation>
 </file>
 
@@ -256,7 +266,7 @@
           <a:p>
             <a:fld id="{F4A99819-B51D-48D4-ACF4-CC86626F7F11}" type="datetimeFigureOut">
               <a:rPr lang="en-CA" smtClean="0"/>
-              <a:t>2022-03-16</a:t>
+              <a:t>22/03/2022</a:t>
             </a:fld>
             <a:endParaRPr lang="en-CA"/>
           </a:p>
@@ -456,7 +466,7 @@
           <a:p>
             <a:fld id="{F4A99819-B51D-48D4-ACF4-CC86626F7F11}" type="datetimeFigureOut">
               <a:rPr lang="en-CA" smtClean="0"/>
-              <a:t>2022-03-16</a:t>
+              <a:t>22/03/2022</a:t>
             </a:fld>
             <a:endParaRPr lang="en-CA"/>
           </a:p>
@@ -666,7 +676,7 @@
           <a:p>
             <a:fld id="{F4A99819-B51D-48D4-ACF4-CC86626F7F11}" type="datetimeFigureOut">
               <a:rPr lang="en-CA" smtClean="0"/>
-              <a:t>2022-03-16</a:t>
+              <a:t>22/03/2022</a:t>
             </a:fld>
             <a:endParaRPr lang="en-CA"/>
           </a:p>
@@ -866,7 +876,7 @@
           <a:p>
             <a:fld id="{F4A99819-B51D-48D4-ACF4-CC86626F7F11}" type="datetimeFigureOut">
               <a:rPr lang="en-CA" smtClean="0"/>
-              <a:t>2022-03-16</a:t>
+              <a:t>22/03/2022</a:t>
             </a:fld>
             <a:endParaRPr lang="en-CA"/>
           </a:p>
@@ -1142,7 +1152,7 @@
           <a:p>
             <a:fld id="{F4A99819-B51D-48D4-ACF4-CC86626F7F11}" type="datetimeFigureOut">
               <a:rPr lang="en-CA" smtClean="0"/>
-              <a:t>2022-03-16</a:t>
+              <a:t>22/03/2022</a:t>
             </a:fld>
             <a:endParaRPr lang="en-CA"/>
           </a:p>
@@ -1410,7 +1420,7 @@
           <a:p>
             <a:fld id="{F4A99819-B51D-48D4-ACF4-CC86626F7F11}" type="datetimeFigureOut">
               <a:rPr lang="en-CA" smtClean="0"/>
-              <a:t>2022-03-16</a:t>
+              <a:t>22/03/2022</a:t>
             </a:fld>
             <a:endParaRPr lang="en-CA"/>
           </a:p>
@@ -1825,7 +1835,7 @@
           <a:p>
             <a:fld id="{F4A99819-B51D-48D4-ACF4-CC86626F7F11}" type="datetimeFigureOut">
               <a:rPr lang="en-CA" smtClean="0"/>
-              <a:t>2022-03-16</a:t>
+              <a:t>22/03/2022</a:t>
             </a:fld>
             <a:endParaRPr lang="en-CA"/>
           </a:p>
@@ -1967,7 +1977,7 @@
           <a:p>
             <a:fld id="{F4A99819-B51D-48D4-ACF4-CC86626F7F11}" type="datetimeFigureOut">
               <a:rPr lang="en-CA" smtClean="0"/>
-              <a:t>2022-03-16</a:t>
+              <a:t>22/03/2022</a:t>
             </a:fld>
             <a:endParaRPr lang="en-CA"/>
           </a:p>
@@ -2080,7 +2090,7 @@
           <a:p>
             <a:fld id="{F4A99819-B51D-48D4-ACF4-CC86626F7F11}" type="datetimeFigureOut">
               <a:rPr lang="en-CA" smtClean="0"/>
-              <a:t>2022-03-16</a:t>
+              <a:t>22/03/2022</a:t>
             </a:fld>
             <a:endParaRPr lang="en-CA"/>
           </a:p>
@@ -2393,7 +2403,7 @@
           <a:p>
             <a:fld id="{F4A99819-B51D-48D4-ACF4-CC86626F7F11}" type="datetimeFigureOut">
               <a:rPr lang="en-CA" smtClean="0"/>
-              <a:t>2022-03-16</a:t>
+              <a:t>22/03/2022</a:t>
             </a:fld>
             <a:endParaRPr lang="en-CA"/>
           </a:p>
@@ -2682,7 +2692,7 @@
           <a:p>
             <a:fld id="{F4A99819-B51D-48D4-ACF4-CC86626F7F11}" type="datetimeFigureOut">
               <a:rPr lang="en-CA" smtClean="0"/>
-              <a:t>2022-03-16</a:t>
+              <a:t>22/03/2022</a:t>
             </a:fld>
             <a:endParaRPr lang="en-CA"/>
           </a:p>
@@ -2925,7 +2935,7 @@
           <a:p>
             <a:fld id="{F4A99819-B51D-48D4-ACF4-CC86626F7F11}" type="datetimeFigureOut">
               <a:rPr lang="en-CA" smtClean="0"/>
-              <a:t>2022-03-16</a:t>
+              <a:t>22/03/2022</a:t>
             </a:fld>
             <a:endParaRPr lang="en-CA"/>
           </a:p>
@@ -3385,6 +3395,3496 @@
 </p:sld>
 </file>
 
+<file path=ppt/slides/slide2.xml><?xml version="1.0" encoding="utf-8"?>
+<p:sld xmlns:a="http://schemas.openxmlformats.org/drawingml/2006/main" xmlns:r="http://schemas.openxmlformats.org/officeDocument/2006/relationships" xmlns:p="http://schemas.openxmlformats.org/presentationml/2006/main">
+  <p:cSld>
+    <p:spTree>
+      <p:nvGrpSpPr>
+        <p:cNvPr id="1" name=""/>
+        <p:cNvGrpSpPr/>
+        <p:nvPr/>
+      </p:nvGrpSpPr>
+      <p:grpSpPr>
+        <a:xfrm>
+          <a:off x="0" y="0"/>
+          <a:ext cx="0" cy="0"/>
+          <a:chOff x="0" y="0"/>
+          <a:chExt cx="0" cy="0"/>
+        </a:xfrm>
+      </p:grpSpPr>
+      <p:grpSp>
+        <p:nvGrpSpPr>
+          <p:cNvPr id="14" name="Group 13">
+            <a:extLst>
+              <a:ext uri="{FF2B5EF4-FFF2-40B4-BE49-F238E27FC236}">
+                <a16:creationId xmlns:a16="http://schemas.microsoft.com/office/drawing/2014/main" id="{747904AA-1CF3-4C54-A989-826EBA344349}"/>
+              </a:ext>
+            </a:extLst>
+          </p:cNvPr>
+          <p:cNvGrpSpPr/>
+          <p:nvPr/>
+        </p:nvGrpSpPr>
+        <p:grpSpPr>
+          <a:xfrm>
+            <a:off x="3962400" y="280987"/>
+            <a:ext cx="2659380" cy="4260533"/>
+            <a:chOff x="3962400" y="280987"/>
+            <a:chExt cx="2659380" cy="4260533"/>
+          </a:xfrm>
+        </p:grpSpPr>
+        <p:pic>
+          <p:nvPicPr>
+            <p:cNvPr id="4" name="Picture 3">
+              <a:extLst>
+                <a:ext uri="{FF2B5EF4-FFF2-40B4-BE49-F238E27FC236}">
+                  <a16:creationId xmlns:a16="http://schemas.microsoft.com/office/drawing/2014/main" id="{D2D26DD7-604B-44C0-969D-5EA4A1FFB3C9}"/>
+                </a:ext>
+              </a:extLst>
+            </p:cNvPr>
+            <p:cNvPicPr>
+              <a:picLocks noChangeAspect="1"/>
+            </p:cNvPicPr>
+            <p:nvPr/>
+          </p:nvPicPr>
+          <p:blipFill rotWithShape="1">
+            <a:blip r:embed="rId2"/>
+            <a:srcRect l="20370" r="42699" b="32330"/>
+            <a:stretch/>
+          </p:blipFill>
+          <p:spPr>
+            <a:xfrm>
+              <a:off x="3962400" y="280987"/>
+              <a:ext cx="2659380" cy="4260533"/>
+            </a:xfrm>
+            <a:prstGeom prst="rect">
+              <a:avLst/>
+            </a:prstGeom>
+          </p:spPr>
+        </p:pic>
+        <p:pic>
+          <p:nvPicPr>
+            <p:cNvPr id="6" name="Picture 5">
+              <a:extLst>
+                <a:ext uri="{FF2B5EF4-FFF2-40B4-BE49-F238E27FC236}">
+                  <a16:creationId xmlns:a16="http://schemas.microsoft.com/office/drawing/2014/main" id="{CCA5A843-A9F7-4F28-9BB6-2A6342917C65}"/>
+                </a:ext>
+              </a:extLst>
+            </p:cNvPr>
+            <p:cNvPicPr>
+              <a:picLocks noChangeAspect="1"/>
+            </p:cNvPicPr>
+            <p:nvPr/>
+          </p:nvPicPr>
+          <p:blipFill>
+            <a:blip r:embed="rId3">
+              <a:extLst>
+                <a:ext uri="{BEBA8EAE-BF5A-486C-A8C5-ECC9F3942E4B}">
+                  <a14:imgProps xmlns:a14="http://schemas.microsoft.com/office/drawing/2010/main">
+                    <a14:imgLayer r:embed="rId4">
+                      <a14:imgEffect>
+                        <a14:backgroundRemoval t="9375" b="89286" l="4889" r="95556"/>
+                      </a14:imgEffect>
+                    </a14:imgLayer>
+                  </a14:imgProps>
+                </a:ext>
+                <a:ext uri="{28A0092B-C50C-407E-A947-70E740481C1C}">
+                  <a14:useLocalDpi xmlns:a14="http://schemas.microsoft.com/office/drawing/2010/main" val="0"/>
+                </a:ext>
+              </a:extLst>
+            </a:blip>
+            <a:stretch>
+              <a:fillRect/>
+            </a:stretch>
+          </p:blipFill>
+          <p:spPr>
+            <a:xfrm rot="16200000">
+              <a:off x="4848770" y="1013460"/>
+              <a:ext cx="520473" cy="518160"/>
+            </a:xfrm>
+            <a:prstGeom prst="rect">
+              <a:avLst/>
+            </a:prstGeom>
+          </p:spPr>
+        </p:pic>
+        <p:pic>
+          <p:nvPicPr>
+            <p:cNvPr id="7" name="Picture 6">
+              <a:extLst>
+                <a:ext uri="{FF2B5EF4-FFF2-40B4-BE49-F238E27FC236}">
+                  <a16:creationId xmlns:a16="http://schemas.microsoft.com/office/drawing/2014/main" id="{AC7927A3-5D39-40CE-9C53-8D6555AC4D26}"/>
+                </a:ext>
+              </a:extLst>
+            </p:cNvPr>
+            <p:cNvPicPr>
+              <a:picLocks noChangeAspect="1"/>
+            </p:cNvPicPr>
+            <p:nvPr/>
+          </p:nvPicPr>
+          <p:blipFill>
+            <a:blip r:embed="rId3">
+              <a:extLst>
+                <a:ext uri="{BEBA8EAE-BF5A-486C-A8C5-ECC9F3942E4B}">
+                  <a14:imgProps xmlns:a14="http://schemas.microsoft.com/office/drawing/2010/main">
+                    <a14:imgLayer r:embed="rId4">
+                      <a14:imgEffect>
+                        <a14:backgroundRemoval t="9375" b="89286" l="4889" r="95556"/>
+                      </a14:imgEffect>
+                    </a14:imgLayer>
+                  </a14:imgProps>
+                </a:ext>
+                <a:ext uri="{28A0092B-C50C-407E-A947-70E740481C1C}">
+                  <a14:useLocalDpi xmlns:a14="http://schemas.microsoft.com/office/drawing/2010/main" val="0"/>
+                </a:ext>
+              </a:extLst>
+            </a:blip>
+            <a:stretch>
+              <a:fillRect/>
+            </a:stretch>
+          </p:blipFill>
+          <p:spPr>
+            <a:xfrm rot="11570353" flipV="1">
+              <a:off x="5031853" y="3169919"/>
+              <a:ext cx="520473" cy="518160"/>
+            </a:xfrm>
+            <a:prstGeom prst="rect">
+              <a:avLst/>
+            </a:prstGeom>
+          </p:spPr>
+        </p:pic>
+        <p:sp>
+          <p:nvSpPr>
+            <p:cNvPr id="10" name="Isosceles Triangle 9">
+              <a:extLst>
+                <a:ext uri="{FF2B5EF4-FFF2-40B4-BE49-F238E27FC236}">
+                  <a16:creationId xmlns:a16="http://schemas.microsoft.com/office/drawing/2014/main" id="{5AE44CFE-EC37-4E10-ACBD-59A0E20766D7}"/>
+                </a:ext>
+              </a:extLst>
+            </p:cNvPr>
+            <p:cNvSpPr/>
+            <p:nvPr/>
+          </p:nvSpPr>
+          <p:spPr>
+            <a:xfrm rot="20307272">
+              <a:off x="4561228" y="1426043"/>
+              <a:ext cx="1829681" cy="1505353"/>
+            </a:xfrm>
+            <a:prstGeom prst="triangle">
+              <a:avLst/>
+            </a:prstGeom>
+            <a:solidFill>
+              <a:schemeClr val="accent1">
+                <a:alpha val="50000"/>
+              </a:schemeClr>
+            </a:solidFill>
+          </p:spPr>
+          <p:style>
+            <a:lnRef idx="2">
+              <a:schemeClr val="accent1">
+                <a:shade val="50000"/>
+              </a:schemeClr>
+            </a:lnRef>
+            <a:fillRef idx="1">
+              <a:schemeClr val="accent1"/>
+            </a:fillRef>
+            <a:effectRef idx="0">
+              <a:schemeClr val="accent1"/>
+            </a:effectRef>
+            <a:fontRef idx="minor">
+              <a:schemeClr val="lt1"/>
+            </a:fontRef>
+          </p:style>
+          <p:txBody>
+            <a:bodyPr rtlCol="0" anchor="ctr"/>
+            <a:lstStyle/>
+            <a:p>
+              <a:pPr algn="ctr"/>
+              <a:endParaRPr lang="fr-CA"/>
+            </a:p>
+          </p:txBody>
+        </p:sp>
+        <p:sp>
+          <p:nvSpPr>
+            <p:cNvPr id="11" name="Isosceles Triangle 10">
+              <a:extLst>
+                <a:ext uri="{FF2B5EF4-FFF2-40B4-BE49-F238E27FC236}">
+                  <a16:creationId xmlns:a16="http://schemas.microsoft.com/office/drawing/2014/main" id="{93D21A36-6377-4F7E-BB88-E8E28E4A20DC}"/>
+                </a:ext>
+              </a:extLst>
+            </p:cNvPr>
+            <p:cNvSpPr/>
+            <p:nvPr/>
+          </p:nvSpPr>
+          <p:spPr>
+            <a:xfrm rot="19545598">
+              <a:off x="5263643" y="3511223"/>
+              <a:ext cx="754693" cy="621937"/>
+            </a:xfrm>
+            <a:prstGeom prst="triangle">
+              <a:avLst/>
+            </a:prstGeom>
+            <a:solidFill>
+              <a:srgbClr val="FF0000">
+                <a:alpha val="50000"/>
+              </a:srgbClr>
+            </a:solidFill>
+            <a:ln>
+              <a:solidFill>
+                <a:srgbClr val="FF0000"/>
+              </a:solidFill>
+            </a:ln>
+          </p:spPr>
+          <p:style>
+            <a:lnRef idx="2">
+              <a:schemeClr val="accent1">
+                <a:shade val="50000"/>
+              </a:schemeClr>
+            </a:lnRef>
+            <a:fillRef idx="1">
+              <a:schemeClr val="accent1"/>
+            </a:fillRef>
+            <a:effectRef idx="0">
+              <a:schemeClr val="accent1"/>
+            </a:effectRef>
+            <a:fontRef idx="minor">
+              <a:schemeClr val="lt1"/>
+            </a:fontRef>
+          </p:style>
+          <p:txBody>
+            <a:bodyPr rtlCol="0" anchor="ctr"/>
+            <a:lstStyle/>
+            <a:p>
+              <a:pPr algn="ctr"/>
+              <a:endParaRPr lang="fr-CA"/>
+            </a:p>
+          </p:txBody>
+        </p:sp>
+      </p:grpSp>
+    </p:spTree>
+    <p:extLst>
+      <p:ext uri="{BB962C8B-B14F-4D97-AF65-F5344CB8AC3E}">
+        <p14:creationId xmlns:p14="http://schemas.microsoft.com/office/powerpoint/2010/main" val="3817213565"/>
+      </p:ext>
+    </p:extLst>
+  </p:cSld>
+  <p:clrMapOvr>
+    <a:masterClrMapping/>
+  </p:clrMapOvr>
+</p:sld>
+</file>
+
+<file path=ppt/slides/slide3.xml><?xml version="1.0" encoding="utf-8"?>
+<p:sld xmlns:a="http://schemas.openxmlformats.org/drawingml/2006/main" xmlns:r="http://schemas.openxmlformats.org/officeDocument/2006/relationships" xmlns:p="http://schemas.openxmlformats.org/presentationml/2006/main">
+  <p:cSld>
+    <p:spTree>
+      <p:nvGrpSpPr>
+        <p:cNvPr id="1" name=""/>
+        <p:cNvGrpSpPr/>
+        <p:nvPr/>
+      </p:nvGrpSpPr>
+      <p:grpSpPr>
+        <a:xfrm>
+          <a:off x="0" y="0"/>
+          <a:ext cx="0" cy="0"/>
+          <a:chOff x="0" y="0"/>
+          <a:chExt cx="0" cy="0"/>
+        </a:xfrm>
+      </p:grpSpPr>
+      <p:sp>
+        <p:nvSpPr>
+          <p:cNvPr id="2" name="Title 1">
+            <a:extLst>
+              <a:ext uri="{FF2B5EF4-FFF2-40B4-BE49-F238E27FC236}">
+                <a16:creationId xmlns:a16="http://schemas.microsoft.com/office/drawing/2014/main" id="{C2953FAA-9174-4269-9F80-28E7A23CB0EF}"/>
+              </a:ext>
+            </a:extLst>
+          </p:cNvPr>
+          <p:cNvSpPr>
+            <a:spLocks noGrp="1"/>
+          </p:cNvSpPr>
+          <p:nvPr>
+            <p:ph type="title"/>
+          </p:nvPr>
+        </p:nvSpPr>
+        <p:spPr/>
+        <p:txBody>
+          <a:bodyPr/>
+          <a:lstStyle/>
+          <a:p>
+            <a:endParaRPr lang="fr-CA"/>
+          </a:p>
+        </p:txBody>
+      </p:sp>
+      <p:pic>
+        <p:nvPicPr>
+          <p:cNvPr id="5" name="Picture 4">
+            <a:extLst>
+              <a:ext uri="{FF2B5EF4-FFF2-40B4-BE49-F238E27FC236}">
+                <a16:creationId xmlns:a16="http://schemas.microsoft.com/office/drawing/2014/main" id="{BC20EF2F-4D15-42CD-885A-7C3DDE615FE0}"/>
+              </a:ext>
+            </a:extLst>
+          </p:cNvPr>
+          <p:cNvPicPr>
+            <a:picLocks noChangeAspect="1"/>
+          </p:cNvPicPr>
+          <p:nvPr/>
+        </p:nvPicPr>
+        <p:blipFill rotWithShape="1">
+          <a:blip r:embed="rId2">
+            <a:extLst>
+              <a:ext uri="{BEBA8EAE-BF5A-486C-A8C5-ECC9F3942E4B}">
+                <a14:imgProps xmlns:a14="http://schemas.microsoft.com/office/drawing/2010/main">
+                  <a14:imgLayer r:embed="rId3">
+                    <a14:imgEffect>
+                      <a14:backgroundRemoval t="10000" b="90000" l="31071" r="69048">
+                        <a14:foregroundMark x1="34524" y1="70784" x2="34524" y2="81765"/>
+                        <a14:foregroundMark x1="40357" y1="70784" x2="40952" y2="77059"/>
+                        <a14:foregroundMark x1="42619" y1="82353" x2="44405" y2="81373"/>
+                        <a14:foregroundMark x1="47500" y1="66667" x2="47500" y2="77059"/>
+                        <a14:foregroundMark x1="50714" y1="63725" x2="50595" y2="77647"/>
+                        <a14:foregroundMark x1="48810" y1="68824" x2="46786" y2="69216"/>
+                        <a14:foregroundMark x1="57738" y1="69216" x2="59405" y2="68824"/>
+                        <a14:foregroundMark x1="62619" y1="70588" x2="62857" y2="77255"/>
+                      </a14:backgroundRemoval>
+                    </a14:imgEffect>
+                  </a14:imgLayer>
+                </a14:imgProps>
+              </a:ext>
+              <a:ext uri="{28A0092B-C50C-407E-A947-70E740481C1C}">
+                <a14:useLocalDpi xmlns:a14="http://schemas.microsoft.com/office/drawing/2010/main" val="0"/>
+              </a:ext>
+            </a:extLst>
+          </a:blip>
+          <a:srcRect l="29712" t="12348" r="29902" b="13446"/>
+          <a:stretch/>
+        </p:blipFill>
+        <p:spPr>
+          <a:xfrm>
+            <a:off x="2133600" y="2034541"/>
+            <a:ext cx="3230880" cy="3604260"/>
+          </a:xfrm>
+          <a:prstGeom prst="rect">
+            <a:avLst/>
+          </a:prstGeom>
+        </p:spPr>
+      </p:pic>
+      <p:pic>
+        <p:nvPicPr>
+          <p:cNvPr id="6" name="Picture 5">
+            <a:extLst>
+              <a:ext uri="{FF2B5EF4-FFF2-40B4-BE49-F238E27FC236}">
+                <a16:creationId xmlns:a16="http://schemas.microsoft.com/office/drawing/2014/main" id="{4371ECC0-4B5F-4902-9A74-4C4AD6EBB685}"/>
+              </a:ext>
+            </a:extLst>
+          </p:cNvPr>
+          <p:cNvPicPr>
+            <a:picLocks noChangeAspect="1"/>
+          </p:cNvPicPr>
+          <p:nvPr/>
+        </p:nvPicPr>
+        <p:blipFill>
+          <a:blip r:embed="rId4">
+            <a:extLst>
+              <a:ext uri="{BEBA8EAE-BF5A-486C-A8C5-ECC9F3942E4B}">
+                <a14:imgProps xmlns:a14="http://schemas.microsoft.com/office/drawing/2010/main">
+                  <a14:imgLayer r:embed="rId5">
+                    <a14:imgEffect>
+                      <a14:backgroundRemoval t="6094" b="93007" l="9890" r="89810">
+                        <a14:foregroundMark x1="36763" y1="18382" x2="36763" y2="18382"/>
+                        <a14:foregroundMark x1="50949" y1="11888" x2="50949" y2="11888"/>
+                        <a14:foregroundMark x1="64036" y1="21978" x2="64036" y2="21978"/>
+                        <a14:foregroundMark x1="53047" y1="26474" x2="53047" y2="26474"/>
+                        <a14:foregroundMark x1="71628" y1="30270" x2="71628" y2="30270"/>
+                        <a14:foregroundMark x1="72328" y1="49451" x2="72328" y2="49451"/>
+                        <a14:foregroundMark x1="57942" y1="55145" x2="57942" y2="55145"/>
+                        <a14:foregroundMark x1="56244" y1="41658" x2="56244" y2="41658"/>
+                        <a14:foregroundMark x1="21179" y1="81419" x2="21179" y2="81419"/>
+                        <a14:foregroundMark x1="37463" y1="79520" x2="37463" y2="79520"/>
+                        <a14:foregroundMark x1="45455" y1="79920" x2="45455" y2="79920"/>
+                        <a14:foregroundMark x1="65534" y1="74625" x2="65534" y2="74625"/>
+                        <a14:foregroundMark x1="85015" y1="79920" x2="85015" y2="79920"/>
+                      </a14:backgroundRemoval>
+                    </a14:imgEffect>
+                  </a14:imgLayer>
+                </a14:imgProps>
+              </a:ext>
+            </a:extLst>
+          </a:blip>
+          <a:stretch>
+            <a:fillRect/>
+          </a:stretch>
+        </p:blipFill>
+        <p:spPr>
+          <a:xfrm>
+            <a:off x="6217920" y="2133600"/>
+            <a:ext cx="3604260" cy="3604260"/>
+          </a:xfrm>
+          <a:prstGeom prst="rect">
+            <a:avLst/>
+          </a:prstGeom>
+        </p:spPr>
+      </p:pic>
+    </p:spTree>
+    <p:extLst>
+      <p:ext uri="{BB962C8B-B14F-4D97-AF65-F5344CB8AC3E}">
+        <p14:creationId xmlns:p14="http://schemas.microsoft.com/office/powerpoint/2010/main" val="1192702988"/>
+      </p:ext>
+    </p:extLst>
+  </p:cSld>
+  <p:clrMapOvr>
+    <a:masterClrMapping/>
+  </p:clrMapOvr>
+</p:sld>
+</file>
+
+<file path=ppt/slides/slide4.xml><?xml version="1.0" encoding="utf-8"?>
+<p:sld xmlns:a="http://schemas.openxmlformats.org/drawingml/2006/main" xmlns:r="http://schemas.openxmlformats.org/officeDocument/2006/relationships" xmlns:p="http://schemas.openxmlformats.org/presentationml/2006/main">
+  <p:cSld>
+    <p:spTree>
+      <p:nvGrpSpPr>
+        <p:cNvPr id="1" name=""/>
+        <p:cNvGrpSpPr/>
+        <p:nvPr/>
+      </p:nvGrpSpPr>
+      <p:grpSpPr>
+        <a:xfrm>
+          <a:off x="0" y="0"/>
+          <a:ext cx="0" cy="0"/>
+          <a:chOff x="0" y="0"/>
+          <a:chExt cx="0" cy="0"/>
+        </a:xfrm>
+      </p:grpSpPr>
+      <p:grpSp>
+        <p:nvGrpSpPr>
+          <p:cNvPr id="87" name="Group 86">
+            <a:extLst>
+              <a:ext uri="{FF2B5EF4-FFF2-40B4-BE49-F238E27FC236}">
+                <a16:creationId xmlns:a16="http://schemas.microsoft.com/office/drawing/2014/main" id="{47F2F8AB-248E-498A-A54A-76DDB9E0DACC}"/>
+              </a:ext>
+            </a:extLst>
+          </p:cNvPr>
+          <p:cNvGrpSpPr/>
+          <p:nvPr/>
+        </p:nvGrpSpPr>
+        <p:grpSpPr>
+          <a:xfrm>
+            <a:off x="3879163" y="1992900"/>
+            <a:ext cx="4739057" cy="3240000"/>
+            <a:chOff x="975943" y="1269000"/>
+            <a:chExt cx="4739057" cy="3240000"/>
+          </a:xfrm>
+        </p:grpSpPr>
+        <p:cxnSp>
+          <p:nvCxnSpPr>
+            <p:cNvPr id="7" name="Straight Arrow Connector 6">
+              <a:extLst>
+                <a:ext uri="{FF2B5EF4-FFF2-40B4-BE49-F238E27FC236}">
+                  <a16:creationId xmlns:a16="http://schemas.microsoft.com/office/drawing/2014/main" id="{F0B7CA84-93E7-42D9-AF2C-A5ABC2A52511}"/>
+                </a:ext>
+              </a:extLst>
+            </p:cNvPr>
+            <p:cNvCxnSpPr>
+              <a:cxnSpLocks/>
+            </p:cNvCxnSpPr>
+            <p:nvPr/>
+          </p:nvCxnSpPr>
+          <p:spPr>
+            <a:xfrm flipV="1">
+              <a:off x="3124200" y="3422073"/>
+              <a:ext cx="2590800" cy="0"/>
+            </a:xfrm>
+            <a:prstGeom prst="straightConnector1">
+              <a:avLst/>
+            </a:prstGeom>
+            <a:ln w="28575">
+              <a:solidFill>
+                <a:schemeClr val="tx1"/>
+              </a:solidFill>
+              <a:tailEnd type="triangle"/>
+            </a:ln>
+          </p:spPr>
+          <p:style>
+            <a:lnRef idx="1">
+              <a:schemeClr val="accent1"/>
+            </a:lnRef>
+            <a:fillRef idx="0">
+              <a:schemeClr val="accent1"/>
+            </a:fillRef>
+            <a:effectRef idx="0">
+              <a:schemeClr val="accent1"/>
+            </a:effectRef>
+            <a:fontRef idx="minor">
+              <a:schemeClr val="tx1"/>
+            </a:fontRef>
+          </p:style>
+        </p:cxnSp>
+        <p:cxnSp>
+          <p:nvCxnSpPr>
+            <p:cNvPr id="8" name="Straight Arrow Connector 7">
+              <a:extLst>
+                <a:ext uri="{FF2B5EF4-FFF2-40B4-BE49-F238E27FC236}">
+                  <a16:creationId xmlns:a16="http://schemas.microsoft.com/office/drawing/2014/main" id="{3BE02E49-DCD6-4D8A-8FE0-03993DECE906}"/>
+                </a:ext>
+              </a:extLst>
+            </p:cNvPr>
+            <p:cNvCxnSpPr>
+              <a:cxnSpLocks/>
+            </p:cNvCxnSpPr>
+            <p:nvPr/>
+          </p:nvCxnSpPr>
+          <p:spPr>
+            <a:xfrm flipV="1">
+              <a:off x="3124199" y="1269000"/>
+              <a:ext cx="0" cy="2160000"/>
+            </a:xfrm>
+            <a:prstGeom prst="straightConnector1">
+              <a:avLst/>
+            </a:prstGeom>
+            <a:ln w="28575">
+              <a:solidFill>
+                <a:schemeClr val="tx1"/>
+              </a:solidFill>
+              <a:tailEnd type="triangle"/>
+            </a:ln>
+          </p:spPr>
+          <p:style>
+            <a:lnRef idx="1">
+              <a:schemeClr val="accent1"/>
+            </a:lnRef>
+            <a:fillRef idx="0">
+              <a:schemeClr val="accent1"/>
+            </a:fillRef>
+            <a:effectRef idx="0">
+              <a:schemeClr val="accent1"/>
+            </a:effectRef>
+            <a:fontRef idx="minor">
+              <a:schemeClr val="tx1"/>
+            </a:fontRef>
+          </p:style>
+        </p:cxnSp>
+        <p:cxnSp>
+          <p:nvCxnSpPr>
+            <p:cNvPr id="9" name="Straight Arrow Connector 8">
+              <a:extLst>
+                <a:ext uri="{FF2B5EF4-FFF2-40B4-BE49-F238E27FC236}">
+                  <a16:creationId xmlns:a16="http://schemas.microsoft.com/office/drawing/2014/main" id="{890A2387-FB1F-45B8-8135-82A9DF0D3D0E}"/>
+                </a:ext>
+              </a:extLst>
+            </p:cNvPr>
+            <p:cNvCxnSpPr>
+              <a:cxnSpLocks/>
+            </p:cNvCxnSpPr>
+            <p:nvPr/>
+          </p:nvCxnSpPr>
+          <p:spPr>
+            <a:xfrm flipH="1">
+              <a:off x="2428875" y="3429000"/>
+              <a:ext cx="695324" cy="1080000"/>
+            </a:xfrm>
+            <a:prstGeom prst="straightConnector1">
+              <a:avLst/>
+            </a:prstGeom>
+            <a:ln w="28575">
+              <a:solidFill>
+                <a:schemeClr val="tx1"/>
+              </a:solidFill>
+              <a:tailEnd type="triangle"/>
+            </a:ln>
+          </p:spPr>
+          <p:style>
+            <a:lnRef idx="1">
+              <a:schemeClr val="accent1"/>
+            </a:lnRef>
+            <a:fillRef idx="0">
+              <a:schemeClr val="accent1"/>
+            </a:fillRef>
+            <a:effectRef idx="0">
+              <a:schemeClr val="accent1"/>
+            </a:effectRef>
+            <a:fontRef idx="minor">
+              <a:schemeClr val="tx1"/>
+            </a:fontRef>
+          </p:style>
+        </p:cxnSp>
+        <p:cxnSp>
+          <p:nvCxnSpPr>
+            <p:cNvPr id="14" name="Straight Connector 13">
+              <a:extLst>
+                <a:ext uri="{FF2B5EF4-FFF2-40B4-BE49-F238E27FC236}">
+                  <a16:creationId xmlns:a16="http://schemas.microsoft.com/office/drawing/2014/main" id="{CFB50A32-CB34-424C-9CC6-0154C8241F7F}"/>
+                </a:ext>
+              </a:extLst>
+            </p:cNvPr>
+            <p:cNvCxnSpPr>
+              <a:cxnSpLocks/>
+            </p:cNvCxnSpPr>
+            <p:nvPr/>
+          </p:nvCxnSpPr>
+          <p:spPr>
+            <a:xfrm>
+              <a:off x="2852737" y="1809750"/>
+              <a:ext cx="1157288" cy="1619250"/>
+            </a:xfrm>
+            <a:prstGeom prst="line">
+              <a:avLst/>
+            </a:prstGeom>
+            <a:ln w="19050"/>
+          </p:spPr>
+          <p:style>
+            <a:lnRef idx="1">
+              <a:schemeClr val="accent1"/>
+            </a:lnRef>
+            <a:fillRef idx="0">
+              <a:schemeClr val="accent1"/>
+            </a:fillRef>
+            <a:effectRef idx="0">
+              <a:schemeClr val="accent1"/>
+            </a:effectRef>
+            <a:fontRef idx="minor">
+              <a:schemeClr val="tx1"/>
+            </a:fontRef>
+          </p:style>
+        </p:cxnSp>
+        <p:cxnSp>
+          <p:nvCxnSpPr>
+            <p:cNvPr id="15" name="Straight Connector 14">
+              <a:extLst>
+                <a:ext uri="{FF2B5EF4-FFF2-40B4-BE49-F238E27FC236}">
+                  <a16:creationId xmlns:a16="http://schemas.microsoft.com/office/drawing/2014/main" id="{9FB57AF3-2343-4C93-AC03-9CC199237599}"/>
+                </a:ext>
+              </a:extLst>
+            </p:cNvPr>
+            <p:cNvCxnSpPr>
+              <a:cxnSpLocks/>
+            </p:cNvCxnSpPr>
+            <p:nvPr/>
+          </p:nvCxnSpPr>
+          <p:spPr>
+            <a:xfrm flipV="1">
+              <a:off x="2178400" y="1809750"/>
+              <a:ext cx="674337" cy="2236508"/>
+            </a:xfrm>
+            <a:prstGeom prst="line">
+              <a:avLst/>
+            </a:prstGeom>
+            <a:ln w="19050"/>
+          </p:spPr>
+          <p:style>
+            <a:lnRef idx="1">
+              <a:schemeClr val="accent1"/>
+            </a:lnRef>
+            <a:fillRef idx="0">
+              <a:schemeClr val="accent1"/>
+            </a:fillRef>
+            <a:effectRef idx="0">
+              <a:schemeClr val="accent1"/>
+            </a:effectRef>
+            <a:fontRef idx="minor">
+              <a:schemeClr val="tx1"/>
+            </a:fontRef>
+          </p:style>
+        </p:cxnSp>
+        <p:cxnSp>
+          <p:nvCxnSpPr>
+            <p:cNvPr id="16" name="Straight Connector 15">
+              <a:extLst>
+                <a:ext uri="{FF2B5EF4-FFF2-40B4-BE49-F238E27FC236}">
+                  <a16:creationId xmlns:a16="http://schemas.microsoft.com/office/drawing/2014/main" id="{C5A0DA26-0D66-4D4F-B6E9-148763B4D7DC}"/>
+                </a:ext>
+              </a:extLst>
+            </p:cNvPr>
+            <p:cNvCxnSpPr>
+              <a:cxnSpLocks/>
+            </p:cNvCxnSpPr>
+            <p:nvPr/>
+          </p:nvCxnSpPr>
+          <p:spPr>
+            <a:xfrm flipV="1">
+              <a:off x="2178399" y="3429002"/>
+              <a:ext cx="1831626" cy="625925"/>
+            </a:xfrm>
+            <a:prstGeom prst="line">
+              <a:avLst/>
+            </a:prstGeom>
+            <a:ln w="19050"/>
+          </p:spPr>
+          <p:style>
+            <a:lnRef idx="1">
+              <a:schemeClr val="accent1"/>
+            </a:lnRef>
+            <a:fillRef idx="0">
+              <a:schemeClr val="accent1"/>
+            </a:fillRef>
+            <a:effectRef idx="0">
+              <a:schemeClr val="accent1"/>
+            </a:effectRef>
+            <a:fontRef idx="minor">
+              <a:schemeClr val="tx1"/>
+            </a:fontRef>
+          </p:style>
+        </p:cxnSp>
+        <p:sp>
+          <p:nvSpPr>
+            <p:cNvPr id="34" name="Arc 33">
+              <a:extLst>
+                <a:ext uri="{FF2B5EF4-FFF2-40B4-BE49-F238E27FC236}">
+                  <a16:creationId xmlns:a16="http://schemas.microsoft.com/office/drawing/2014/main" id="{ED0BA849-7FBB-4350-997A-D661AF30B42B}"/>
+                </a:ext>
+              </a:extLst>
+            </p:cNvPr>
+            <p:cNvSpPr/>
+            <p:nvPr/>
+          </p:nvSpPr>
+          <p:spPr>
+            <a:xfrm>
+              <a:off x="2059016" y="3829117"/>
+              <a:ext cx="320039" cy="365760"/>
+            </a:xfrm>
+            <a:prstGeom prst="arc">
+              <a:avLst/>
+            </a:prstGeom>
+            <a:ln w="19050">
+              <a:solidFill>
+                <a:schemeClr val="accent1"/>
+              </a:solidFill>
+            </a:ln>
+          </p:spPr>
+          <p:style>
+            <a:lnRef idx="1">
+              <a:schemeClr val="accent1"/>
+            </a:lnRef>
+            <a:fillRef idx="0">
+              <a:schemeClr val="accent1"/>
+            </a:fillRef>
+            <a:effectRef idx="0">
+              <a:schemeClr val="accent1"/>
+            </a:effectRef>
+            <a:fontRef idx="minor">
+              <a:schemeClr val="tx1"/>
+            </a:fontRef>
+          </p:style>
+          <p:txBody>
+            <a:bodyPr rtlCol="0" anchor="ctr"/>
+            <a:lstStyle/>
+            <a:p>
+              <a:pPr algn="ctr"/>
+              <a:endParaRPr lang="fr-CA"/>
+            </a:p>
+          </p:txBody>
+        </p:sp>
+        <p:sp>
+          <p:nvSpPr>
+            <p:cNvPr id="35" name="Arc 34">
+              <a:extLst>
+                <a:ext uri="{FF2B5EF4-FFF2-40B4-BE49-F238E27FC236}">
+                  <a16:creationId xmlns:a16="http://schemas.microsoft.com/office/drawing/2014/main" id="{A044335F-CBB9-4FCC-941C-0D6EBF1B3657}"/>
+                </a:ext>
+              </a:extLst>
+            </p:cNvPr>
+            <p:cNvSpPr/>
+            <p:nvPr/>
+          </p:nvSpPr>
+          <p:spPr>
+            <a:xfrm rot="6540716">
+              <a:off x="2692717" y="1794760"/>
+              <a:ext cx="320039" cy="365760"/>
+            </a:xfrm>
+            <a:prstGeom prst="arc">
+              <a:avLst>
+                <a:gd name="adj1" fmla="val 16200000"/>
+                <a:gd name="adj2" fmla="val 732386"/>
+              </a:avLst>
+            </a:prstGeom>
+            <a:ln w="19050">
+              <a:solidFill>
+                <a:schemeClr val="accent1"/>
+              </a:solidFill>
+            </a:ln>
+          </p:spPr>
+          <p:style>
+            <a:lnRef idx="1">
+              <a:schemeClr val="accent1"/>
+            </a:lnRef>
+            <a:fillRef idx="0">
+              <a:schemeClr val="accent1"/>
+            </a:fillRef>
+            <a:effectRef idx="0">
+              <a:schemeClr val="accent1"/>
+            </a:effectRef>
+            <a:fontRef idx="minor">
+              <a:schemeClr val="tx1"/>
+            </a:fontRef>
+          </p:style>
+          <p:txBody>
+            <a:bodyPr rtlCol="0" anchor="ctr"/>
+            <a:lstStyle/>
+            <a:p>
+              <a:pPr algn="ctr"/>
+              <a:endParaRPr lang="fr-CA"/>
+            </a:p>
+          </p:txBody>
+        </p:sp>
+        <p:sp>
+          <p:nvSpPr>
+            <p:cNvPr id="36" name="Arc 35">
+              <a:extLst>
+                <a:ext uri="{FF2B5EF4-FFF2-40B4-BE49-F238E27FC236}">
+                  <a16:creationId xmlns:a16="http://schemas.microsoft.com/office/drawing/2014/main" id="{20BC7A59-49E0-4C21-96D1-F83BE528459B}"/>
+                </a:ext>
+              </a:extLst>
+            </p:cNvPr>
+            <p:cNvSpPr/>
+            <p:nvPr/>
+          </p:nvSpPr>
+          <p:spPr>
+            <a:xfrm rot="14971408">
+              <a:off x="3772242" y="3222523"/>
+              <a:ext cx="320039" cy="365760"/>
+            </a:xfrm>
+            <a:prstGeom prst="arc">
+              <a:avLst>
+                <a:gd name="adj1" fmla="val 15619248"/>
+                <a:gd name="adj2" fmla="val 0"/>
+              </a:avLst>
+            </a:prstGeom>
+            <a:ln w="19050">
+              <a:solidFill>
+                <a:schemeClr val="accent1"/>
+              </a:solidFill>
+            </a:ln>
+          </p:spPr>
+          <p:style>
+            <a:lnRef idx="1">
+              <a:schemeClr val="accent1"/>
+            </a:lnRef>
+            <a:fillRef idx="0">
+              <a:schemeClr val="accent1"/>
+            </a:fillRef>
+            <a:effectRef idx="0">
+              <a:schemeClr val="accent1"/>
+            </a:effectRef>
+            <a:fontRef idx="minor">
+              <a:schemeClr val="tx1"/>
+            </a:fontRef>
+          </p:style>
+          <p:txBody>
+            <a:bodyPr rtlCol="0" anchor="ctr"/>
+            <a:lstStyle/>
+            <a:p>
+              <a:pPr algn="ctr"/>
+              <a:endParaRPr lang="fr-CA"/>
+            </a:p>
+          </p:txBody>
+        </p:sp>
+        <mc:AlternateContent xmlns:mc="http://schemas.openxmlformats.org/markup-compatibility/2006">
+          <mc:Choice xmlns:a14="http://schemas.microsoft.com/office/drawing/2010/main" Requires="a14">
+            <p:sp>
+              <p:nvSpPr>
+                <p:cNvPr id="38" name="TextBox 37">
+                  <a:extLst>
+                    <a:ext uri="{FF2B5EF4-FFF2-40B4-BE49-F238E27FC236}">
+                      <a16:creationId xmlns:a16="http://schemas.microsoft.com/office/drawing/2014/main" id="{C0B97639-D25F-47DA-8F72-E6E7B5F42084}"/>
+                    </a:ext>
+                  </a:extLst>
+                </p:cNvPr>
+                <p:cNvSpPr txBox="1"/>
+                <p:nvPr/>
+              </p:nvSpPr>
+              <p:spPr>
+                <a:xfrm>
+                  <a:off x="1926541" y="1505467"/>
+                  <a:ext cx="1233799" cy="276999"/>
+                </a:xfrm>
+                <a:prstGeom prst="rect">
+                  <a:avLst/>
+                </a:prstGeom>
+                <a:noFill/>
+              </p:spPr>
+              <p:txBody>
+                <a:bodyPr wrap="none" lIns="0" tIns="0" rIns="0" bIns="0" rtlCol="0">
+                  <a:spAutoFit/>
+                </a:bodyPr>
+                <a:lstStyle/>
+                <a:p>
+                  <a14:m>
+                    <m:oMathPara xmlns:m="http://schemas.openxmlformats.org/officeDocument/2006/math">
+                      <m:oMathParaPr>
+                        <m:jc m:val="centerGroup"/>
+                      </m:oMathParaPr>
+                      <m:oMath xmlns:m="http://schemas.openxmlformats.org/officeDocument/2006/math">
+                        <m:r>
+                          <a:rPr lang="en-US" b="0" i="1" smtClean="0">
+                            <a:latin typeface="Cambria Math" panose="02040503050406030204" pitchFamily="18" charset="0"/>
+                          </a:rPr>
+                          <m:t>𝐴</m:t>
+                        </m:r>
+                        <m:r>
+                          <a:rPr lang="en-US" i="1">
+                            <a:latin typeface="Cambria Math" panose="02040503050406030204" pitchFamily="18" charset="0"/>
+                          </a:rPr>
+                          <m:t>(</m:t>
+                        </m:r>
+                        <m:sSub>
+                          <m:sSubPr>
+                            <m:ctrlPr>
+                              <a:rPr lang="en-US" i="1">
+                                <a:latin typeface="Cambria Math" panose="02040503050406030204" pitchFamily="18" charset="0"/>
+                              </a:rPr>
+                            </m:ctrlPr>
+                          </m:sSubPr>
+                          <m:e>
+                            <m:r>
+                              <a:rPr lang="en-US" i="1">
+                                <a:latin typeface="Cambria Math" panose="02040503050406030204" pitchFamily="18" charset="0"/>
+                              </a:rPr>
+                              <m:t>𝑥</m:t>
+                            </m:r>
+                          </m:e>
+                          <m:sub>
+                            <m:r>
+                              <a:rPr lang="en-US" b="0" i="1" smtClean="0">
+                                <a:latin typeface="Cambria Math" panose="02040503050406030204" pitchFamily="18" charset="0"/>
+                              </a:rPr>
+                              <m:t>1</m:t>
+                            </m:r>
+                          </m:sub>
+                        </m:sSub>
+                        <m:r>
+                          <a:rPr lang="en-US" i="1">
+                            <a:latin typeface="Cambria Math" panose="02040503050406030204" pitchFamily="18" charset="0"/>
+                          </a:rPr>
+                          <m:t>,</m:t>
+                        </m:r>
+                        <m:sSub>
+                          <m:sSubPr>
+                            <m:ctrlPr>
+                              <a:rPr lang="en-US" i="1">
+                                <a:latin typeface="Cambria Math" panose="02040503050406030204" pitchFamily="18" charset="0"/>
+                              </a:rPr>
+                            </m:ctrlPr>
+                          </m:sSubPr>
+                          <m:e>
+                            <m:r>
+                              <a:rPr lang="en-US" i="1">
+                                <a:latin typeface="Cambria Math" panose="02040503050406030204" pitchFamily="18" charset="0"/>
+                              </a:rPr>
+                              <m:t>𝑦</m:t>
+                            </m:r>
+                          </m:e>
+                          <m:sub>
+                            <m:r>
+                              <a:rPr lang="en-US" b="0" i="1" smtClean="0">
+                                <a:latin typeface="Cambria Math" panose="02040503050406030204" pitchFamily="18" charset="0"/>
+                              </a:rPr>
+                              <m:t>1</m:t>
+                            </m:r>
+                          </m:sub>
+                        </m:sSub>
+                        <m:r>
+                          <a:rPr lang="en-US" i="1">
+                            <a:latin typeface="Cambria Math" panose="02040503050406030204" pitchFamily="18" charset="0"/>
+                          </a:rPr>
+                          <m:t>,</m:t>
+                        </m:r>
+                        <m:sSub>
+                          <m:sSubPr>
+                            <m:ctrlPr>
+                              <a:rPr lang="en-US" i="1">
+                                <a:latin typeface="Cambria Math" panose="02040503050406030204" pitchFamily="18" charset="0"/>
+                              </a:rPr>
+                            </m:ctrlPr>
+                          </m:sSubPr>
+                          <m:e>
+                            <m:r>
+                              <a:rPr lang="en-US" i="1">
+                                <a:latin typeface="Cambria Math" panose="02040503050406030204" pitchFamily="18" charset="0"/>
+                              </a:rPr>
+                              <m:t>𝑧</m:t>
+                            </m:r>
+                          </m:e>
+                          <m:sub>
+                            <m:r>
+                              <a:rPr lang="en-US" b="0" i="1" smtClean="0">
+                                <a:latin typeface="Cambria Math" panose="02040503050406030204" pitchFamily="18" charset="0"/>
+                              </a:rPr>
+                              <m:t>1</m:t>
+                            </m:r>
+                          </m:sub>
+                        </m:sSub>
+                        <m:r>
+                          <a:rPr lang="en-US" i="1">
+                            <a:latin typeface="Cambria Math" panose="02040503050406030204" pitchFamily="18" charset="0"/>
+                          </a:rPr>
+                          <m:t>)</m:t>
+                        </m:r>
+                      </m:oMath>
+                    </m:oMathPara>
+                  </a14:m>
+                  <a:endParaRPr lang="fr-CA" dirty="0"/>
+                </a:p>
+              </p:txBody>
+            </p:sp>
+          </mc:Choice>
+          <mc:Fallback>
+            <p:sp>
+              <p:nvSpPr>
+                <p:cNvPr id="38" name="TextBox 37">
+                  <a:extLst>
+                    <a:ext uri="{FF2B5EF4-FFF2-40B4-BE49-F238E27FC236}">
+                      <a16:creationId xmlns:a16="http://schemas.microsoft.com/office/drawing/2014/main" id="{C0B97639-D25F-47DA-8F72-E6E7B5F42084}"/>
+                    </a:ext>
+                  </a:extLst>
+                </p:cNvPr>
+                <p:cNvSpPr txBox="1">
+                  <a:spLocks noRot="1" noChangeAspect="1" noMove="1" noResize="1" noEditPoints="1" noAdjustHandles="1" noChangeArrowheads="1" noChangeShapeType="1" noTextEdit="1"/>
+                </p:cNvSpPr>
+                <p:nvPr/>
+              </p:nvSpPr>
+              <p:spPr>
+                <a:xfrm>
+                  <a:off x="1926541" y="1505467"/>
+                  <a:ext cx="1233799" cy="276999"/>
+                </a:xfrm>
+                <a:prstGeom prst="rect">
+                  <a:avLst/>
+                </a:prstGeom>
+                <a:blipFill>
+                  <a:blip r:embed="rId2"/>
+                  <a:stretch>
+                    <a:fillRect l="-3448" t="-4444" r="-5911" b="-35556"/>
+                  </a:stretch>
+                </a:blipFill>
+              </p:spPr>
+              <p:txBody>
+                <a:bodyPr/>
+                <a:lstStyle/>
+                <a:p>
+                  <a:r>
+                    <a:rPr lang="fr-CA">
+                      <a:noFill/>
+                    </a:rPr>
+                    <a:t> </a:t>
+                  </a:r>
+                </a:p>
+              </p:txBody>
+            </p:sp>
+          </mc:Fallback>
+        </mc:AlternateContent>
+        <mc:AlternateContent xmlns:mc="http://schemas.openxmlformats.org/markup-compatibility/2006">
+          <mc:Choice xmlns:a14="http://schemas.microsoft.com/office/drawing/2010/main" Requires="a14">
+            <p:sp>
+              <p:nvSpPr>
+                <p:cNvPr id="39" name="TextBox 38">
+                  <a:extLst>
+                    <a:ext uri="{FF2B5EF4-FFF2-40B4-BE49-F238E27FC236}">
+                      <a16:creationId xmlns:a16="http://schemas.microsoft.com/office/drawing/2014/main" id="{748EC6E7-AB54-42DC-BC79-BC9BB1ABB566}"/>
+                    </a:ext>
+                  </a:extLst>
+                </p:cNvPr>
+                <p:cNvSpPr txBox="1"/>
+                <p:nvPr/>
+              </p:nvSpPr>
+              <p:spPr>
+                <a:xfrm>
+                  <a:off x="4018136" y="3456801"/>
+                  <a:ext cx="1249509" cy="276999"/>
+                </a:xfrm>
+                <a:prstGeom prst="rect">
+                  <a:avLst/>
+                </a:prstGeom>
+                <a:noFill/>
+              </p:spPr>
+              <p:txBody>
+                <a:bodyPr wrap="none" lIns="0" tIns="0" rIns="0" bIns="0" rtlCol="0">
+                  <a:spAutoFit/>
+                </a:bodyPr>
+                <a:lstStyle/>
+                <a:p>
+                  <a14:m>
+                    <m:oMathPara xmlns:m="http://schemas.openxmlformats.org/officeDocument/2006/math">
+                      <m:oMathParaPr>
+                        <m:jc m:val="centerGroup"/>
+                      </m:oMathParaPr>
+                      <m:oMath xmlns:m="http://schemas.openxmlformats.org/officeDocument/2006/math">
+                        <m:r>
+                          <a:rPr lang="en-US" b="0" i="1" smtClean="0">
+                            <a:latin typeface="Cambria Math" panose="02040503050406030204" pitchFamily="18" charset="0"/>
+                          </a:rPr>
+                          <m:t>𝐵</m:t>
+                        </m:r>
+                        <m:r>
+                          <a:rPr lang="en-US" b="0" i="1" smtClean="0">
+                            <a:latin typeface="Cambria Math" panose="02040503050406030204" pitchFamily="18" charset="0"/>
+                          </a:rPr>
+                          <m:t>(</m:t>
+                        </m:r>
+                        <m:sSub>
+                          <m:sSubPr>
+                            <m:ctrlPr>
+                              <a:rPr lang="en-US" b="0" i="1" smtClean="0">
+                                <a:latin typeface="Cambria Math" panose="02040503050406030204" pitchFamily="18" charset="0"/>
+                              </a:rPr>
+                            </m:ctrlPr>
+                          </m:sSubPr>
+                          <m:e>
+                            <m:r>
+                              <a:rPr lang="en-US" b="0" i="1" smtClean="0">
+                                <a:latin typeface="Cambria Math" panose="02040503050406030204" pitchFamily="18" charset="0"/>
+                              </a:rPr>
+                              <m:t>𝑥</m:t>
+                            </m:r>
+                          </m:e>
+                          <m:sub>
+                            <m:r>
+                              <a:rPr lang="en-US" b="0" i="1" smtClean="0">
+                                <a:latin typeface="Cambria Math" panose="02040503050406030204" pitchFamily="18" charset="0"/>
+                              </a:rPr>
+                              <m:t>2</m:t>
+                            </m:r>
+                          </m:sub>
+                        </m:sSub>
+                        <m:r>
+                          <a:rPr lang="en-US" b="0" i="1" smtClean="0">
+                            <a:latin typeface="Cambria Math" panose="02040503050406030204" pitchFamily="18" charset="0"/>
+                          </a:rPr>
+                          <m:t>,</m:t>
+                        </m:r>
+                        <m:sSub>
+                          <m:sSubPr>
+                            <m:ctrlPr>
+                              <a:rPr lang="en-US" i="1">
+                                <a:latin typeface="Cambria Math" panose="02040503050406030204" pitchFamily="18" charset="0"/>
+                              </a:rPr>
+                            </m:ctrlPr>
+                          </m:sSubPr>
+                          <m:e>
+                            <m:r>
+                              <a:rPr lang="en-US" b="0" i="1" smtClean="0">
+                                <a:latin typeface="Cambria Math" panose="02040503050406030204" pitchFamily="18" charset="0"/>
+                              </a:rPr>
+                              <m:t>𝑦</m:t>
+                            </m:r>
+                          </m:e>
+                          <m:sub>
+                            <m:r>
+                              <a:rPr lang="en-US" b="0" i="1" smtClean="0">
+                                <a:latin typeface="Cambria Math" panose="02040503050406030204" pitchFamily="18" charset="0"/>
+                              </a:rPr>
+                              <m:t>2</m:t>
+                            </m:r>
+                          </m:sub>
+                        </m:sSub>
+                        <m:r>
+                          <a:rPr lang="en-US" b="0" i="1" smtClean="0">
+                            <a:latin typeface="Cambria Math" panose="02040503050406030204" pitchFamily="18" charset="0"/>
+                          </a:rPr>
+                          <m:t>,</m:t>
+                        </m:r>
+                        <m:sSub>
+                          <m:sSubPr>
+                            <m:ctrlPr>
+                              <a:rPr lang="en-US" i="1">
+                                <a:latin typeface="Cambria Math" panose="02040503050406030204" pitchFamily="18" charset="0"/>
+                              </a:rPr>
+                            </m:ctrlPr>
+                          </m:sSubPr>
+                          <m:e>
+                            <m:r>
+                              <a:rPr lang="en-US" b="0" i="1" smtClean="0">
+                                <a:latin typeface="Cambria Math" panose="02040503050406030204" pitchFamily="18" charset="0"/>
+                              </a:rPr>
+                              <m:t>𝑧</m:t>
+                            </m:r>
+                          </m:e>
+                          <m:sub>
+                            <m:r>
+                              <a:rPr lang="en-US" b="0" i="1" smtClean="0">
+                                <a:latin typeface="Cambria Math" panose="02040503050406030204" pitchFamily="18" charset="0"/>
+                              </a:rPr>
+                              <m:t>2</m:t>
+                            </m:r>
+                          </m:sub>
+                        </m:sSub>
+                        <m:r>
+                          <a:rPr lang="en-US" b="0" i="1" smtClean="0">
+                            <a:latin typeface="Cambria Math" panose="02040503050406030204" pitchFamily="18" charset="0"/>
+                          </a:rPr>
+                          <m:t>)</m:t>
+                        </m:r>
+                      </m:oMath>
+                    </m:oMathPara>
+                  </a14:m>
+                  <a:endParaRPr lang="fr-CA" dirty="0"/>
+                </a:p>
+              </p:txBody>
+            </p:sp>
+          </mc:Choice>
+          <mc:Fallback>
+            <p:sp>
+              <p:nvSpPr>
+                <p:cNvPr id="39" name="TextBox 38">
+                  <a:extLst>
+                    <a:ext uri="{FF2B5EF4-FFF2-40B4-BE49-F238E27FC236}">
+                      <a16:creationId xmlns:a16="http://schemas.microsoft.com/office/drawing/2014/main" id="{748EC6E7-AB54-42DC-BC79-BC9BB1ABB566}"/>
+                    </a:ext>
+                  </a:extLst>
+                </p:cNvPr>
+                <p:cNvSpPr txBox="1">
+                  <a:spLocks noRot="1" noChangeAspect="1" noMove="1" noResize="1" noEditPoints="1" noAdjustHandles="1" noChangeArrowheads="1" noChangeShapeType="1" noTextEdit="1"/>
+                </p:cNvSpPr>
+                <p:nvPr/>
+              </p:nvSpPr>
+              <p:spPr>
+                <a:xfrm>
+                  <a:off x="4018136" y="3456801"/>
+                  <a:ext cx="1249509" cy="276999"/>
+                </a:xfrm>
+                <a:prstGeom prst="rect">
+                  <a:avLst/>
+                </a:prstGeom>
+                <a:blipFill>
+                  <a:blip r:embed="rId3"/>
+                  <a:stretch>
+                    <a:fillRect l="-3902" t="-2222" r="-6341" b="-35556"/>
+                  </a:stretch>
+                </a:blipFill>
+              </p:spPr>
+              <p:txBody>
+                <a:bodyPr/>
+                <a:lstStyle/>
+                <a:p>
+                  <a:r>
+                    <a:rPr lang="fr-CA">
+                      <a:noFill/>
+                    </a:rPr>
+                    <a:t> </a:t>
+                  </a:r>
+                </a:p>
+              </p:txBody>
+            </p:sp>
+          </mc:Fallback>
+        </mc:AlternateContent>
+        <mc:AlternateContent xmlns:mc="http://schemas.openxmlformats.org/markup-compatibility/2006">
+          <mc:Choice xmlns:a14="http://schemas.microsoft.com/office/drawing/2010/main" Requires="a14">
+            <p:sp>
+              <p:nvSpPr>
+                <p:cNvPr id="40" name="TextBox 39">
+                  <a:extLst>
+                    <a:ext uri="{FF2B5EF4-FFF2-40B4-BE49-F238E27FC236}">
+                      <a16:creationId xmlns:a16="http://schemas.microsoft.com/office/drawing/2014/main" id="{08FEA5D2-8F75-42C9-810C-00C2BF3F1498}"/>
+                    </a:ext>
+                  </a:extLst>
+                </p:cNvPr>
+                <p:cNvSpPr txBox="1"/>
+                <p:nvPr/>
+              </p:nvSpPr>
+              <p:spPr>
+                <a:xfrm>
+                  <a:off x="975943" y="3944494"/>
+                  <a:ext cx="1238994" cy="276999"/>
+                </a:xfrm>
+                <a:prstGeom prst="rect">
+                  <a:avLst/>
+                </a:prstGeom>
+                <a:noFill/>
+              </p:spPr>
+              <p:txBody>
+                <a:bodyPr wrap="none" lIns="0" tIns="0" rIns="0" bIns="0" rtlCol="0">
+                  <a:spAutoFit/>
+                </a:bodyPr>
+                <a:lstStyle/>
+                <a:p>
+                  <a14:m>
+                    <m:oMathPara xmlns:m="http://schemas.openxmlformats.org/officeDocument/2006/math">
+                      <m:oMathParaPr>
+                        <m:jc m:val="centerGroup"/>
+                      </m:oMathParaPr>
+                      <m:oMath xmlns:m="http://schemas.openxmlformats.org/officeDocument/2006/math">
+                        <m:r>
+                          <a:rPr lang="en-US" b="0" i="1" smtClean="0">
+                            <a:latin typeface="Cambria Math" panose="02040503050406030204" pitchFamily="18" charset="0"/>
+                          </a:rPr>
+                          <m:t>𝐶</m:t>
+                        </m:r>
+                        <m:r>
+                          <a:rPr lang="en-US" i="1">
+                            <a:latin typeface="Cambria Math" panose="02040503050406030204" pitchFamily="18" charset="0"/>
+                          </a:rPr>
+                          <m:t>(</m:t>
+                        </m:r>
+                        <m:sSub>
+                          <m:sSubPr>
+                            <m:ctrlPr>
+                              <a:rPr lang="en-US" i="1">
+                                <a:latin typeface="Cambria Math" panose="02040503050406030204" pitchFamily="18" charset="0"/>
+                              </a:rPr>
+                            </m:ctrlPr>
+                          </m:sSubPr>
+                          <m:e>
+                            <m:r>
+                              <a:rPr lang="en-US" i="1">
+                                <a:latin typeface="Cambria Math" panose="02040503050406030204" pitchFamily="18" charset="0"/>
+                              </a:rPr>
+                              <m:t>𝑥</m:t>
+                            </m:r>
+                          </m:e>
+                          <m:sub>
+                            <m:r>
+                              <a:rPr lang="en-US" b="0" i="1" smtClean="0">
+                                <a:latin typeface="Cambria Math" panose="02040503050406030204" pitchFamily="18" charset="0"/>
+                              </a:rPr>
+                              <m:t>3</m:t>
+                            </m:r>
+                          </m:sub>
+                        </m:sSub>
+                        <m:r>
+                          <a:rPr lang="en-US" i="1">
+                            <a:latin typeface="Cambria Math" panose="02040503050406030204" pitchFamily="18" charset="0"/>
+                          </a:rPr>
+                          <m:t>,</m:t>
+                        </m:r>
+                        <m:sSub>
+                          <m:sSubPr>
+                            <m:ctrlPr>
+                              <a:rPr lang="en-US" i="1">
+                                <a:latin typeface="Cambria Math" panose="02040503050406030204" pitchFamily="18" charset="0"/>
+                              </a:rPr>
+                            </m:ctrlPr>
+                          </m:sSubPr>
+                          <m:e>
+                            <m:r>
+                              <a:rPr lang="en-US" i="1">
+                                <a:latin typeface="Cambria Math" panose="02040503050406030204" pitchFamily="18" charset="0"/>
+                              </a:rPr>
+                              <m:t>𝑦</m:t>
+                            </m:r>
+                          </m:e>
+                          <m:sub>
+                            <m:r>
+                              <a:rPr lang="en-US" b="0" i="1" smtClean="0">
+                                <a:latin typeface="Cambria Math" panose="02040503050406030204" pitchFamily="18" charset="0"/>
+                              </a:rPr>
+                              <m:t>3</m:t>
+                            </m:r>
+                          </m:sub>
+                        </m:sSub>
+                        <m:r>
+                          <a:rPr lang="en-US" i="1">
+                            <a:latin typeface="Cambria Math" panose="02040503050406030204" pitchFamily="18" charset="0"/>
+                          </a:rPr>
+                          <m:t>,</m:t>
+                        </m:r>
+                        <m:sSub>
+                          <m:sSubPr>
+                            <m:ctrlPr>
+                              <a:rPr lang="en-US" i="1">
+                                <a:latin typeface="Cambria Math" panose="02040503050406030204" pitchFamily="18" charset="0"/>
+                              </a:rPr>
+                            </m:ctrlPr>
+                          </m:sSubPr>
+                          <m:e>
+                            <m:r>
+                              <a:rPr lang="en-US" i="1">
+                                <a:latin typeface="Cambria Math" panose="02040503050406030204" pitchFamily="18" charset="0"/>
+                              </a:rPr>
+                              <m:t>𝑧</m:t>
+                            </m:r>
+                          </m:e>
+                          <m:sub>
+                            <m:r>
+                              <a:rPr lang="en-US" b="0" i="1" smtClean="0">
+                                <a:latin typeface="Cambria Math" panose="02040503050406030204" pitchFamily="18" charset="0"/>
+                              </a:rPr>
+                              <m:t>3</m:t>
+                            </m:r>
+                          </m:sub>
+                        </m:sSub>
+                        <m:r>
+                          <a:rPr lang="en-US" i="1">
+                            <a:latin typeface="Cambria Math" panose="02040503050406030204" pitchFamily="18" charset="0"/>
+                          </a:rPr>
+                          <m:t>)</m:t>
+                        </m:r>
+                      </m:oMath>
+                    </m:oMathPara>
+                  </a14:m>
+                  <a:endParaRPr lang="fr-CA" dirty="0"/>
+                </a:p>
+              </p:txBody>
+            </p:sp>
+          </mc:Choice>
+          <mc:Fallback>
+            <p:sp>
+              <p:nvSpPr>
+                <p:cNvPr id="40" name="TextBox 39">
+                  <a:extLst>
+                    <a:ext uri="{FF2B5EF4-FFF2-40B4-BE49-F238E27FC236}">
+                      <a16:creationId xmlns:a16="http://schemas.microsoft.com/office/drawing/2014/main" id="{08FEA5D2-8F75-42C9-810C-00C2BF3F1498}"/>
+                    </a:ext>
+                  </a:extLst>
+                </p:cNvPr>
+                <p:cNvSpPr txBox="1">
+                  <a:spLocks noRot="1" noChangeAspect="1" noMove="1" noResize="1" noEditPoints="1" noAdjustHandles="1" noChangeArrowheads="1" noChangeShapeType="1" noTextEdit="1"/>
+                </p:cNvSpPr>
+                <p:nvPr/>
+              </p:nvSpPr>
+              <p:spPr>
+                <a:xfrm>
+                  <a:off x="975943" y="3944494"/>
+                  <a:ext cx="1238994" cy="276999"/>
+                </a:xfrm>
+                <a:prstGeom prst="rect">
+                  <a:avLst/>
+                </a:prstGeom>
+                <a:blipFill>
+                  <a:blip r:embed="rId4"/>
+                  <a:stretch>
+                    <a:fillRect l="-3922" t="-2222" r="-6373" b="-35556"/>
+                  </a:stretch>
+                </a:blipFill>
+              </p:spPr>
+              <p:txBody>
+                <a:bodyPr/>
+                <a:lstStyle/>
+                <a:p>
+                  <a:r>
+                    <a:rPr lang="fr-CA">
+                      <a:noFill/>
+                    </a:rPr>
+                    <a:t> </a:t>
+                  </a:r>
+                </a:p>
+              </p:txBody>
+            </p:sp>
+          </mc:Fallback>
+        </mc:AlternateContent>
+        <mc:AlternateContent xmlns:mc="http://schemas.openxmlformats.org/markup-compatibility/2006">
+          <mc:Choice xmlns:a14="http://schemas.microsoft.com/office/drawing/2010/main" Requires="a14">
+            <p:sp>
+              <p:nvSpPr>
+                <p:cNvPr id="41" name="TextBox 40">
+                  <a:extLst>
+                    <a:ext uri="{FF2B5EF4-FFF2-40B4-BE49-F238E27FC236}">
+                      <a16:creationId xmlns:a16="http://schemas.microsoft.com/office/drawing/2014/main" id="{260801B7-3345-45AF-B8F3-0E5DAFC8FF09}"/>
+                    </a:ext>
+                  </a:extLst>
+                </p:cNvPr>
+                <p:cNvSpPr txBox="1"/>
+                <p:nvPr/>
+              </p:nvSpPr>
+              <p:spPr>
+                <a:xfrm>
+                  <a:off x="2851123" y="2166370"/>
+                  <a:ext cx="197746" cy="276999"/>
+                </a:xfrm>
+                <a:prstGeom prst="rect">
+                  <a:avLst/>
+                </a:prstGeom>
+                <a:noFill/>
+              </p:spPr>
+              <p:txBody>
+                <a:bodyPr wrap="none" lIns="0" tIns="0" rIns="0" bIns="0" rtlCol="0">
+                  <a:spAutoFit/>
+                </a:bodyPr>
+                <a:lstStyle/>
+                <a:p>
+                  <a14:m>
+                    <m:oMathPara xmlns:m="http://schemas.openxmlformats.org/officeDocument/2006/math">
+                      <m:oMathParaPr>
+                        <m:jc m:val="centerGroup"/>
+                      </m:oMathParaPr>
+                      <m:oMath xmlns:m="http://schemas.openxmlformats.org/officeDocument/2006/math">
+                        <m:r>
+                          <a:rPr lang="fr-CA" i="1" smtClean="0">
+                            <a:latin typeface="Cambria Math" panose="02040503050406030204" pitchFamily="18" charset="0"/>
+                            <a:ea typeface="Cambria Math" panose="02040503050406030204" pitchFamily="18" charset="0"/>
+                          </a:rPr>
+                          <m:t>𝛼</m:t>
+                        </m:r>
+                      </m:oMath>
+                    </m:oMathPara>
+                  </a14:m>
+                  <a:endParaRPr lang="fr-CA" dirty="0"/>
+                </a:p>
+              </p:txBody>
+            </p:sp>
+          </mc:Choice>
+          <mc:Fallback>
+            <p:sp>
+              <p:nvSpPr>
+                <p:cNvPr id="41" name="TextBox 40">
+                  <a:extLst>
+                    <a:ext uri="{FF2B5EF4-FFF2-40B4-BE49-F238E27FC236}">
+                      <a16:creationId xmlns:a16="http://schemas.microsoft.com/office/drawing/2014/main" id="{260801B7-3345-45AF-B8F3-0E5DAFC8FF09}"/>
+                    </a:ext>
+                  </a:extLst>
+                </p:cNvPr>
+                <p:cNvSpPr txBox="1">
+                  <a:spLocks noRot="1" noChangeAspect="1" noMove="1" noResize="1" noEditPoints="1" noAdjustHandles="1" noChangeArrowheads="1" noChangeShapeType="1" noTextEdit="1"/>
+                </p:cNvSpPr>
+                <p:nvPr/>
+              </p:nvSpPr>
+              <p:spPr>
+                <a:xfrm>
+                  <a:off x="2851123" y="2166370"/>
+                  <a:ext cx="197746" cy="276999"/>
+                </a:xfrm>
+                <a:prstGeom prst="rect">
+                  <a:avLst/>
+                </a:prstGeom>
+                <a:blipFill>
+                  <a:blip r:embed="rId5"/>
+                  <a:stretch>
+                    <a:fillRect l="-18750" r="-15625"/>
+                  </a:stretch>
+                </a:blipFill>
+              </p:spPr>
+              <p:txBody>
+                <a:bodyPr/>
+                <a:lstStyle/>
+                <a:p>
+                  <a:r>
+                    <a:rPr lang="fr-CA">
+                      <a:noFill/>
+                    </a:rPr>
+                    <a:t> </a:t>
+                  </a:r>
+                </a:p>
+              </p:txBody>
+            </p:sp>
+          </mc:Fallback>
+        </mc:AlternateContent>
+        <mc:AlternateContent xmlns:mc="http://schemas.openxmlformats.org/markup-compatibility/2006">
+          <mc:Choice xmlns:a14="http://schemas.microsoft.com/office/drawing/2010/main" Requires="a14">
+            <p:sp>
+              <p:nvSpPr>
+                <p:cNvPr id="42" name="TextBox 41">
+                  <a:extLst>
+                    <a:ext uri="{FF2B5EF4-FFF2-40B4-BE49-F238E27FC236}">
+                      <a16:creationId xmlns:a16="http://schemas.microsoft.com/office/drawing/2014/main" id="{9E4AB0AD-92A2-492E-9455-C4978D9044EE}"/>
+                    </a:ext>
+                  </a:extLst>
+                </p:cNvPr>
+                <p:cNvSpPr txBox="1"/>
+                <p:nvPr/>
+              </p:nvSpPr>
+              <p:spPr>
+                <a:xfrm>
+                  <a:off x="3444135" y="3109514"/>
+                  <a:ext cx="199350" cy="276999"/>
+                </a:xfrm>
+                <a:prstGeom prst="rect">
+                  <a:avLst/>
+                </a:prstGeom>
+                <a:noFill/>
+              </p:spPr>
+              <p:txBody>
+                <a:bodyPr wrap="none" lIns="0" tIns="0" rIns="0" bIns="0" rtlCol="0">
+                  <a:spAutoFit/>
+                </a:bodyPr>
+                <a:lstStyle/>
+                <a:p>
+                  <a14:m>
+                    <m:oMathPara xmlns:m="http://schemas.openxmlformats.org/officeDocument/2006/math">
+                      <m:oMathParaPr>
+                        <m:jc m:val="centerGroup"/>
+                      </m:oMathParaPr>
+                      <m:oMath xmlns:m="http://schemas.openxmlformats.org/officeDocument/2006/math">
+                        <m:r>
+                          <a:rPr lang="fr-CA" i="1" smtClean="0">
+                            <a:latin typeface="Cambria Math" panose="02040503050406030204" pitchFamily="18" charset="0"/>
+                            <a:ea typeface="Cambria Math" panose="02040503050406030204" pitchFamily="18" charset="0"/>
+                          </a:rPr>
+                          <m:t>𝛽</m:t>
+                        </m:r>
+                      </m:oMath>
+                    </m:oMathPara>
+                  </a14:m>
+                  <a:endParaRPr lang="fr-CA" dirty="0"/>
+                </a:p>
+              </p:txBody>
+            </p:sp>
+          </mc:Choice>
+          <mc:Fallback>
+            <p:sp>
+              <p:nvSpPr>
+                <p:cNvPr id="42" name="TextBox 41">
+                  <a:extLst>
+                    <a:ext uri="{FF2B5EF4-FFF2-40B4-BE49-F238E27FC236}">
+                      <a16:creationId xmlns:a16="http://schemas.microsoft.com/office/drawing/2014/main" id="{9E4AB0AD-92A2-492E-9455-C4978D9044EE}"/>
+                    </a:ext>
+                  </a:extLst>
+                </p:cNvPr>
+                <p:cNvSpPr txBox="1">
+                  <a:spLocks noRot="1" noChangeAspect="1" noMove="1" noResize="1" noEditPoints="1" noAdjustHandles="1" noChangeArrowheads="1" noChangeShapeType="1" noTextEdit="1"/>
+                </p:cNvSpPr>
+                <p:nvPr/>
+              </p:nvSpPr>
+              <p:spPr>
+                <a:xfrm>
+                  <a:off x="3444135" y="3109514"/>
+                  <a:ext cx="199350" cy="276999"/>
+                </a:xfrm>
+                <a:prstGeom prst="rect">
+                  <a:avLst/>
+                </a:prstGeom>
+                <a:blipFill>
+                  <a:blip r:embed="rId6"/>
+                  <a:stretch>
+                    <a:fillRect l="-42424" t="-2222" r="-36364" b="-35556"/>
+                  </a:stretch>
+                </a:blipFill>
+              </p:spPr>
+              <p:txBody>
+                <a:bodyPr/>
+                <a:lstStyle/>
+                <a:p>
+                  <a:r>
+                    <a:rPr lang="fr-CA">
+                      <a:noFill/>
+                    </a:rPr>
+                    <a:t> </a:t>
+                  </a:r>
+                </a:p>
+              </p:txBody>
+            </p:sp>
+          </mc:Fallback>
+        </mc:AlternateContent>
+        <mc:AlternateContent xmlns:mc="http://schemas.openxmlformats.org/markup-compatibility/2006">
+          <mc:Choice xmlns:a14="http://schemas.microsoft.com/office/drawing/2010/main" Requires="a14">
+            <p:sp>
+              <p:nvSpPr>
+                <p:cNvPr id="43" name="TextBox 42">
+                  <a:extLst>
+                    <a:ext uri="{FF2B5EF4-FFF2-40B4-BE49-F238E27FC236}">
+                      <a16:creationId xmlns:a16="http://schemas.microsoft.com/office/drawing/2014/main" id="{678ACD57-C3CF-40B4-A935-7689DCE3D2FE}"/>
+                    </a:ext>
+                  </a:extLst>
+                </p:cNvPr>
+                <p:cNvSpPr txBox="1"/>
+                <p:nvPr/>
+              </p:nvSpPr>
+              <p:spPr>
+                <a:xfrm>
+                  <a:off x="2372770" y="3580116"/>
+                  <a:ext cx="180947" cy="276999"/>
+                </a:xfrm>
+                <a:prstGeom prst="rect">
+                  <a:avLst/>
+                </a:prstGeom>
+                <a:noFill/>
+              </p:spPr>
+              <p:txBody>
+                <a:bodyPr wrap="none" lIns="0" tIns="0" rIns="0" bIns="0" rtlCol="0">
+                  <a:spAutoFit/>
+                </a:bodyPr>
+                <a:lstStyle/>
+                <a:p>
+                  <a14:m>
+                    <m:oMathPara xmlns:m="http://schemas.openxmlformats.org/officeDocument/2006/math">
+                      <m:oMathParaPr>
+                        <m:jc m:val="centerGroup"/>
+                      </m:oMathParaPr>
+                      <m:oMath xmlns:m="http://schemas.openxmlformats.org/officeDocument/2006/math">
+                        <m:r>
+                          <a:rPr lang="fr-CA" i="1" smtClean="0">
+                            <a:latin typeface="Cambria Math" panose="02040503050406030204" pitchFamily="18" charset="0"/>
+                            <a:ea typeface="Cambria Math" panose="02040503050406030204" pitchFamily="18" charset="0"/>
+                          </a:rPr>
+                          <m:t>𝛾</m:t>
+                        </m:r>
+                      </m:oMath>
+                    </m:oMathPara>
+                  </a14:m>
+                  <a:endParaRPr lang="fr-CA" dirty="0"/>
+                </a:p>
+              </p:txBody>
+            </p:sp>
+          </mc:Choice>
+          <mc:Fallback>
+            <p:sp>
+              <p:nvSpPr>
+                <p:cNvPr id="43" name="TextBox 42">
+                  <a:extLst>
+                    <a:ext uri="{FF2B5EF4-FFF2-40B4-BE49-F238E27FC236}">
+                      <a16:creationId xmlns:a16="http://schemas.microsoft.com/office/drawing/2014/main" id="{678ACD57-C3CF-40B4-A935-7689DCE3D2FE}"/>
+                    </a:ext>
+                  </a:extLst>
+                </p:cNvPr>
+                <p:cNvSpPr txBox="1">
+                  <a:spLocks noRot="1" noChangeAspect="1" noMove="1" noResize="1" noEditPoints="1" noAdjustHandles="1" noChangeArrowheads="1" noChangeShapeType="1" noTextEdit="1"/>
+                </p:cNvSpPr>
+                <p:nvPr/>
+              </p:nvSpPr>
+              <p:spPr>
+                <a:xfrm>
+                  <a:off x="2372770" y="3580116"/>
+                  <a:ext cx="180947" cy="276999"/>
+                </a:xfrm>
+                <a:prstGeom prst="rect">
+                  <a:avLst/>
+                </a:prstGeom>
+                <a:blipFill>
+                  <a:blip r:embed="rId7"/>
+                  <a:stretch>
+                    <a:fillRect l="-30000" r="-26667" b="-24444"/>
+                  </a:stretch>
+                </a:blipFill>
+              </p:spPr>
+              <p:txBody>
+                <a:bodyPr/>
+                <a:lstStyle/>
+                <a:p>
+                  <a:r>
+                    <a:rPr lang="fr-CA">
+                      <a:noFill/>
+                    </a:rPr>
+                    <a:t> </a:t>
+                  </a:r>
+                </a:p>
+              </p:txBody>
+            </p:sp>
+          </mc:Fallback>
+        </mc:AlternateContent>
+        <mc:AlternateContent xmlns:mc="http://schemas.openxmlformats.org/markup-compatibility/2006">
+          <mc:Choice xmlns:a14="http://schemas.microsoft.com/office/drawing/2010/main" Requires="a14">
+            <p:sp>
+              <p:nvSpPr>
+                <p:cNvPr id="44" name="TextBox 43">
+                  <a:extLst>
+                    <a:ext uri="{FF2B5EF4-FFF2-40B4-BE49-F238E27FC236}">
+                      <a16:creationId xmlns:a16="http://schemas.microsoft.com/office/drawing/2014/main" id="{DAEADF2C-5678-46AD-870D-61A8D27FA587}"/>
+                    </a:ext>
+                  </a:extLst>
+                </p:cNvPr>
+                <p:cNvSpPr txBox="1"/>
+                <p:nvPr/>
+              </p:nvSpPr>
+              <p:spPr>
+                <a:xfrm>
+                  <a:off x="2153983" y="2703751"/>
+                  <a:ext cx="346762" cy="277576"/>
+                </a:xfrm>
+                <a:prstGeom prst="rect">
+                  <a:avLst/>
+                </a:prstGeom>
+                <a:noFill/>
+              </p:spPr>
+              <p:txBody>
+                <a:bodyPr wrap="none" lIns="0" tIns="0" rIns="0" bIns="0" rtlCol="0">
+                  <a:spAutoFit/>
+                </a:bodyPr>
+                <a:lstStyle/>
+                <a:p>
+                  <a14:m>
+                    <m:oMathPara xmlns:m="http://schemas.openxmlformats.org/officeDocument/2006/math">
+                      <m:oMathParaPr>
+                        <m:jc m:val="centerGroup"/>
+                      </m:oMathParaPr>
+                      <m:oMath xmlns:m="http://schemas.openxmlformats.org/officeDocument/2006/math">
+                        <m:acc>
+                          <m:accPr>
+                            <m:chr m:val="̅"/>
+                            <m:ctrlPr>
+                              <a:rPr lang="en-US" i="1">
+                                <a:latin typeface="Cambria Math" panose="02040503050406030204" pitchFamily="18" charset="0"/>
+                              </a:rPr>
+                            </m:ctrlPr>
+                          </m:accPr>
+                          <m:e>
+                            <m:r>
+                              <a:rPr lang="en-US" i="1">
+                                <a:latin typeface="Cambria Math" panose="02040503050406030204" pitchFamily="18" charset="0"/>
+                              </a:rPr>
+                              <m:t>𝐴𝐶</m:t>
+                            </m:r>
+                          </m:e>
+                        </m:acc>
+                      </m:oMath>
+                    </m:oMathPara>
+                  </a14:m>
+                  <a:endParaRPr lang="fr-CA" dirty="0"/>
+                </a:p>
+              </p:txBody>
+            </p:sp>
+          </mc:Choice>
+          <mc:Fallback>
+            <p:sp>
+              <p:nvSpPr>
+                <p:cNvPr id="44" name="TextBox 43">
+                  <a:extLst>
+                    <a:ext uri="{FF2B5EF4-FFF2-40B4-BE49-F238E27FC236}">
+                      <a16:creationId xmlns:a16="http://schemas.microsoft.com/office/drawing/2014/main" id="{DAEADF2C-5678-46AD-870D-61A8D27FA587}"/>
+                    </a:ext>
+                  </a:extLst>
+                </p:cNvPr>
+                <p:cNvSpPr txBox="1">
+                  <a:spLocks noRot="1" noChangeAspect="1" noMove="1" noResize="1" noEditPoints="1" noAdjustHandles="1" noChangeArrowheads="1" noChangeShapeType="1" noTextEdit="1"/>
+                </p:cNvSpPr>
+                <p:nvPr/>
+              </p:nvSpPr>
+              <p:spPr>
+                <a:xfrm>
+                  <a:off x="2153983" y="2703751"/>
+                  <a:ext cx="346762" cy="277576"/>
+                </a:xfrm>
+                <a:prstGeom prst="rect">
+                  <a:avLst/>
+                </a:prstGeom>
+                <a:blipFill>
+                  <a:blip r:embed="rId8"/>
+                  <a:stretch>
+                    <a:fillRect l="-16071" r="-16071" b="-8696"/>
+                  </a:stretch>
+                </a:blipFill>
+              </p:spPr>
+              <p:txBody>
+                <a:bodyPr/>
+                <a:lstStyle/>
+                <a:p>
+                  <a:r>
+                    <a:rPr lang="fr-CA">
+                      <a:noFill/>
+                    </a:rPr>
+                    <a:t> </a:t>
+                  </a:r>
+                </a:p>
+              </p:txBody>
+            </p:sp>
+          </mc:Fallback>
+        </mc:AlternateContent>
+        <mc:AlternateContent xmlns:mc="http://schemas.openxmlformats.org/markup-compatibility/2006">
+          <mc:Choice xmlns:a14="http://schemas.microsoft.com/office/drawing/2010/main" Requires="a14">
+            <p:sp>
+              <p:nvSpPr>
+                <p:cNvPr id="45" name="TextBox 44">
+                  <a:extLst>
+                    <a:ext uri="{FF2B5EF4-FFF2-40B4-BE49-F238E27FC236}">
+                      <a16:creationId xmlns:a16="http://schemas.microsoft.com/office/drawing/2014/main" id="{376B9087-B91E-4111-A311-BCCAF6943D7C}"/>
+                    </a:ext>
+                  </a:extLst>
+                </p:cNvPr>
+                <p:cNvSpPr txBox="1"/>
+                <p:nvPr/>
+              </p:nvSpPr>
+              <p:spPr>
+                <a:xfrm>
+                  <a:off x="3464847" y="2455831"/>
+                  <a:ext cx="357277" cy="277576"/>
+                </a:xfrm>
+                <a:prstGeom prst="rect">
+                  <a:avLst/>
+                </a:prstGeom>
+                <a:noFill/>
+              </p:spPr>
+              <p:txBody>
+                <a:bodyPr wrap="none" lIns="0" tIns="0" rIns="0" bIns="0" rtlCol="0">
+                  <a:spAutoFit/>
+                </a:bodyPr>
+                <a:lstStyle/>
+                <a:p>
+                  <a14:m>
+                    <m:oMathPara xmlns:m="http://schemas.openxmlformats.org/officeDocument/2006/math">
+                      <m:oMathParaPr>
+                        <m:jc m:val="centerGroup"/>
+                      </m:oMathParaPr>
+                      <m:oMath xmlns:m="http://schemas.openxmlformats.org/officeDocument/2006/math">
+                        <m:acc>
+                          <m:accPr>
+                            <m:chr m:val="̅"/>
+                            <m:ctrlPr>
+                              <a:rPr lang="en-US" b="0" i="1" smtClean="0">
+                                <a:latin typeface="Cambria Math" panose="02040503050406030204" pitchFamily="18" charset="0"/>
+                              </a:rPr>
+                            </m:ctrlPr>
+                          </m:accPr>
+                          <m:e>
+                            <m:r>
+                              <a:rPr lang="en-US" b="0" i="1" smtClean="0">
+                                <a:latin typeface="Cambria Math" panose="02040503050406030204" pitchFamily="18" charset="0"/>
+                              </a:rPr>
+                              <m:t>𝐴𝐵</m:t>
+                            </m:r>
+                          </m:e>
+                        </m:acc>
+                      </m:oMath>
+                    </m:oMathPara>
+                  </a14:m>
+                  <a:endParaRPr lang="fr-CA" dirty="0"/>
+                </a:p>
+              </p:txBody>
+            </p:sp>
+          </mc:Choice>
+          <mc:Fallback>
+            <p:sp>
+              <p:nvSpPr>
+                <p:cNvPr id="45" name="TextBox 44">
+                  <a:extLst>
+                    <a:ext uri="{FF2B5EF4-FFF2-40B4-BE49-F238E27FC236}">
+                      <a16:creationId xmlns:a16="http://schemas.microsoft.com/office/drawing/2014/main" id="{376B9087-B91E-4111-A311-BCCAF6943D7C}"/>
+                    </a:ext>
+                  </a:extLst>
+                </p:cNvPr>
+                <p:cNvSpPr txBox="1">
+                  <a:spLocks noRot="1" noChangeAspect="1" noMove="1" noResize="1" noEditPoints="1" noAdjustHandles="1" noChangeArrowheads="1" noChangeShapeType="1" noTextEdit="1"/>
+                </p:cNvSpPr>
+                <p:nvPr/>
+              </p:nvSpPr>
+              <p:spPr>
+                <a:xfrm>
+                  <a:off x="3464847" y="2455831"/>
+                  <a:ext cx="357277" cy="277576"/>
+                </a:xfrm>
+                <a:prstGeom prst="rect">
+                  <a:avLst/>
+                </a:prstGeom>
+                <a:blipFill>
+                  <a:blip r:embed="rId9"/>
+                  <a:stretch>
+                    <a:fillRect l="-15517" r="-15517" b="-8889"/>
+                  </a:stretch>
+                </a:blipFill>
+              </p:spPr>
+              <p:txBody>
+                <a:bodyPr/>
+                <a:lstStyle/>
+                <a:p>
+                  <a:r>
+                    <a:rPr lang="fr-CA">
+                      <a:noFill/>
+                    </a:rPr>
+                    <a:t> </a:t>
+                  </a:r>
+                </a:p>
+              </p:txBody>
+            </p:sp>
+          </mc:Fallback>
+        </mc:AlternateContent>
+        <mc:AlternateContent xmlns:mc="http://schemas.openxmlformats.org/markup-compatibility/2006">
+          <mc:Choice xmlns:a14="http://schemas.microsoft.com/office/drawing/2010/main" Requires="a14">
+            <p:sp>
+              <p:nvSpPr>
+                <p:cNvPr id="46" name="TextBox 45">
+                  <a:extLst>
+                    <a:ext uri="{FF2B5EF4-FFF2-40B4-BE49-F238E27FC236}">
+                      <a16:creationId xmlns:a16="http://schemas.microsoft.com/office/drawing/2014/main" id="{17FA40F7-E2E2-420E-A668-141F557D9FC8}"/>
+                    </a:ext>
+                  </a:extLst>
+                </p:cNvPr>
+                <p:cNvSpPr txBox="1"/>
+                <p:nvPr/>
+              </p:nvSpPr>
+              <p:spPr>
+                <a:xfrm>
+                  <a:off x="3084841" y="3788781"/>
+                  <a:ext cx="353174" cy="277576"/>
+                </a:xfrm>
+                <a:prstGeom prst="rect">
+                  <a:avLst/>
+                </a:prstGeom>
+                <a:noFill/>
+              </p:spPr>
+              <p:txBody>
+                <a:bodyPr wrap="none" lIns="0" tIns="0" rIns="0" bIns="0" rtlCol="0">
+                  <a:spAutoFit/>
+                </a:bodyPr>
+                <a:lstStyle/>
+                <a:p>
+                  <a14:m>
+                    <m:oMathPara xmlns:m="http://schemas.openxmlformats.org/officeDocument/2006/math">
+                      <m:oMathParaPr>
+                        <m:jc m:val="centerGroup"/>
+                      </m:oMathParaPr>
+                      <m:oMath xmlns:m="http://schemas.openxmlformats.org/officeDocument/2006/math">
+                        <m:acc>
+                          <m:accPr>
+                            <m:chr m:val="̅"/>
+                            <m:ctrlPr>
+                              <a:rPr lang="en-US" i="1" smtClean="0">
+                                <a:latin typeface="Cambria Math" panose="02040503050406030204" pitchFamily="18" charset="0"/>
+                              </a:rPr>
+                            </m:ctrlPr>
+                          </m:accPr>
+                          <m:e>
+                            <m:r>
+                              <a:rPr lang="en-US" b="0" i="1" smtClean="0">
+                                <a:latin typeface="Cambria Math" panose="02040503050406030204" pitchFamily="18" charset="0"/>
+                              </a:rPr>
+                              <m:t>𝐵</m:t>
+                            </m:r>
+                            <m:r>
+                              <a:rPr lang="en-US" i="1">
+                                <a:latin typeface="Cambria Math" panose="02040503050406030204" pitchFamily="18" charset="0"/>
+                              </a:rPr>
+                              <m:t>𝐶</m:t>
+                            </m:r>
+                          </m:e>
+                        </m:acc>
+                      </m:oMath>
+                    </m:oMathPara>
+                  </a14:m>
+                  <a:endParaRPr lang="fr-CA" dirty="0"/>
+                </a:p>
+              </p:txBody>
+            </p:sp>
+          </mc:Choice>
+          <mc:Fallback>
+            <p:sp>
+              <p:nvSpPr>
+                <p:cNvPr id="46" name="TextBox 45">
+                  <a:extLst>
+                    <a:ext uri="{FF2B5EF4-FFF2-40B4-BE49-F238E27FC236}">
+                      <a16:creationId xmlns:a16="http://schemas.microsoft.com/office/drawing/2014/main" id="{17FA40F7-E2E2-420E-A668-141F557D9FC8}"/>
+                    </a:ext>
+                  </a:extLst>
+                </p:cNvPr>
+                <p:cNvSpPr txBox="1">
+                  <a:spLocks noRot="1" noChangeAspect="1" noMove="1" noResize="1" noEditPoints="1" noAdjustHandles="1" noChangeArrowheads="1" noChangeShapeType="1" noTextEdit="1"/>
+                </p:cNvSpPr>
+                <p:nvPr/>
+              </p:nvSpPr>
+              <p:spPr>
+                <a:xfrm>
+                  <a:off x="3084841" y="3788781"/>
+                  <a:ext cx="353174" cy="277576"/>
+                </a:xfrm>
+                <a:prstGeom prst="rect">
+                  <a:avLst/>
+                </a:prstGeom>
+                <a:blipFill>
+                  <a:blip r:embed="rId10"/>
+                  <a:stretch>
+                    <a:fillRect l="-13793" r="-15517" b="-8696"/>
+                  </a:stretch>
+                </a:blipFill>
+              </p:spPr>
+              <p:txBody>
+                <a:bodyPr/>
+                <a:lstStyle/>
+                <a:p>
+                  <a:r>
+                    <a:rPr lang="fr-CA">
+                      <a:noFill/>
+                    </a:rPr>
+                    <a:t> </a:t>
+                  </a:r>
+                </a:p>
+              </p:txBody>
+            </p:sp>
+          </mc:Fallback>
+        </mc:AlternateContent>
+        <p:cxnSp>
+          <p:nvCxnSpPr>
+            <p:cNvPr id="48" name="Straight Arrow Connector 47">
+              <a:extLst>
+                <a:ext uri="{FF2B5EF4-FFF2-40B4-BE49-F238E27FC236}">
+                  <a16:creationId xmlns:a16="http://schemas.microsoft.com/office/drawing/2014/main" id="{5E25FA36-88AC-4CC6-982A-EF56EE949EB7}"/>
+                </a:ext>
+              </a:extLst>
+            </p:cNvPr>
+            <p:cNvCxnSpPr>
+              <a:cxnSpLocks/>
+            </p:cNvCxnSpPr>
+            <p:nvPr/>
+          </p:nvCxnSpPr>
+          <p:spPr>
+            <a:xfrm>
+              <a:off x="2852736" y="1823154"/>
+              <a:ext cx="388462" cy="525846"/>
+            </a:xfrm>
+            <a:prstGeom prst="straightConnector1">
+              <a:avLst/>
+            </a:prstGeom>
+            <a:ln w="19050">
+              <a:solidFill>
+                <a:schemeClr val="tx1"/>
+              </a:solidFill>
+              <a:tailEnd type="triangle"/>
+            </a:ln>
+          </p:spPr>
+          <p:style>
+            <a:lnRef idx="1">
+              <a:schemeClr val="accent1"/>
+            </a:lnRef>
+            <a:fillRef idx="0">
+              <a:schemeClr val="accent1"/>
+            </a:fillRef>
+            <a:effectRef idx="0">
+              <a:schemeClr val="accent1"/>
+            </a:effectRef>
+            <a:fontRef idx="minor">
+              <a:schemeClr val="tx1"/>
+            </a:fontRef>
+          </p:style>
+        </p:cxnSp>
+        <p:cxnSp>
+          <p:nvCxnSpPr>
+            <p:cNvPr id="50" name="Straight Arrow Connector 49">
+              <a:extLst>
+                <a:ext uri="{FF2B5EF4-FFF2-40B4-BE49-F238E27FC236}">
+                  <a16:creationId xmlns:a16="http://schemas.microsoft.com/office/drawing/2014/main" id="{70ED9DE4-1168-497F-AA42-EAA005DAFE28}"/>
+                </a:ext>
+              </a:extLst>
+            </p:cNvPr>
+            <p:cNvCxnSpPr>
+              <a:cxnSpLocks/>
+            </p:cNvCxnSpPr>
+            <p:nvPr/>
+          </p:nvCxnSpPr>
+          <p:spPr>
+            <a:xfrm flipH="1">
+              <a:off x="2675538" y="1809750"/>
+              <a:ext cx="177198" cy="566641"/>
+            </a:xfrm>
+            <a:prstGeom prst="straightConnector1">
+              <a:avLst/>
+            </a:prstGeom>
+            <a:ln w="19050">
+              <a:solidFill>
+                <a:schemeClr val="tx1"/>
+              </a:solidFill>
+              <a:tailEnd type="triangle"/>
+            </a:ln>
+          </p:spPr>
+          <p:style>
+            <a:lnRef idx="1">
+              <a:schemeClr val="accent1"/>
+            </a:lnRef>
+            <a:fillRef idx="0">
+              <a:schemeClr val="accent1"/>
+            </a:fillRef>
+            <a:effectRef idx="0">
+              <a:schemeClr val="accent1"/>
+            </a:effectRef>
+            <a:fontRef idx="minor">
+              <a:schemeClr val="tx1"/>
+            </a:fontRef>
+          </p:style>
+        </p:cxnSp>
+        <mc:AlternateContent xmlns:mc="http://schemas.openxmlformats.org/markup-compatibility/2006">
+          <mc:Choice xmlns:a14="http://schemas.microsoft.com/office/drawing/2010/main" Requires="a14">
+            <p:sp>
+              <p:nvSpPr>
+                <p:cNvPr id="55" name="TextBox 54">
+                  <a:extLst>
+                    <a:ext uri="{FF2B5EF4-FFF2-40B4-BE49-F238E27FC236}">
+                      <a16:creationId xmlns:a16="http://schemas.microsoft.com/office/drawing/2014/main" id="{DEBF08A1-2D9A-438E-8E24-86BF671A0297}"/>
+                    </a:ext>
+                  </a:extLst>
+                </p:cNvPr>
+                <p:cNvSpPr txBox="1"/>
+                <p:nvPr/>
+              </p:nvSpPr>
+              <p:spPr>
+                <a:xfrm>
+                  <a:off x="2398215" y="1991178"/>
+                  <a:ext cx="346762" cy="312458"/>
+                </a:xfrm>
+                <a:prstGeom prst="rect">
+                  <a:avLst/>
+                </a:prstGeom>
+                <a:noFill/>
+              </p:spPr>
+              <p:txBody>
+                <a:bodyPr wrap="none" lIns="0" tIns="0" rIns="0" bIns="0" rtlCol="0">
+                  <a:spAutoFit/>
+                </a:bodyPr>
+                <a:lstStyle/>
+                <a:p>
+                  <a14:m>
+                    <m:oMathPara xmlns:m="http://schemas.openxmlformats.org/officeDocument/2006/math">
+                      <m:oMathParaPr>
+                        <m:jc m:val="centerGroup"/>
+                      </m:oMathParaPr>
+                      <m:oMath xmlns:m="http://schemas.openxmlformats.org/officeDocument/2006/math">
+                        <m:acc>
+                          <m:accPr>
+                            <m:chr m:val="⃑"/>
+                            <m:ctrlPr>
+                              <a:rPr lang="en-US" i="1" smtClean="0">
+                                <a:latin typeface="Cambria Math" panose="02040503050406030204" pitchFamily="18" charset="0"/>
+                              </a:rPr>
+                            </m:ctrlPr>
+                          </m:accPr>
+                          <m:e>
+                            <m:r>
+                              <a:rPr lang="en-US" i="1">
+                                <a:latin typeface="Cambria Math" panose="02040503050406030204" pitchFamily="18" charset="0"/>
+                              </a:rPr>
+                              <m:t>𝐴𝐶</m:t>
+                            </m:r>
+                          </m:e>
+                        </m:acc>
+                      </m:oMath>
+                    </m:oMathPara>
+                  </a14:m>
+                  <a:endParaRPr lang="fr-CA" dirty="0"/>
+                </a:p>
+              </p:txBody>
+            </p:sp>
+          </mc:Choice>
+          <mc:Fallback>
+            <p:sp>
+              <p:nvSpPr>
+                <p:cNvPr id="55" name="TextBox 54">
+                  <a:extLst>
+                    <a:ext uri="{FF2B5EF4-FFF2-40B4-BE49-F238E27FC236}">
+                      <a16:creationId xmlns:a16="http://schemas.microsoft.com/office/drawing/2014/main" id="{DEBF08A1-2D9A-438E-8E24-86BF671A0297}"/>
+                    </a:ext>
+                  </a:extLst>
+                </p:cNvPr>
+                <p:cNvSpPr txBox="1">
+                  <a:spLocks noRot="1" noChangeAspect="1" noMove="1" noResize="1" noEditPoints="1" noAdjustHandles="1" noChangeArrowheads="1" noChangeShapeType="1" noTextEdit="1"/>
+                </p:cNvSpPr>
+                <p:nvPr/>
+              </p:nvSpPr>
+              <p:spPr>
+                <a:xfrm>
+                  <a:off x="2398215" y="1991178"/>
+                  <a:ext cx="346762" cy="312458"/>
+                </a:xfrm>
+                <a:prstGeom prst="rect">
+                  <a:avLst/>
+                </a:prstGeom>
+                <a:blipFill>
+                  <a:blip r:embed="rId11"/>
+                  <a:stretch>
+                    <a:fillRect l="-15789" r="-14035" b="-5769"/>
+                  </a:stretch>
+                </a:blipFill>
+              </p:spPr>
+              <p:txBody>
+                <a:bodyPr/>
+                <a:lstStyle/>
+                <a:p>
+                  <a:r>
+                    <a:rPr lang="fr-CA">
+                      <a:noFill/>
+                    </a:rPr>
+                    <a:t> </a:t>
+                  </a:r>
+                </a:p>
+              </p:txBody>
+            </p:sp>
+          </mc:Fallback>
+        </mc:AlternateContent>
+        <mc:AlternateContent xmlns:mc="http://schemas.openxmlformats.org/markup-compatibility/2006">
+          <mc:Choice xmlns:a14="http://schemas.microsoft.com/office/drawing/2010/main" Requires="a14">
+            <p:sp>
+              <p:nvSpPr>
+                <p:cNvPr id="56" name="TextBox 55">
+                  <a:extLst>
+                    <a:ext uri="{FF2B5EF4-FFF2-40B4-BE49-F238E27FC236}">
+                      <a16:creationId xmlns:a16="http://schemas.microsoft.com/office/drawing/2014/main" id="{43F03511-D5FB-4C55-8738-C07CDE84A2D4}"/>
+                    </a:ext>
+                  </a:extLst>
+                </p:cNvPr>
+                <p:cNvSpPr txBox="1"/>
+                <p:nvPr/>
+              </p:nvSpPr>
+              <p:spPr>
+                <a:xfrm>
+                  <a:off x="3122269" y="1834949"/>
+                  <a:ext cx="357277" cy="312458"/>
+                </a:xfrm>
+                <a:prstGeom prst="rect">
+                  <a:avLst/>
+                </a:prstGeom>
+                <a:noFill/>
+              </p:spPr>
+              <p:txBody>
+                <a:bodyPr wrap="none" lIns="0" tIns="0" rIns="0" bIns="0" rtlCol="0">
+                  <a:spAutoFit/>
+                </a:bodyPr>
+                <a:lstStyle/>
+                <a:p>
+                  <a14:m>
+                    <m:oMathPara xmlns:m="http://schemas.openxmlformats.org/officeDocument/2006/math">
+                      <m:oMathParaPr>
+                        <m:jc m:val="centerGroup"/>
+                      </m:oMathParaPr>
+                      <m:oMath xmlns:m="http://schemas.openxmlformats.org/officeDocument/2006/math">
+                        <m:acc>
+                          <m:accPr>
+                            <m:chr m:val="⃑"/>
+                            <m:ctrlPr>
+                              <a:rPr lang="en-US" i="1" smtClean="0">
+                                <a:latin typeface="Cambria Math" panose="02040503050406030204" pitchFamily="18" charset="0"/>
+                              </a:rPr>
+                            </m:ctrlPr>
+                          </m:accPr>
+                          <m:e>
+                            <m:r>
+                              <a:rPr lang="en-US" i="1">
+                                <a:latin typeface="Cambria Math" panose="02040503050406030204" pitchFamily="18" charset="0"/>
+                              </a:rPr>
+                              <m:t>𝐴</m:t>
+                            </m:r>
+                            <m:r>
+                              <a:rPr lang="en-US" b="0" i="1" smtClean="0">
+                                <a:latin typeface="Cambria Math" panose="02040503050406030204" pitchFamily="18" charset="0"/>
+                              </a:rPr>
+                              <m:t>𝐵</m:t>
+                            </m:r>
+                          </m:e>
+                        </m:acc>
+                      </m:oMath>
+                    </m:oMathPara>
+                  </a14:m>
+                  <a:endParaRPr lang="fr-CA" dirty="0"/>
+                </a:p>
+              </p:txBody>
+            </p:sp>
+          </mc:Choice>
+          <mc:Fallback>
+            <p:sp>
+              <p:nvSpPr>
+                <p:cNvPr id="56" name="TextBox 55">
+                  <a:extLst>
+                    <a:ext uri="{FF2B5EF4-FFF2-40B4-BE49-F238E27FC236}">
+                      <a16:creationId xmlns:a16="http://schemas.microsoft.com/office/drawing/2014/main" id="{43F03511-D5FB-4C55-8738-C07CDE84A2D4}"/>
+                    </a:ext>
+                  </a:extLst>
+                </p:cNvPr>
+                <p:cNvSpPr txBox="1">
+                  <a:spLocks noRot="1" noChangeAspect="1" noMove="1" noResize="1" noEditPoints="1" noAdjustHandles="1" noChangeArrowheads="1" noChangeShapeType="1" noTextEdit="1"/>
+                </p:cNvSpPr>
+                <p:nvPr/>
+              </p:nvSpPr>
+              <p:spPr>
+                <a:xfrm>
+                  <a:off x="3122269" y="1834949"/>
+                  <a:ext cx="357277" cy="312458"/>
+                </a:xfrm>
+                <a:prstGeom prst="rect">
+                  <a:avLst/>
+                </a:prstGeom>
+                <a:blipFill>
+                  <a:blip r:embed="rId12"/>
+                  <a:stretch>
+                    <a:fillRect l="-13559" r="-15254" b="-5882"/>
+                  </a:stretch>
+                </a:blipFill>
+              </p:spPr>
+              <p:txBody>
+                <a:bodyPr/>
+                <a:lstStyle/>
+                <a:p>
+                  <a:r>
+                    <a:rPr lang="fr-CA">
+                      <a:noFill/>
+                    </a:rPr>
+                    <a:t> </a:t>
+                  </a:r>
+                </a:p>
+              </p:txBody>
+            </p:sp>
+          </mc:Fallback>
+        </mc:AlternateContent>
+        <mc:AlternateContent xmlns:mc="http://schemas.openxmlformats.org/markup-compatibility/2006">
+          <mc:Choice xmlns:a14="http://schemas.microsoft.com/office/drawing/2010/main" Requires="a14">
+            <p:sp>
+              <p:nvSpPr>
+                <p:cNvPr id="57" name="TextBox 56">
+                  <a:extLst>
+                    <a:ext uri="{FF2B5EF4-FFF2-40B4-BE49-F238E27FC236}">
+                      <a16:creationId xmlns:a16="http://schemas.microsoft.com/office/drawing/2014/main" id="{96358972-B428-42FA-9D3D-AE7C9E4F8151}"/>
+                    </a:ext>
+                  </a:extLst>
+                </p:cNvPr>
+                <p:cNvSpPr txBox="1"/>
+                <p:nvPr/>
+              </p:nvSpPr>
+              <p:spPr>
+                <a:xfrm>
+                  <a:off x="3921035" y="3010730"/>
+                  <a:ext cx="353302" cy="312458"/>
+                </a:xfrm>
+                <a:prstGeom prst="rect">
+                  <a:avLst/>
+                </a:prstGeom>
+                <a:noFill/>
+              </p:spPr>
+              <p:txBody>
+                <a:bodyPr wrap="none" lIns="0" tIns="0" rIns="0" bIns="0" rtlCol="0">
+                  <a:spAutoFit/>
+                </a:bodyPr>
+                <a:lstStyle/>
+                <a:p>
+                  <a14:m>
+                    <m:oMathPara xmlns:m="http://schemas.openxmlformats.org/officeDocument/2006/math">
+                      <m:oMathParaPr>
+                        <m:jc m:val="centerGroup"/>
+                      </m:oMathParaPr>
+                      <m:oMath xmlns:m="http://schemas.openxmlformats.org/officeDocument/2006/math">
+                        <m:acc>
+                          <m:accPr>
+                            <m:chr m:val="⃑"/>
+                            <m:ctrlPr>
+                              <a:rPr lang="en-US" i="1" smtClean="0">
+                                <a:latin typeface="Cambria Math" panose="02040503050406030204" pitchFamily="18" charset="0"/>
+                              </a:rPr>
+                            </m:ctrlPr>
+                          </m:accPr>
+                          <m:e>
+                            <m:r>
+                              <a:rPr lang="en-US" b="0" i="1" smtClean="0">
+                                <a:latin typeface="Cambria Math" panose="02040503050406030204" pitchFamily="18" charset="0"/>
+                              </a:rPr>
+                              <m:t>𝐵𝐴</m:t>
+                            </m:r>
+                          </m:e>
+                        </m:acc>
+                      </m:oMath>
+                    </m:oMathPara>
+                  </a14:m>
+                  <a:endParaRPr lang="fr-CA" dirty="0"/>
+                </a:p>
+              </p:txBody>
+            </p:sp>
+          </mc:Choice>
+          <mc:Fallback>
+            <p:sp>
+              <p:nvSpPr>
+                <p:cNvPr id="57" name="TextBox 56">
+                  <a:extLst>
+                    <a:ext uri="{FF2B5EF4-FFF2-40B4-BE49-F238E27FC236}">
+                      <a16:creationId xmlns:a16="http://schemas.microsoft.com/office/drawing/2014/main" id="{96358972-B428-42FA-9D3D-AE7C9E4F8151}"/>
+                    </a:ext>
+                  </a:extLst>
+                </p:cNvPr>
+                <p:cNvSpPr txBox="1">
+                  <a:spLocks noRot="1" noChangeAspect="1" noMove="1" noResize="1" noEditPoints="1" noAdjustHandles="1" noChangeArrowheads="1" noChangeShapeType="1" noTextEdit="1"/>
+                </p:cNvSpPr>
+                <p:nvPr/>
+              </p:nvSpPr>
+              <p:spPr>
+                <a:xfrm>
+                  <a:off x="3921035" y="3010730"/>
+                  <a:ext cx="353302" cy="312458"/>
+                </a:xfrm>
+                <a:prstGeom prst="rect">
+                  <a:avLst/>
+                </a:prstGeom>
+                <a:blipFill>
+                  <a:blip r:embed="rId13"/>
+                  <a:stretch>
+                    <a:fillRect l="-13793" r="-17241" b="-5882"/>
+                  </a:stretch>
+                </a:blipFill>
+              </p:spPr>
+              <p:txBody>
+                <a:bodyPr/>
+                <a:lstStyle/>
+                <a:p>
+                  <a:r>
+                    <a:rPr lang="fr-CA">
+                      <a:noFill/>
+                    </a:rPr>
+                    <a:t> </a:t>
+                  </a:r>
+                </a:p>
+              </p:txBody>
+            </p:sp>
+          </mc:Fallback>
+        </mc:AlternateContent>
+        <p:cxnSp>
+          <p:nvCxnSpPr>
+            <p:cNvPr id="58" name="Straight Arrow Connector 57">
+              <a:extLst>
+                <a:ext uri="{FF2B5EF4-FFF2-40B4-BE49-F238E27FC236}">
+                  <a16:creationId xmlns:a16="http://schemas.microsoft.com/office/drawing/2014/main" id="{B20A6506-1D3C-418F-AB4C-3B26BBD6E721}"/>
+                </a:ext>
+              </a:extLst>
+            </p:cNvPr>
+            <p:cNvCxnSpPr>
+              <a:cxnSpLocks/>
+            </p:cNvCxnSpPr>
+            <p:nvPr/>
+          </p:nvCxnSpPr>
+          <p:spPr>
+            <a:xfrm flipH="1" flipV="1">
+              <a:off x="3731984" y="3051175"/>
+              <a:ext cx="276087" cy="377824"/>
+            </a:xfrm>
+            <a:prstGeom prst="straightConnector1">
+              <a:avLst/>
+            </a:prstGeom>
+            <a:ln w="19050">
+              <a:solidFill>
+                <a:schemeClr val="tx1"/>
+              </a:solidFill>
+              <a:tailEnd type="triangle"/>
+            </a:ln>
+          </p:spPr>
+          <p:style>
+            <a:lnRef idx="1">
+              <a:schemeClr val="accent1"/>
+            </a:lnRef>
+            <a:fillRef idx="0">
+              <a:schemeClr val="accent1"/>
+            </a:fillRef>
+            <a:effectRef idx="0">
+              <a:schemeClr val="accent1"/>
+            </a:effectRef>
+            <a:fontRef idx="minor">
+              <a:schemeClr val="tx1"/>
+            </a:fontRef>
+          </p:style>
+        </p:cxnSp>
+        <mc:AlternateContent xmlns:mc="http://schemas.openxmlformats.org/markup-compatibility/2006">
+          <mc:Choice xmlns:a14="http://schemas.microsoft.com/office/drawing/2010/main" Requires="a14">
+            <p:sp>
+              <p:nvSpPr>
+                <p:cNvPr id="61" name="TextBox 60">
+                  <a:extLst>
+                    <a:ext uri="{FF2B5EF4-FFF2-40B4-BE49-F238E27FC236}">
+                      <a16:creationId xmlns:a16="http://schemas.microsoft.com/office/drawing/2014/main" id="{2E6A503E-65AD-4412-84D7-57EF6A6C16E3}"/>
+                    </a:ext>
+                  </a:extLst>
+                </p:cNvPr>
+                <p:cNvSpPr txBox="1"/>
+                <p:nvPr/>
+              </p:nvSpPr>
+              <p:spPr>
+                <a:xfrm>
+                  <a:off x="3654769" y="3557926"/>
+                  <a:ext cx="353302" cy="312458"/>
+                </a:xfrm>
+                <a:prstGeom prst="rect">
+                  <a:avLst/>
+                </a:prstGeom>
+                <a:noFill/>
+              </p:spPr>
+              <p:txBody>
+                <a:bodyPr wrap="none" lIns="0" tIns="0" rIns="0" bIns="0" rtlCol="0">
+                  <a:spAutoFit/>
+                </a:bodyPr>
+                <a:lstStyle/>
+                <a:p>
+                  <a14:m>
+                    <m:oMathPara xmlns:m="http://schemas.openxmlformats.org/officeDocument/2006/math">
+                      <m:oMathParaPr>
+                        <m:jc m:val="centerGroup"/>
+                      </m:oMathParaPr>
+                      <m:oMath xmlns:m="http://schemas.openxmlformats.org/officeDocument/2006/math">
+                        <m:acc>
+                          <m:accPr>
+                            <m:chr m:val="⃑"/>
+                            <m:ctrlPr>
+                              <a:rPr lang="en-US" i="1" smtClean="0">
+                                <a:latin typeface="Cambria Math" panose="02040503050406030204" pitchFamily="18" charset="0"/>
+                              </a:rPr>
+                            </m:ctrlPr>
+                          </m:accPr>
+                          <m:e>
+                            <m:r>
+                              <a:rPr lang="en-US" b="0" i="1" smtClean="0">
+                                <a:latin typeface="Cambria Math" panose="02040503050406030204" pitchFamily="18" charset="0"/>
+                              </a:rPr>
+                              <m:t>𝐵</m:t>
+                            </m:r>
+                            <m:r>
+                              <a:rPr lang="en-US" b="0" i="1" smtClean="0">
+                                <a:latin typeface="Cambria Math" panose="02040503050406030204" pitchFamily="18" charset="0"/>
+                              </a:rPr>
+                              <m:t>𝐶</m:t>
+                            </m:r>
+                          </m:e>
+                        </m:acc>
+                      </m:oMath>
+                    </m:oMathPara>
+                  </a14:m>
+                  <a:endParaRPr lang="fr-CA" dirty="0"/>
+                </a:p>
+              </p:txBody>
+            </p:sp>
+          </mc:Choice>
+          <mc:Fallback>
+            <p:sp>
+              <p:nvSpPr>
+                <p:cNvPr id="61" name="TextBox 60">
+                  <a:extLst>
+                    <a:ext uri="{FF2B5EF4-FFF2-40B4-BE49-F238E27FC236}">
+                      <a16:creationId xmlns:a16="http://schemas.microsoft.com/office/drawing/2014/main" id="{2E6A503E-65AD-4412-84D7-57EF6A6C16E3}"/>
+                    </a:ext>
+                  </a:extLst>
+                </p:cNvPr>
+                <p:cNvSpPr txBox="1">
+                  <a:spLocks noRot="1" noChangeAspect="1" noMove="1" noResize="1" noEditPoints="1" noAdjustHandles="1" noChangeArrowheads="1" noChangeShapeType="1" noTextEdit="1"/>
+                </p:cNvSpPr>
+                <p:nvPr/>
+              </p:nvSpPr>
+              <p:spPr>
+                <a:xfrm>
+                  <a:off x="3654769" y="3557926"/>
+                  <a:ext cx="353302" cy="312458"/>
+                </a:xfrm>
+                <a:prstGeom prst="rect">
+                  <a:avLst/>
+                </a:prstGeom>
+                <a:blipFill>
+                  <a:blip r:embed="rId14"/>
+                  <a:stretch>
+                    <a:fillRect l="-15517" r="-13793" b="-5769"/>
+                  </a:stretch>
+                </a:blipFill>
+              </p:spPr>
+              <p:txBody>
+                <a:bodyPr/>
+                <a:lstStyle/>
+                <a:p>
+                  <a:r>
+                    <a:rPr lang="fr-CA">
+                      <a:noFill/>
+                    </a:rPr>
+                    <a:t> </a:t>
+                  </a:r>
+                </a:p>
+              </p:txBody>
+            </p:sp>
+          </mc:Fallback>
+        </mc:AlternateContent>
+        <p:cxnSp>
+          <p:nvCxnSpPr>
+            <p:cNvPr id="62" name="Straight Arrow Connector 61">
+              <a:extLst>
+                <a:ext uri="{FF2B5EF4-FFF2-40B4-BE49-F238E27FC236}">
+                  <a16:creationId xmlns:a16="http://schemas.microsoft.com/office/drawing/2014/main" id="{CBF1FDF7-FC3E-49A9-B59C-DA2931910042}"/>
+                </a:ext>
+              </a:extLst>
+            </p:cNvPr>
+            <p:cNvCxnSpPr>
+              <a:cxnSpLocks/>
+            </p:cNvCxnSpPr>
+            <p:nvPr/>
+          </p:nvCxnSpPr>
+          <p:spPr>
+            <a:xfrm flipH="1">
+              <a:off x="3570931" y="3426256"/>
+              <a:ext cx="444697" cy="151738"/>
+            </a:xfrm>
+            <a:prstGeom prst="straightConnector1">
+              <a:avLst/>
+            </a:prstGeom>
+            <a:ln w="19050">
+              <a:solidFill>
+                <a:schemeClr val="tx1"/>
+              </a:solidFill>
+              <a:tailEnd type="triangle"/>
+            </a:ln>
+          </p:spPr>
+          <p:style>
+            <a:lnRef idx="1">
+              <a:schemeClr val="accent1"/>
+            </a:lnRef>
+            <a:fillRef idx="0">
+              <a:schemeClr val="accent1"/>
+            </a:fillRef>
+            <a:effectRef idx="0">
+              <a:schemeClr val="accent1"/>
+            </a:effectRef>
+            <a:fontRef idx="minor">
+              <a:schemeClr val="tx1"/>
+            </a:fontRef>
+          </p:style>
+        </p:cxnSp>
+        <mc:AlternateContent xmlns:mc="http://schemas.openxmlformats.org/markup-compatibility/2006">
+          <mc:Choice xmlns:a14="http://schemas.microsoft.com/office/drawing/2010/main" Requires="a14">
+            <p:sp>
+              <p:nvSpPr>
+                <p:cNvPr id="67" name="TextBox 66">
+                  <a:extLst>
+                    <a:ext uri="{FF2B5EF4-FFF2-40B4-BE49-F238E27FC236}">
+                      <a16:creationId xmlns:a16="http://schemas.microsoft.com/office/drawing/2014/main" id="{8D4D87A2-B53B-49A4-9042-567571169E0C}"/>
+                    </a:ext>
+                  </a:extLst>
+                </p:cNvPr>
+                <p:cNvSpPr txBox="1"/>
+                <p:nvPr/>
+              </p:nvSpPr>
+              <p:spPr>
+                <a:xfrm>
+                  <a:off x="1865024" y="3519716"/>
+                  <a:ext cx="338875" cy="312458"/>
+                </a:xfrm>
+                <a:prstGeom prst="rect">
+                  <a:avLst/>
+                </a:prstGeom>
+                <a:noFill/>
+              </p:spPr>
+              <p:txBody>
+                <a:bodyPr wrap="none" lIns="0" tIns="0" rIns="0" bIns="0" rtlCol="0">
+                  <a:spAutoFit/>
+                </a:bodyPr>
+                <a:lstStyle/>
+                <a:p>
+                  <a14:m>
+                    <m:oMathPara xmlns:m="http://schemas.openxmlformats.org/officeDocument/2006/math">
+                      <m:oMathParaPr>
+                        <m:jc m:val="centerGroup"/>
+                      </m:oMathParaPr>
+                      <m:oMath xmlns:m="http://schemas.openxmlformats.org/officeDocument/2006/math">
+                        <m:acc>
+                          <m:accPr>
+                            <m:chr m:val="⃑"/>
+                            <m:ctrlPr>
+                              <a:rPr lang="en-US" i="1" smtClean="0">
+                                <a:latin typeface="Cambria Math" panose="02040503050406030204" pitchFamily="18" charset="0"/>
+                              </a:rPr>
+                            </m:ctrlPr>
+                          </m:accPr>
+                          <m:e>
+                            <m:r>
+                              <a:rPr lang="en-US" i="1">
+                                <a:latin typeface="Cambria Math" panose="02040503050406030204" pitchFamily="18" charset="0"/>
+                              </a:rPr>
+                              <m:t>𝐶</m:t>
+                            </m:r>
+                            <m:r>
+                              <a:rPr lang="en-US" b="0" i="1" smtClean="0">
+                                <a:latin typeface="Cambria Math" panose="02040503050406030204" pitchFamily="18" charset="0"/>
+                              </a:rPr>
+                              <m:t>𝐴</m:t>
+                            </m:r>
+                          </m:e>
+                        </m:acc>
+                      </m:oMath>
+                    </m:oMathPara>
+                  </a14:m>
+                  <a:endParaRPr lang="fr-CA" dirty="0"/>
+                </a:p>
+              </p:txBody>
+            </p:sp>
+          </mc:Choice>
+          <mc:Fallback>
+            <p:sp>
+              <p:nvSpPr>
+                <p:cNvPr id="67" name="TextBox 66">
+                  <a:extLst>
+                    <a:ext uri="{FF2B5EF4-FFF2-40B4-BE49-F238E27FC236}">
+                      <a16:creationId xmlns:a16="http://schemas.microsoft.com/office/drawing/2014/main" id="{8D4D87A2-B53B-49A4-9042-567571169E0C}"/>
+                    </a:ext>
+                  </a:extLst>
+                </p:cNvPr>
+                <p:cNvSpPr txBox="1">
+                  <a:spLocks noRot="1" noChangeAspect="1" noMove="1" noResize="1" noEditPoints="1" noAdjustHandles="1" noChangeArrowheads="1" noChangeShapeType="1" noTextEdit="1"/>
+                </p:cNvSpPr>
+                <p:nvPr/>
+              </p:nvSpPr>
+              <p:spPr>
+                <a:xfrm>
+                  <a:off x="1865024" y="3519716"/>
+                  <a:ext cx="338875" cy="312458"/>
+                </a:xfrm>
+                <a:prstGeom prst="rect">
+                  <a:avLst/>
+                </a:prstGeom>
+                <a:blipFill>
+                  <a:blip r:embed="rId15"/>
+                  <a:stretch>
+                    <a:fillRect l="-14286" r="-17857" b="-7843"/>
+                  </a:stretch>
+                </a:blipFill>
+              </p:spPr>
+              <p:txBody>
+                <a:bodyPr/>
+                <a:lstStyle/>
+                <a:p>
+                  <a:r>
+                    <a:rPr lang="fr-CA">
+                      <a:noFill/>
+                    </a:rPr>
+                    <a:t> </a:t>
+                  </a:r>
+                </a:p>
+              </p:txBody>
+            </p:sp>
+          </mc:Fallback>
+        </mc:AlternateContent>
+        <p:cxnSp>
+          <p:nvCxnSpPr>
+            <p:cNvPr id="68" name="Straight Arrow Connector 67">
+              <a:extLst>
+                <a:ext uri="{FF2B5EF4-FFF2-40B4-BE49-F238E27FC236}">
+                  <a16:creationId xmlns:a16="http://schemas.microsoft.com/office/drawing/2014/main" id="{8A392EA3-10D3-4094-9660-919581BD18EF}"/>
+                </a:ext>
+              </a:extLst>
+            </p:cNvPr>
+            <p:cNvCxnSpPr>
+              <a:cxnSpLocks/>
+            </p:cNvCxnSpPr>
+            <p:nvPr/>
+          </p:nvCxnSpPr>
+          <p:spPr>
+            <a:xfrm flipV="1">
+              <a:off x="2171892" y="3647873"/>
+              <a:ext cx="110438" cy="418484"/>
+            </a:xfrm>
+            <a:prstGeom prst="straightConnector1">
+              <a:avLst/>
+            </a:prstGeom>
+            <a:ln w="19050">
+              <a:solidFill>
+                <a:schemeClr val="tx1"/>
+              </a:solidFill>
+              <a:tailEnd type="triangle"/>
+            </a:ln>
+          </p:spPr>
+          <p:style>
+            <a:lnRef idx="1">
+              <a:schemeClr val="accent1"/>
+            </a:lnRef>
+            <a:fillRef idx="0">
+              <a:schemeClr val="accent1"/>
+            </a:fillRef>
+            <a:effectRef idx="0">
+              <a:schemeClr val="accent1"/>
+            </a:effectRef>
+            <a:fontRef idx="minor">
+              <a:schemeClr val="tx1"/>
+            </a:fontRef>
+          </p:style>
+        </p:cxnSp>
+        <p:cxnSp>
+          <p:nvCxnSpPr>
+            <p:cNvPr id="74" name="Straight Arrow Connector 73">
+              <a:extLst>
+                <a:ext uri="{FF2B5EF4-FFF2-40B4-BE49-F238E27FC236}">
+                  <a16:creationId xmlns:a16="http://schemas.microsoft.com/office/drawing/2014/main" id="{5AEF678B-B48F-4D9A-8C16-9143692085AE}"/>
+                </a:ext>
+              </a:extLst>
+            </p:cNvPr>
+            <p:cNvCxnSpPr>
+              <a:cxnSpLocks/>
+            </p:cNvCxnSpPr>
+            <p:nvPr/>
+          </p:nvCxnSpPr>
+          <p:spPr>
+            <a:xfrm flipV="1">
+              <a:off x="2169619" y="3922888"/>
+              <a:ext cx="410704" cy="143470"/>
+            </a:xfrm>
+            <a:prstGeom prst="straightConnector1">
+              <a:avLst/>
+            </a:prstGeom>
+            <a:ln w="19050">
+              <a:solidFill>
+                <a:schemeClr val="tx1"/>
+              </a:solidFill>
+              <a:tailEnd type="triangle"/>
+            </a:ln>
+          </p:spPr>
+          <p:style>
+            <a:lnRef idx="1">
+              <a:schemeClr val="accent1"/>
+            </a:lnRef>
+            <a:fillRef idx="0">
+              <a:schemeClr val="accent1"/>
+            </a:fillRef>
+            <a:effectRef idx="0">
+              <a:schemeClr val="accent1"/>
+            </a:effectRef>
+            <a:fontRef idx="minor">
+              <a:schemeClr val="tx1"/>
+            </a:fontRef>
+          </p:style>
+        </p:cxnSp>
+        <mc:AlternateContent xmlns:mc="http://schemas.openxmlformats.org/markup-compatibility/2006">
+          <mc:Choice xmlns:a14="http://schemas.microsoft.com/office/drawing/2010/main" Requires="a14">
+            <p:sp>
+              <p:nvSpPr>
+                <p:cNvPr id="77" name="TextBox 76">
+                  <a:extLst>
+                    <a:ext uri="{FF2B5EF4-FFF2-40B4-BE49-F238E27FC236}">
+                      <a16:creationId xmlns:a16="http://schemas.microsoft.com/office/drawing/2014/main" id="{58A22135-0E1A-4F63-A12B-BCFC9A6A9A65}"/>
+                    </a:ext>
+                  </a:extLst>
+                </p:cNvPr>
+                <p:cNvSpPr txBox="1"/>
+                <p:nvPr/>
+              </p:nvSpPr>
+              <p:spPr>
+                <a:xfrm>
+                  <a:off x="2273386" y="3983800"/>
+                  <a:ext cx="349263" cy="312458"/>
+                </a:xfrm>
+                <a:prstGeom prst="rect">
+                  <a:avLst/>
+                </a:prstGeom>
+                <a:noFill/>
+              </p:spPr>
+              <p:txBody>
+                <a:bodyPr wrap="none" lIns="0" tIns="0" rIns="0" bIns="0" rtlCol="0">
+                  <a:spAutoFit/>
+                </a:bodyPr>
+                <a:lstStyle/>
+                <a:p>
+                  <a14:m>
+                    <m:oMathPara xmlns:m="http://schemas.openxmlformats.org/officeDocument/2006/math">
+                      <m:oMathParaPr>
+                        <m:jc m:val="centerGroup"/>
+                      </m:oMathParaPr>
+                      <m:oMath xmlns:m="http://schemas.openxmlformats.org/officeDocument/2006/math">
+                        <m:acc>
+                          <m:accPr>
+                            <m:chr m:val="⃑"/>
+                            <m:ctrlPr>
+                              <a:rPr lang="en-US" i="1" smtClean="0">
+                                <a:latin typeface="Cambria Math" panose="02040503050406030204" pitchFamily="18" charset="0"/>
+                              </a:rPr>
+                            </m:ctrlPr>
+                          </m:accPr>
+                          <m:e>
+                            <m:r>
+                              <a:rPr lang="en-US" i="1">
+                                <a:latin typeface="Cambria Math" panose="02040503050406030204" pitchFamily="18" charset="0"/>
+                              </a:rPr>
+                              <m:t>𝐶</m:t>
+                            </m:r>
+                            <m:r>
+                              <a:rPr lang="en-US" b="0" i="1" smtClean="0">
+                                <a:latin typeface="Cambria Math" panose="02040503050406030204" pitchFamily="18" charset="0"/>
+                              </a:rPr>
+                              <m:t>𝐵</m:t>
+                            </m:r>
+                          </m:e>
+                        </m:acc>
+                      </m:oMath>
+                    </m:oMathPara>
+                  </a14:m>
+                  <a:endParaRPr lang="fr-CA" dirty="0"/>
+                </a:p>
+              </p:txBody>
+            </p:sp>
+          </mc:Choice>
+          <mc:Fallback>
+            <p:sp>
+              <p:nvSpPr>
+                <p:cNvPr id="77" name="TextBox 76">
+                  <a:extLst>
+                    <a:ext uri="{FF2B5EF4-FFF2-40B4-BE49-F238E27FC236}">
+                      <a16:creationId xmlns:a16="http://schemas.microsoft.com/office/drawing/2014/main" id="{58A22135-0E1A-4F63-A12B-BCFC9A6A9A65}"/>
+                    </a:ext>
+                  </a:extLst>
+                </p:cNvPr>
+                <p:cNvSpPr txBox="1">
+                  <a:spLocks noRot="1" noChangeAspect="1" noMove="1" noResize="1" noEditPoints="1" noAdjustHandles="1" noChangeArrowheads="1" noChangeShapeType="1" noTextEdit="1"/>
+                </p:cNvSpPr>
+                <p:nvPr/>
+              </p:nvSpPr>
+              <p:spPr>
+                <a:xfrm>
+                  <a:off x="2273386" y="3983800"/>
+                  <a:ext cx="349263" cy="312458"/>
+                </a:xfrm>
+                <a:prstGeom prst="rect">
+                  <a:avLst/>
+                </a:prstGeom>
+                <a:blipFill>
+                  <a:blip r:embed="rId16"/>
+                  <a:stretch>
+                    <a:fillRect l="-14035" r="-17544" b="-5769"/>
+                  </a:stretch>
+                </a:blipFill>
+              </p:spPr>
+              <p:txBody>
+                <a:bodyPr/>
+                <a:lstStyle/>
+                <a:p>
+                  <a:r>
+                    <a:rPr lang="fr-CA">
+                      <a:noFill/>
+                    </a:rPr>
+                    <a:t> </a:t>
+                  </a:r>
+                </a:p>
+              </p:txBody>
+            </p:sp>
+          </mc:Fallback>
+        </mc:AlternateContent>
+      </p:grpSp>
+    </p:spTree>
+    <p:extLst>
+      <p:ext uri="{BB962C8B-B14F-4D97-AF65-F5344CB8AC3E}">
+        <p14:creationId xmlns:p14="http://schemas.microsoft.com/office/powerpoint/2010/main" val="3438699072"/>
+      </p:ext>
+    </p:extLst>
+  </p:cSld>
+  <p:clrMapOvr>
+    <a:masterClrMapping/>
+  </p:clrMapOvr>
+</p:sld>
+</file>
+
+<file path=ppt/slides/slide5.xml><?xml version="1.0" encoding="utf-8"?>
+<p:sld xmlns:a="http://schemas.openxmlformats.org/drawingml/2006/main" xmlns:r="http://schemas.openxmlformats.org/officeDocument/2006/relationships" xmlns:p="http://schemas.openxmlformats.org/presentationml/2006/main">
+  <p:cSld>
+    <p:spTree>
+      <p:nvGrpSpPr>
+        <p:cNvPr id="1" name=""/>
+        <p:cNvGrpSpPr/>
+        <p:nvPr/>
+      </p:nvGrpSpPr>
+      <p:grpSpPr>
+        <a:xfrm>
+          <a:off x="0" y="0"/>
+          <a:ext cx="0" cy="0"/>
+          <a:chOff x="0" y="0"/>
+          <a:chExt cx="0" cy="0"/>
+        </a:xfrm>
+      </p:grpSpPr>
+      <p:sp>
+        <p:nvSpPr>
+          <p:cNvPr id="2" name="Title 1">
+            <a:extLst>
+              <a:ext uri="{FF2B5EF4-FFF2-40B4-BE49-F238E27FC236}">
+                <a16:creationId xmlns:a16="http://schemas.microsoft.com/office/drawing/2014/main" id="{D2CCAFC6-9CB2-4016-9006-9C6E7C8D48FD}"/>
+              </a:ext>
+            </a:extLst>
+          </p:cNvPr>
+          <p:cNvSpPr>
+            <a:spLocks noGrp="1"/>
+          </p:cNvSpPr>
+          <p:nvPr>
+            <p:ph type="title"/>
+          </p:nvPr>
+        </p:nvSpPr>
+        <p:spPr/>
+        <p:txBody>
+          <a:bodyPr/>
+          <a:lstStyle/>
+          <a:p>
+            <a:endParaRPr lang="fr-CA"/>
+          </a:p>
+        </p:txBody>
+      </p:sp>
+      <p:pic>
+        <p:nvPicPr>
+          <p:cNvPr id="20" name="Picture 19">
+            <a:extLst>
+              <a:ext uri="{FF2B5EF4-FFF2-40B4-BE49-F238E27FC236}">
+                <a16:creationId xmlns:a16="http://schemas.microsoft.com/office/drawing/2014/main" id="{7E5730FD-C338-4AB9-819E-E98FC6C00523}"/>
+              </a:ext>
+            </a:extLst>
+          </p:cNvPr>
+          <p:cNvPicPr>
+            <a:picLocks noChangeAspect="1"/>
+          </p:cNvPicPr>
+          <p:nvPr/>
+        </p:nvPicPr>
+        <p:blipFill>
+          <a:blip r:embed="rId2">
+            <a:extLst>
+              <a:ext uri="{BEBA8EAE-BF5A-486C-A8C5-ECC9F3942E4B}">
+                <a14:imgProps xmlns:a14="http://schemas.microsoft.com/office/drawing/2010/main">
+                  <a14:imgLayer r:embed="rId3">
+                    <a14:imgEffect>
+                      <a14:backgroundRemoval t="6863" b="89542" l="4097" r="96462">
+                        <a14:backgroundMark x1="13594" y1="37255" x2="13594" y2="37255"/>
+                        <a14:backgroundMark x1="34451" y1="34314" x2="34451" y2="34314"/>
+                        <a14:backgroundMark x1="32961" y1="34314" x2="32961" y2="34314"/>
+                        <a14:backgroundMark x1="30354" y1="34641" x2="30354" y2="34641"/>
+                        <a14:backgroundMark x1="28864" y1="34314" x2="28864" y2="34314"/>
+                        <a14:backgroundMark x1="21415" y1="37908" x2="21415" y2="37908"/>
+                        <a14:backgroundMark x1="22346" y1="38235" x2="18808" y2="36928"/>
+                        <a14:backgroundMark x1="27561" y1="34314" x2="30354" y2="33987"/>
+                        <a14:backgroundMark x1="23277" y1="38235" x2="17877" y2="37908"/>
+                        <a14:backgroundMark x1="24395" y1="38235" x2="18250" y2="37255"/>
+                        <a14:backgroundMark x1="57356" y1="31699" x2="57356" y2="31699"/>
+                        <a14:backgroundMark x1="56425" y1="31373" x2="56425" y2="31373"/>
+                        <a14:backgroundMark x1="48045" y1="29085" x2="44693" y2="26471"/>
+                      </a14:backgroundRemoval>
+                    </a14:imgEffect>
+                  </a14:imgLayer>
+                </a14:imgProps>
+              </a:ext>
+              <a:ext uri="{28A0092B-C50C-407E-A947-70E740481C1C}">
+                <a14:useLocalDpi xmlns:a14="http://schemas.microsoft.com/office/drawing/2010/main" val="0"/>
+              </a:ext>
+            </a:extLst>
+          </a:blip>
+          <a:stretch>
+            <a:fillRect/>
+          </a:stretch>
+        </p:blipFill>
+        <p:spPr>
+          <a:xfrm>
+            <a:off x="6981825" y="1585913"/>
+            <a:ext cx="5114925" cy="2914650"/>
+          </a:xfrm>
+          <a:prstGeom prst="rect">
+            <a:avLst/>
+          </a:prstGeom>
+        </p:spPr>
+      </p:pic>
+      <p:grpSp>
+        <p:nvGrpSpPr>
+          <p:cNvPr id="26" name="Group 25">
+            <a:extLst>
+              <a:ext uri="{FF2B5EF4-FFF2-40B4-BE49-F238E27FC236}">
+                <a16:creationId xmlns:a16="http://schemas.microsoft.com/office/drawing/2014/main" id="{710DD488-9615-46E4-9B45-F5F4EC644274}"/>
+              </a:ext>
+            </a:extLst>
+          </p:cNvPr>
+          <p:cNvGrpSpPr/>
+          <p:nvPr/>
+        </p:nvGrpSpPr>
+        <p:grpSpPr>
+          <a:xfrm>
+            <a:off x="4724401" y="3114336"/>
+            <a:ext cx="2438090" cy="2772454"/>
+            <a:chOff x="4257676" y="3086100"/>
+            <a:chExt cx="2438090" cy="2772454"/>
+          </a:xfrm>
+        </p:grpSpPr>
+        <p:pic>
+          <p:nvPicPr>
+            <p:cNvPr id="24" name="Picture 23">
+              <a:extLst>
+                <a:ext uri="{FF2B5EF4-FFF2-40B4-BE49-F238E27FC236}">
+                  <a16:creationId xmlns:a16="http://schemas.microsoft.com/office/drawing/2014/main" id="{69C90A49-4CA2-4520-9185-2A71E21CBB70}"/>
+                </a:ext>
+              </a:extLst>
+            </p:cNvPr>
+            <p:cNvPicPr>
+              <a:picLocks noChangeAspect="1"/>
+            </p:cNvPicPr>
+            <p:nvPr/>
+          </p:nvPicPr>
+          <p:blipFill rotWithShape="1">
+            <a:blip r:embed="rId4"/>
+            <a:srcRect t="27375"/>
+            <a:stretch/>
+          </p:blipFill>
+          <p:spPr>
+            <a:xfrm>
+              <a:off x="4257676" y="3190875"/>
+              <a:ext cx="2438090" cy="2667679"/>
+            </a:xfrm>
+            <a:prstGeom prst="rect">
+              <a:avLst/>
+            </a:prstGeom>
+          </p:spPr>
+        </p:pic>
+        <p:sp>
+          <p:nvSpPr>
+            <p:cNvPr id="25" name="Oval 24">
+              <a:extLst>
+                <a:ext uri="{FF2B5EF4-FFF2-40B4-BE49-F238E27FC236}">
+                  <a16:creationId xmlns:a16="http://schemas.microsoft.com/office/drawing/2014/main" id="{0816D996-47CD-4C66-A28C-3BC4EE0F1143}"/>
+                </a:ext>
+              </a:extLst>
+            </p:cNvPr>
+            <p:cNvSpPr/>
+            <p:nvPr/>
+          </p:nvSpPr>
+          <p:spPr>
+            <a:xfrm>
+              <a:off x="4453557" y="3086100"/>
+              <a:ext cx="470868" cy="342900"/>
+            </a:xfrm>
+            <a:prstGeom prst="ellipse">
+              <a:avLst/>
+            </a:prstGeom>
+            <a:solidFill>
+              <a:schemeClr val="bg1"/>
+            </a:solidFill>
+            <a:ln>
+              <a:solidFill>
+                <a:schemeClr val="bg1"/>
+              </a:solidFill>
+            </a:ln>
+          </p:spPr>
+          <p:style>
+            <a:lnRef idx="2">
+              <a:schemeClr val="accent1">
+                <a:shade val="50000"/>
+              </a:schemeClr>
+            </a:lnRef>
+            <a:fillRef idx="1">
+              <a:schemeClr val="accent1"/>
+            </a:fillRef>
+            <a:effectRef idx="0">
+              <a:schemeClr val="accent1"/>
+            </a:effectRef>
+            <a:fontRef idx="minor">
+              <a:schemeClr val="lt1"/>
+            </a:fontRef>
+          </p:style>
+          <p:txBody>
+            <a:bodyPr rtlCol="0" anchor="ctr"/>
+            <a:lstStyle/>
+            <a:p>
+              <a:pPr algn="ctr"/>
+              <a:endParaRPr lang="fr-CA"/>
+            </a:p>
+          </p:txBody>
+        </p:sp>
+      </p:grpSp>
+      <p:grpSp>
+        <p:nvGrpSpPr>
+          <p:cNvPr id="28" name="Group 27">
+            <a:extLst>
+              <a:ext uri="{FF2B5EF4-FFF2-40B4-BE49-F238E27FC236}">
+                <a16:creationId xmlns:a16="http://schemas.microsoft.com/office/drawing/2014/main" id="{E4684E4F-8535-44BB-83D7-9F264C90261B}"/>
+              </a:ext>
+            </a:extLst>
+          </p:cNvPr>
+          <p:cNvGrpSpPr/>
+          <p:nvPr/>
+        </p:nvGrpSpPr>
+        <p:grpSpPr>
+          <a:xfrm>
+            <a:off x="362261" y="2924175"/>
+            <a:ext cx="3990975" cy="2578893"/>
+            <a:chOff x="362261" y="2924175"/>
+            <a:chExt cx="3990975" cy="2578893"/>
+          </a:xfrm>
+        </p:grpSpPr>
+        <p:pic>
+          <p:nvPicPr>
+            <p:cNvPr id="22" name="Picture 21">
+              <a:extLst>
+                <a:ext uri="{FF2B5EF4-FFF2-40B4-BE49-F238E27FC236}">
+                  <a16:creationId xmlns:a16="http://schemas.microsoft.com/office/drawing/2014/main" id="{FFE21802-3B00-418C-B8A8-AF42C95F2824}"/>
+                </a:ext>
+              </a:extLst>
+            </p:cNvPr>
+            <p:cNvPicPr>
+              <a:picLocks noChangeAspect="1"/>
+            </p:cNvPicPr>
+            <p:nvPr/>
+          </p:nvPicPr>
+          <p:blipFill rotWithShape="1">
+            <a:blip r:embed="rId5"/>
+            <a:srcRect t="25147"/>
+            <a:stretch/>
+          </p:blipFill>
+          <p:spPr>
+            <a:xfrm>
+              <a:off x="362261" y="3086100"/>
+              <a:ext cx="3990975" cy="2416968"/>
+            </a:xfrm>
+            <a:prstGeom prst="rect">
+              <a:avLst/>
+            </a:prstGeom>
+          </p:spPr>
+        </p:pic>
+        <p:sp>
+          <p:nvSpPr>
+            <p:cNvPr id="27" name="Oval 26">
+              <a:extLst>
+                <a:ext uri="{FF2B5EF4-FFF2-40B4-BE49-F238E27FC236}">
+                  <a16:creationId xmlns:a16="http://schemas.microsoft.com/office/drawing/2014/main" id="{F7CC8339-3A1D-4A0C-9FD6-30D853D7C82A}"/>
+                </a:ext>
+              </a:extLst>
+            </p:cNvPr>
+            <p:cNvSpPr/>
+            <p:nvPr/>
+          </p:nvSpPr>
+          <p:spPr>
+            <a:xfrm>
+              <a:off x="1190625" y="2924175"/>
+              <a:ext cx="470868" cy="342900"/>
+            </a:xfrm>
+            <a:prstGeom prst="ellipse">
+              <a:avLst/>
+            </a:prstGeom>
+            <a:solidFill>
+              <a:schemeClr val="bg1"/>
+            </a:solidFill>
+            <a:ln>
+              <a:solidFill>
+                <a:schemeClr val="bg1"/>
+              </a:solidFill>
+            </a:ln>
+          </p:spPr>
+          <p:style>
+            <a:lnRef idx="2">
+              <a:schemeClr val="accent1">
+                <a:shade val="50000"/>
+              </a:schemeClr>
+            </a:lnRef>
+            <a:fillRef idx="1">
+              <a:schemeClr val="accent1"/>
+            </a:fillRef>
+            <a:effectRef idx="0">
+              <a:schemeClr val="accent1"/>
+            </a:effectRef>
+            <a:fontRef idx="minor">
+              <a:schemeClr val="lt1"/>
+            </a:fontRef>
+          </p:style>
+          <p:txBody>
+            <a:bodyPr rtlCol="0" anchor="ctr"/>
+            <a:lstStyle/>
+            <a:p>
+              <a:pPr algn="ctr"/>
+              <a:endParaRPr lang="fr-CA"/>
+            </a:p>
+          </p:txBody>
+        </p:sp>
+      </p:grpSp>
+    </p:spTree>
+    <p:extLst>
+      <p:ext uri="{BB962C8B-B14F-4D97-AF65-F5344CB8AC3E}">
+        <p14:creationId xmlns:p14="http://schemas.microsoft.com/office/powerpoint/2010/main" val="2091384622"/>
+      </p:ext>
+    </p:extLst>
+  </p:cSld>
+  <p:clrMapOvr>
+    <a:masterClrMapping/>
+  </p:clrMapOvr>
+</p:sld>
+</file>
+
+<file path=ppt/slides/slide6.xml><?xml version="1.0" encoding="utf-8"?>
+<p:sld xmlns:a="http://schemas.openxmlformats.org/drawingml/2006/main" xmlns:r="http://schemas.openxmlformats.org/officeDocument/2006/relationships" xmlns:p="http://schemas.openxmlformats.org/presentationml/2006/main">
+  <p:cSld>
+    <p:spTree>
+      <p:nvGrpSpPr>
+        <p:cNvPr id="1" name=""/>
+        <p:cNvGrpSpPr/>
+        <p:nvPr/>
+      </p:nvGrpSpPr>
+      <p:grpSpPr>
+        <a:xfrm>
+          <a:off x="0" y="0"/>
+          <a:ext cx="0" cy="0"/>
+          <a:chOff x="0" y="0"/>
+          <a:chExt cx="0" cy="0"/>
+        </a:xfrm>
+      </p:grpSpPr>
+      <p:sp>
+        <p:nvSpPr>
+          <p:cNvPr id="2" name="Title 1">
+            <a:extLst>
+              <a:ext uri="{FF2B5EF4-FFF2-40B4-BE49-F238E27FC236}">
+                <a16:creationId xmlns:a16="http://schemas.microsoft.com/office/drawing/2014/main" id="{2921B36F-4F98-4CDF-B2FA-B033F17F431C}"/>
+              </a:ext>
+            </a:extLst>
+          </p:cNvPr>
+          <p:cNvSpPr>
+            <a:spLocks noGrp="1"/>
+          </p:cNvSpPr>
+          <p:nvPr>
+            <p:ph type="title"/>
+          </p:nvPr>
+        </p:nvSpPr>
+        <p:spPr/>
+        <p:txBody>
+          <a:bodyPr/>
+          <a:lstStyle/>
+          <a:p>
+            <a:endParaRPr lang="fr-CA"/>
+          </a:p>
+        </p:txBody>
+      </p:sp>
+      <p:pic>
+        <p:nvPicPr>
+          <p:cNvPr id="1026" name="Picture 2">
+            <a:extLst>
+              <a:ext uri="{FF2B5EF4-FFF2-40B4-BE49-F238E27FC236}">
+                <a16:creationId xmlns:a16="http://schemas.microsoft.com/office/drawing/2014/main" id="{7D3F495F-4106-47A5-B9CA-46F08781111F}"/>
+              </a:ext>
+            </a:extLst>
+          </p:cNvPr>
+          <p:cNvPicPr>
+            <a:picLocks noChangeAspect="1" noChangeArrowheads="1"/>
+          </p:cNvPicPr>
+          <p:nvPr/>
+        </p:nvPicPr>
+        <p:blipFill rotWithShape="1">
+          <a:blip r:embed="rId2">
+            <a:extLst>
+              <a:ext uri="{28A0092B-C50C-407E-A947-70E740481C1C}">
+                <a14:useLocalDpi xmlns:a14="http://schemas.microsoft.com/office/drawing/2010/main" val="0"/>
+              </a:ext>
+            </a:extLst>
+          </a:blip>
+          <a:srcRect r="52625" b="11891"/>
+          <a:stretch/>
+        </p:blipFill>
+        <p:spPr bwMode="auto">
+          <a:xfrm>
+            <a:off x="2882265" y="2408873"/>
+            <a:ext cx="2337435" cy="2307907"/>
+          </a:xfrm>
+          <a:prstGeom prst="rect">
+            <a:avLst/>
+          </a:prstGeom>
+          <a:noFill/>
+          <a:extLst>
+            <a:ext uri="{909E8E84-426E-40DD-AFC4-6F175D3DCCD1}">
+              <a14:hiddenFill xmlns:a14="http://schemas.microsoft.com/office/drawing/2010/main">
+                <a:solidFill>
+                  <a:srgbClr val="FFFFFF"/>
+                </a:solidFill>
+              </a14:hiddenFill>
+            </a:ext>
+          </a:extLst>
+        </p:spPr>
+      </p:pic>
+      <p:pic>
+        <p:nvPicPr>
+          <p:cNvPr id="1028" name="Picture 4">
+            <a:extLst>
+              <a:ext uri="{FF2B5EF4-FFF2-40B4-BE49-F238E27FC236}">
+                <a16:creationId xmlns:a16="http://schemas.microsoft.com/office/drawing/2014/main" id="{146283D3-1DCA-4586-B0C4-6EF4C75A7AA7}"/>
+              </a:ext>
+            </a:extLst>
+          </p:cNvPr>
+          <p:cNvPicPr>
+            <a:picLocks noChangeAspect="1" noChangeArrowheads="1"/>
+          </p:cNvPicPr>
+          <p:nvPr/>
+        </p:nvPicPr>
+        <p:blipFill>
+          <a:blip r:embed="rId3">
+            <a:extLst>
+              <a:ext uri="{28A0092B-C50C-407E-A947-70E740481C1C}">
+                <a14:useLocalDpi xmlns:a14="http://schemas.microsoft.com/office/drawing/2010/main" val="0"/>
+              </a:ext>
+            </a:extLst>
+          </a:blip>
+          <a:srcRect/>
+          <a:stretch>
+            <a:fillRect/>
+          </a:stretch>
+        </p:blipFill>
+        <p:spPr bwMode="auto">
+          <a:xfrm>
+            <a:off x="6183630" y="2002155"/>
+            <a:ext cx="3009900" cy="3524250"/>
+          </a:xfrm>
+          <a:prstGeom prst="rect">
+            <a:avLst/>
+          </a:prstGeom>
+          <a:noFill/>
+          <a:extLst>
+            <a:ext uri="{909E8E84-426E-40DD-AFC4-6F175D3DCCD1}">
+              <a14:hiddenFill xmlns:a14="http://schemas.microsoft.com/office/drawing/2010/main">
+                <a:solidFill>
+                  <a:srgbClr val="FFFFFF"/>
+                </a:solidFill>
+              </a14:hiddenFill>
+            </a:ext>
+          </a:extLst>
+        </p:spPr>
+      </p:pic>
+    </p:spTree>
+    <p:extLst>
+      <p:ext uri="{BB962C8B-B14F-4D97-AF65-F5344CB8AC3E}">
+        <p14:creationId xmlns:p14="http://schemas.microsoft.com/office/powerpoint/2010/main" val="2043049626"/>
+      </p:ext>
+    </p:extLst>
+  </p:cSld>
+  <p:clrMapOvr>
+    <a:masterClrMapping/>
+  </p:clrMapOvr>
+</p:sld>
+</file>
+
 <file path=ppt/theme/theme1.xml><?xml version="1.0" encoding="utf-8"?>
 <a:theme xmlns:a="http://schemas.openxmlformats.org/drawingml/2006/main" name="Office Theme">
   <a:themeElements>

</xml_diff>

<commit_message>
Update Image and formula #2
</commit_message>
<xml_diff>
--- a/project presentation/images.pptx
+++ b/project presentation/images.pptx
@@ -6,11 +6,14 @@
   </p:sldMasterIdLst>
   <p:sldIdLst>
     <p:sldId id="256" r:id="rId2"/>
-    <p:sldId id="260" r:id="rId3"/>
-    <p:sldId id="261" r:id="rId4"/>
-    <p:sldId id="257" r:id="rId5"/>
-    <p:sldId id="258" r:id="rId6"/>
-    <p:sldId id="259" r:id="rId7"/>
+    <p:sldId id="264" r:id="rId3"/>
+    <p:sldId id="260" r:id="rId4"/>
+    <p:sldId id="263" r:id="rId5"/>
+    <p:sldId id="261" r:id="rId6"/>
+    <p:sldId id="257" r:id="rId7"/>
+    <p:sldId id="262" r:id="rId8"/>
+    <p:sldId id="258" r:id="rId9"/>
+    <p:sldId id="259" r:id="rId10"/>
   </p:sldIdLst>
   <p:sldSz cx="12192000" cy="6858000"/>
   <p:notesSz cx="6858000" cy="9144000"/>
@@ -266,7 +269,7 @@
           <a:p>
             <a:fld id="{F4A99819-B51D-48D4-ACF4-CC86626F7F11}" type="datetimeFigureOut">
               <a:rPr lang="en-CA" smtClean="0"/>
-              <a:t>22/03/2022</a:t>
+              <a:t>23/03/2022</a:t>
             </a:fld>
             <a:endParaRPr lang="en-CA"/>
           </a:p>
@@ -466,7 +469,7 @@
           <a:p>
             <a:fld id="{F4A99819-B51D-48D4-ACF4-CC86626F7F11}" type="datetimeFigureOut">
               <a:rPr lang="en-CA" smtClean="0"/>
-              <a:t>22/03/2022</a:t>
+              <a:t>23/03/2022</a:t>
             </a:fld>
             <a:endParaRPr lang="en-CA"/>
           </a:p>
@@ -676,7 +679,7 @@
           <a:p>
             <a:fld id="{F4A99819-B51D-48D4-ACF4-CC86626F7F11}" type="datetimeFigureOut">
               <a:rPr lang="en-CA" smtClean="0"/>
-              <a:t>22/03/2022</a:t>
+              <a:t>23/03/2022</a:t>
             </a:fld>
             <a:endParaRPr lang="en-CA"/>
           </a:p>
@@ -876,7 +879,7 @@
           <a:p>
             <a:fld id="{F4A99819-B51D-48D4-ACF4-CC86626F7F11}" type="datetimeFigureOut">
               <a:rPr lang="en-CA" smtClean="0"/>
-              <a:t>22/03/2022</a:t>
+              <a:t>23/03/2022</a:t>
             </a:fld>
             <a:endParaRPr lang="en-CA"/>
           </a:p>
@@ -1152,7 +1155,7 @@
           <a:p>
             <a:fld id="{F4A99819-B51D-48D4-ACF4-CC86626F7F11}" type="datetimeFigureOut">
               <a:rPr lang="en-CA" smtClean="0"/>
-              <a:t>22/03/2022</a:t>
+              <a:t>23/03/2022</a:t>
             </a:fld>
             <a:endParaRPr lang="en-CA"/>
           </a:p>
@@ -1420,7 +1423,7 @@
           <a:p>
             <a:fld id="{F4A99819-B51D-48D4-ACF4-CC86626F7F11}" type="datetimeFigureOut">
               <a:rPr lang="en-CA" smtClean="0"/>
-              <a:t>22/03/2022</a:t>
+              <a:t>23/03/2022</a:t>
             </a:fld>
             <a:endParaRPr lang="en-CA"/>
           </a:p>
@@ -1835,7 +1838,7 @@
           <a:p>
             <a:fld id="{F4A99819-B51D-48D4-ACF4-CC86626F7F11}" type="datetimeFigureOut">
               <a:rPr lang="en-CA" smtClean="0"/>
-              <a:t>22/03/2022</a:t>
+              <a:t>23/03/2022</a:t>
             </a:fld>
             <a:endParaRPr lang="en-CA"/>
           </a:p>
@@ -1977,7 +1980,7 @@
           <a:p>
             <a:fld id="{F4A99819-B51D-48D4-ACF4-CC86626F7F11}" type="datetimeFigureOut">
               <a:rPr lang="en-CA" smtClean="0"/>
-              <a:t>22/03/2022</a:t>
+              <a:t>23/03/2022</a:t>
             </a:fld>
             <a:endParaRPr lang="en-CA"/>
           </a:p>
@@ -2090,7 +2093,7 @@
           <a:p>
             <a:fld id="{F4A99819-B51D-48D4-ACF4-CC86626F7F11}" type="datetimeFigureOut">
               <a:rPr lang="en-CA" smtClean="0"/>
-              <a:t>22/03/2022</a:t>
+              <a:t>23/03/2022</a:t>
             </a:fld>
             <a:endParaRPr lang="en-CA"/>
           </a:p>
@@ -2403,7 +2406,7 @@
           <a:p>
             <a:fld id="{F4A99819-B51D-48D4-ACF4-CC86626F7F11}" type="datetimeFigureOut">
               <a:rPr lang="en-CA" smtClean="0"/>
-              <a:t>22/03/2022</a:t>
+              <a:t>23/03/2022</a:t>
             </a:fld>
             <a:endParaRPr lang="en-CA"/>
           </a:p>
@@ -2692,7 +2695,7 @@
           <a:p>
             <a:fld id="{F4A99819-B51D-48D4-ACF4-CC86626F7F11}" type="datetimeFigureOut">
               <a:rPr lang="en-CA" smtClean="0"/>
-              <a:t>22/03/2022</a:t>
+              <a:t>23/03/2022</a:t>
             </a:fld>
             <a:endParaRPr lang="en-CA"/>
           </a:p>
@@ -2935,7 +2938,7 @@
           <a:p>
             <a:fld id="{F4A99819-B51D-48D4-ACF4-CC86626F7F11}" type="datetimeFigureOut">
               <a:rPr lang="en-CA" smtClean="0"/>
-              <a:t>22/03/2022</a:t>
+              <a:t>23/03/2022</a:t>
             </a:fld>
             <a:endParaRPr lang="en-CA"/>
           </a:p>
@@ -3366,16 +3369,15 @@
           </p:cNvPicPr>
           <p:nvPr/>
         </p:nvPicPr>
-        <p:blipFill>
+        <p:blipFill rotWithShape="1">
           <a:blip r:embed="rId2"/>
-          <a:stretch>
-            <a:fillRect/>
-          </a:stretch>
+          <a:srcRect l="-53" t="498" r="159" b="-106"/>
+          <a:stretch/>
         </p:blipFill>
         <p:spPr>
           <a:xfrm>
-            <a:off x="2495550" y="280987"/>
-            <a:ext cx="7200900" cy="6296025"/>
+            <a:off x="2491740" y="312420"/>
+            <a:ext cx="7193280" cy="6271260"/>
           </a:xfrm>
           <a:prstGeom prst="rect">
             <a:avLst/>
@@ -3396,6 +3398,1607 @@
 </file>
 
 <file path=ppt/slides/slide2.xml><?xml version="1.0" encoding="utf-8"?>
+<p:sld xmlns:a="http://schemas.openxmlformats.org/drawingml/2006/main" xmlns:r="http://schemas.openxmlformats.org/officeDocument/2006/relationships" xmlns:p="http://schemas.openxmlformats.org/presentationml/2006/main">
+  <p:cSld>
+    <p:spTree>
+      <p:nvGrpSpPr>
+        <p:cNvPr id="1" name=""/>
+        <p:cNvGrpSpPr/>
+        <p:nvPr/>
+      </p:nvGrpSpPr>
+      <p:grpSpPr>
+        <a:xfrm>
+          <a:off x="0" y="0"/>
+          <a:ext cx="0" cy="0"/>
+          <a:chOff x="0" y="0"/>
+          <a:chExt cx="0" cy="0"/>
+        </a:xfrm>
+      </p:grpSpPr>
+      <p:grpSp>
+        <p:nvGrpSpPr>
+          <p:cNvPr id="39" name="Group 38">
+            <a:extLst>
+              <a:ext uri="{FF2B5EF4-FFF2-40B4-BE49-F238E27FC236}">
+                <a16:creationId xmlns:a16="http://schemas.microsoft.com/office/drawing/2014/main" id="{C72B6ABB-AC84-4724-AB2B-C75357E8A542}"/>
+              </a:ext>
+            </a:extLst>
+          </p:cNvPr>
+          <p:cNvGrpSpPr/>
+          <p:nvPr/>
+        </p:nvGrpSpPr>
+        <p:grpSpPr>
+          <a:xfrm>
+            <a:off x="3523376" y="511728"/>
+            <a:ext cx="3548543" cy="4186108"/>
+            <a:chOff x="3523376" y="511728"/>
+            <a:chExt cx="3548543" cy="4186108"/>
+          </a:xfrm>
+        </p:grpSpPr>
+        <p:pic>
+          <p:nvPicPr>
+            <p:cNvPr id="5" name="Picture 4">
+              <a:extLst>
+                <a:ext uri="{FF2B5EF4-FFF2-40B4-BE49-F238E27FC236}">
+                  <a16:creationId xmlns:a16="http://schemas.microsoft.com/office/drawing/2014/main" id="{A01DDA71-EC47-4173-AC01-289897180543}"/>
+                </a:ext>
+              </a:extLst>
+            </p:cNvPr>
+            <p:cNvPicPr>
+              <a:picLocks noChangeAspect="1"/>
+            </p:cNvPicPr>
+            <p:nvPr/>
+          </p:nvPicPr>
+          <p:blipFill rotWithShape="1">
+            <a:blip r:embed="rId2"/>
+            <a:srcRect l="14273" t="3664" r="36448" b="29847"/>
+            <a:stretch/>
+          </p:blipFill>
+          <p:spPr>
+            <a:xfrm>
+              <a:off x="3523376" y="511728"/>
+              <a:ext cx="3548543" cy="4186108"/>
+            </a:xfrm>
+            <a:prstGeom prst="rect">
+              <a:avLst/>
+            </a:prstGeom>
+          </p:spPr>
+        </p:pic>
+        <p:cxnSp>
+          <p:nvCxnSpPr>
+            <p:cNvPr id="3" name="Straight Arrow Connector 2">
+              <a:extLst>
+                <a:ext uri="{FF2B5EF4-FFF2-40B4-BE49-F238E27FC236}">
+                  <a16:creationId xmlns:a16="http://schemas.microsoft.com/office/drawing/2014/main" id="{687CB3E8-FD6C-4B93-83AE-45139BCD61C4}"/>
+                </a:ext>
+              </a:extLst>
+            </p:cNvPr>
+            <p:cNvCxnSpPr>
+              <a:cxnSpLocks/>
+            </p:cNvCxnSpPr>
+            <p:nvPr/>
+          </p:nvCxnSpPr>
+          <p:spPr>
+            <a:xfrm flipH="1" flipV="1">
+              <a:off x="4311941" y="2600589"/>
+              <a:ext cx="67112" cy="570451"/>
+            </a:xfrm>
+            <a:prstGeom prst="straightConnector1">
+              <a:avLst/>
+            </a:prstGeom>
+            <a:ln w="28575">
+              <a:solidFill>
+                <a:schemeClr val="accent1">
+                  <a:lumMod val="75000"/>
+                </a:schemeClr>
+              </a:solidFill>
+              <a:tailEnd type="triangle"/>
+            </a:ln>
+          </p:spPr>
+          <p:style>
+            <a:lnRef idx="1">
+              <a:schemeClr val="accent1"/>
+            </a:lnRef>
+            <a:fillRef idx="0">
+              <a:schemeClr val="accent1"/>
+            </a:fillRef>
+            <a:effectRef idx="0">
+              <a:schemeClr val="accent1"/>
+            </a:effectRef>
+            <a:fontRef idx="minor">
+              <a:schemeClr val="tx1"/>
+            </a:fontRef>
+          </p:style>
+        </p:cxnSp>
+        <p:cxnSp>
+          <p:nvCxnSpPr>
+            <p:cNvPr id="6" name="Straight Arrow Connector 5">
+              <a:extLst>
+                <a:ext uri="{FF2B5EF4-FFF2-40B4-BE49-F238E27FC236}">
+                  <a16:creationId xmlns:a16="http://schemas.microsoft.com/office/drawing/2014/main" id="{4CC00DDD-D7ED-4A96-A88D-93AC9C285A0D}"/>
+                </a:ext>
+              </a:extLst>
+            </p:cNvPr>
+            <p:cNvCxnSpPr>
+              <a:cxnSpLocks/>
+            </p:cNvCxnSpPr>
+            <p:nvPr/>
+          </p:nvCxnSpPr>
+          <p:spPr>
+            <a:xfrm flipV="1">
+              <a:off x="4379053" y="2978092"/>
+              <a:ext cx="511729" cy="192949"/>
+            </a:xfrm>
+            <a:prstGeom prst="straightConnector1">
+              <a:avLst/>
+            </a:prstGeom>
+            <a:ln w="28575">
+              <a:solidFill>
+                <a:srgbClr val="00B050"/>
+              </a:solidFill>
+              <a:tailEnd type="triangle"/>
+            </a:ln>
+          </p:spPr>
+          <p:style>
+            <a:lnRef idx="1">
+              <a:schemeClr val="accent1"/>
+            </a:lnRef>
+            <a:fillRef idx="0">
+              <a:schemeClr val="accent1"/>
+            </a:fillRef>
+            <a:effectRef idx="0">
+              <a:schemeClr val="accent1"/>
+            </a:effectRef>
+            <a:fontRef idx="minor">
+              <a:schemeClr val="tx1"/>
+            </a:fontRef>
+          </p:style>
+        </p:cxnSp>
+        <p:cxnSp>
+          <p:nvCxnSpPr>
+            <p:cNvPr id="11" name="Straight Arrow Connector 10">
+              <a:extLst>
+                <a:ext uri="{FF2B5EF4-FFF2-40B4-BE49-F238E27FC236}">
+                  <a16:creationId xmlns:a16="http://schemas.microsoft.com/office/drawing/2014/main" id="{1AA21C03-E876-4251-BB33-FDC2CEF582DD}"/>
+                </a:ext>
+              </a:extLst>
+            </p:cNvPr>
+            <p:cNvCxnSpPr>
+              <a:cxnSpLocks/>
+            </p:cNvCxnSpPr>
+            <p:nvPr/>
+          </p:nvCxnSpPr>
+          <p:spPr>
+            <a:xfrm>
+              <a:off x="4379053" y="3171041"/>
+              <a:ext cx="293615" cy="192949"/>
+            </a:xfrm>
+            <a:prstGeom prst="straightConnector1">
+              <a:avLst/>
+            </a:prstGeom>
+            <a:ln w="28575">
+              <a:solidFill>
+                <a:srgbClr val="FF0000"/>
+              </a:solidFill>
+              <a:tailEnd type="triangle"/>
+            </a:ln>
+          </p:spPr>
+          <p:style>
+            <a:lnRef idx="1">
+              <a:schemeClr val="accent1"/>
+            </a:lnRef>
+            <a:fillRef idx="0">
+              <a:schemeClr val="accent1"/>
+            </a:fillRef>
+            <a:effectRef idx="0">
+              <a:schemeClr val="accent1"/>
+            </a:effectRef>
+            <a:fontRef idx="minor">
+              <a:schemeClr val="tx1"/>
+            </a:fontRef>
+          </p:style>
+        </p:cxnSp>
+        <mc:AlternateContent xmlns:mc="http://schemas.openxmlformats.org/markup-compatibility/2006">
+          <mc:Choice xmlns:a14="http://schemas.microsoft.com/office/drawing/2010/main" Requires="a14">
+            <p:sp>
+              <p:nvSpPr>
+                <p:cNvPr id="15" name="TextBox 14">
+                  <a:extLst>
+                    <a:ext uri="{FF2B5EF4-FFF2-40B4-BE49-F238E27FC236}">
+                      <a16:creationId xmlns:a16="http://schemas.microsoft.com/office/drawing/2014/main" id="{87469F96-5EE0-46BE-81AE-E3C3E865D5AB}"/>
+                    </a:ext>
+                  </a:extLst>
+                </p:cNvPr>
+                <p:cNvSpPr txBox="1"/>
+                <p:nvPr/>
+              </p:nvSpPr>
+              <p:spPr>
+                <a:xfrm>
+                  <a:off x="4364284" y="2434804"/>
+                  <a:ext cx="334130" cy="276999"/>
+                </a:xfrm>
+                <a:prstGeom prst="rect">
+                  <a:avLst/>
+                </a:prstGeom>
+                <a:noFill/>
+              </p:spPr>
+              <p:txBody>
+                <a:bodyPr wrap="none" lIns="0" tIns="0" rIns="0" bIns="0" rtlCol="0">
+                  <a:spAutoFit/>
+                </a:bodyPr>
+                <a:lstStyle/>
+                <a:p>
+                  <a:pPr/>
+                  <a14:m>
+                    <m:oMathPara xmlns:m="http://schemas.openxmlformats.org/officeDocument/2006/math">
+                      <m:oMathParaPr>
+                        <m:jc m:val="centerGroup"/>
+                      </m:oMathParaPr>
+                      <m:oMath xmlns:m="http://schemas.openxmlformats.org/officeDocument/2006/math">
+                        <m:sSub>
+                          <m:sSubPr>
+                            <m:ctrlPr>
+                              <a:rPr lang="en-CA" i="1">
+                                <a:latin typeface="Cambria Math" panose="02040503050406030204" pitchFamily="18" charset="0"/>
+                              </a:rPr>
+                            </m:ctrlPr>
+                          </m:sSubPr>
+                          <m:e>
+                            <m:r>
+                              <a:rPr lang="en-CA" i="1">
+                                <a:latin typeface="Cambria Math" panose="02040503050406030204" pitchFamily="18" charset="0"/>
+                              </a:rPr>
+                              <m:t>𝑍</m:t>
+                            </m:r>
+                          </m:e>
+                          <m:sub>
+                            <m:r>
+                              <a:rPr lang="en-CA" i="1">
+                                <a:latin typeface="Cambria Math" panose="02040503050406030204" pitchFamily="18" charset="0"/>
+                              </a:rPr>
+                              <m:t>𝑤</m:t>
+                            </m:r>
+                          </m:sub>
+                        </m:sSub>
+                      </m:oMath>
+                    </m:oMathPara>
+                  </a14:m>
+                  <a:endParaRPr lang="fr-CA" dirty="0"/>
+                </a:p>
+              </p:txBody>
+            </p:sp>
+          </mc:Choice>
+          <mc:Fallback>
+            <p:sp>
+              <p:nvSpPr>
+                <p:cNvPr id="15" name="TextBox 14">
+                  <a:extLst>
+                    <a:ext uri="{FF2B5EF4-FFF2-40B4-BE49-F238E27FC236}">
+                      <a16:creationId xmlns:a16="http://schemas.microsoft.com/office/drawing/2014/main" id="{87469F96-5EE0-46BE-81AE-E3C3E865D5AB}"/>
+                    </a:ext>
+                  </a:extLst>
+                </p:cNvPr>
+                <p:cNvSpPr txBox="1">
+                  <a:spLocks noRot="1" noChangeAspect="1" noMove="1" noResize="1" noEditPoints="1" noAdjustHandles="1" noChangeArrowheads="1" noChangeShapeType="1" noTextEdit="1"/>
+                </p:cNvSpPr>
+                <p:nvPr/>
+              </p:nvSpPr>
+              <p:spPr>
+                <a:xfrm>
+                  <a:off x="4364284" y="2434804"/>
+                  <a:ext cx="334130" cy="276999"/>
+                </a:xfrm>
+                <a:prstGeom prst="rect">
+                  <a:avLst/>
+                </a:prstGeom>
+                <a:blipFill>
+                  <a:blip r:embed="rId3"/>
+                  <a:stretch>
+                    <a:fillRect l="-16364" r="-1818" b="-10870"/>
+                  </a:stretch>
+                </a:blipFill>
+              </p:spPr>
+              <p:txBody>
+                <a:bodyPr/>
+                <a:lstStyle/>
+                <a:p>
+                  <a:r>
+                    <a:rPr lang="fr-CA">
+                      <a:noFill/>
+                    </a:rPr>
+                    <a:t> </a:t>
+                  </a:r>
+                </a:p>
+              </p:txBody>
+            </p:sp>
+          </mc:Fallback>
+        </mc:AlternateContent>
+        <mc:AlternateContent xmlns:mc="http://schemas.openxmlformats.org/markup-compatibility/2006">
+          <mc:Choice xmlns:a14="http://schemas.microsoft.com/office/drawing/2010/main" Requires="a14">
+            <p:sp>
+              <p:nvSpPr>
+                <p:cNvPr id="16" name="TextBox 15">
+                  <a:extLst>
+                    <a:ext uri="{FF2B5EF4-FFF2-40B4-BE49-F238E27FC236}">
+                      <a16:creationId xmlns:a16="http://schemas.microsoft.com/office/drawing/2014/main" id="{4D60797D-F024-4AB8-89EA-2CA5BFB160E5}"/>
+                    </a:ext>
+                  </a:extLst>
+                </p:cNvPr>
+                <p:cNvSpPr txBox="1"/>
+                <p:nvPr/>
+              </p:nvSpPr>
+              <p:spPr>
+                <a:xfrm>
+                  <a:off x="4850846" y="2646643"/>
+                  <a:ext cx="306174" cy="276999"/>
+                </a:xfrm>
+                <a:prstGeom prst="rect">
+                  <a:avLst/>
+                </a:prstGeom>
+                <a:noFill/>
+              </p:spPr>
+              <p:txBody>
+                <a:bodyPr wrap="none" lIns="0" tIns="0" rIns="0" bIns="0" rtlCol="0">
+                  <a:spAutoFit/>
+                </a:bodyPr>
+                <a:lstStyle/>
+                <a:p>
+                  <a:pPr/>
+                  <a14:m>
+                    <m:oMathPara xmlns:m="http://schemas.openxmlformats.org/officeDocument/2006/math">
+                      <m:oMathParaPr>
+                        <m:jc m:val="centerGroup"/>
+                      </m:oMathParaPr>
+                      <m:oMath xmlns:m="http://schemas.openxmlformats.org/officeDocument/2006/math">
+                        <m:sSub>
+                          <m:sSubPr>
+                            <m:ctrlPr>
+                              <a:rPr lang="en-CA" i="1" smtClean="0">
+                                <a:latin typeface="Cambria Math" panose="02040503050406030204" pitchFamily="18" charset="0"/>
+                              </a:rPr>
+                            </m:ctrlPr>
+                          </m:sSubPr>
+                          <m:e>
+                            <m:r>
+                              <a:rPr lang="en-CA" b="0" i="1" smtClean="0">
+                                <a:latin typeface="Cambria Math" panose="02040503050406030204" pitchFamily="18" charset="0"/>
+                              </a:rPr>
+                              <m:t>𝑌</m:t>
+                            </m:r>
+                          </m:e>
+                          <m:sub>
+                            <m:r>
+                              <a:rPr lang="en-CA" i="1">
+                                <a:latin typeface="Cambria Math" panose="02040503050406030204" pitchFamily="18" charset="0"/>
+                              </a:rPr>
+                              <m:t>𝑤</m:t>
+                            </m:r>
+                          </m:sub>
+                        </m:sSub>
+                      </m:oMath>
+                    </m:oMathPara>
+                  </a14:m>
+                  <a:endParaRPr lang="fr-CA" dirty="0"/>
+                </a:p>
+              </p:txBody>
+            </p:sp>
+          </mc:Choice>
+          <mc:Fallback>
+            <p:sp>
+              <p:nvSpPr>
+                <p:cNvPr id="16" name="TextBox 15">
+                  <a:extLst>
+                    <a:ext uri="{FF2B5EF4-FFF2-40B4-BE49-F238E27FC236}">
+                      <a16:creationId xmlns:a16="http://schemas.microsoft.com/office/drawing/2014/main" id="{4D60797D-F024-4AB8-89EA-2CA5BFB160E5}"/>
+                    </a:ext>
+                  </a:extLst>
+                </p:cNvPr>
+                <p:cNvSpPr txBox="1">
+                  <a:spLocks noRot="1" noChangeAspect="1" noMove="1" noResize="1" noEditPoints="1" noAdjustHandles="1" noChangeArrowheads="1" noChangeShapeType="1" noTextEdit="1"/>
+                </p:cNvSpPr>
+                <p:nvPr/>
+              </p:nvSpPr>
+              <p:spPr>
+                <a:xfrm>
+                  <a:off x="4850846" y="2646643"/>
+                  <a:ext cx="306174" cy="276999"/>
+                </a:xfrm>
+                <a:prstGeom prst="rect">
+                  <a:avLst/>
+                </a:prstGeom>
+                <a:blipFill>
+                  <a:blip r:embed="rId4"/>
+                  <a:stretch>
+                    <a:fillRect l="-20000" r="-2000" b="-10870"/>
+                  </a:stretch>
+                </a:blipFill>
+              </p:spPr>
+              <p:txBody>
+                <a:bodyPr/>
+                <a:lstStyle/>
+                <a:p>
+                  <a:r>
+                    <a:rPr lang="fr-CA">
+                      <a:noFill/>
+                    </a:rPr>
+                    <a:t> </a:t>
+                  </a:r>
+                </a:p>
+              </p:txBody>
+            </p:sp>
+          </mc:Fallback>
+        </mc:AlternateContent>
+        <mc:AlternateContent xmlns:mc="http://schemas.openxmlformats.org/markup-compatibility/2006">
+          <mc:Choice xmlns:a14="http://schemas.microsoft.com/office/drawing/2010/main" Requires="a14">
+            <p:sp>
+              <p:nvSpPr>
+                <p:cNvPr id="17" name="TextBox 16">
+                  <a:extLst>
+                    <a:ext uri="{FF2B5EF4-FFF2-40B4-BE49-F238E27FC236}">
+                      <a16:creationId xmlns:a16="http://schemas.microsoft.com/office/drawing/2014/main" id="{4236B924-A3A3-4985-A6CE-6158DD846318}"/>
+                    </a:ext>
+                  </a:extLst>
+                </p:cNvPr>
+                <p:cNvSpPr txBox="1"/>
+                <p:nvPr/>
+              </p:nvSpPr>
+              <p:spPr>
+                <a:xfrm>
+                  <a:off x="4396224" y="3298830"/>
+                  <a:ext cx="343556" cy="276999"/>
+                </a:xfrm>
+                <a:prstGeom prst="rect">
+                  <a:avLst/>
+                </a:prstGeom>
+                <a:noFill/>
+              </p:spPr>
+              <p:txBody>
+                <a:bodyPr wrap="none" lIns="0" tIns="0" rIns="0" bIns="0" rtlCol="0">
+                  <a:spAutoFit/>
+                </a:bodyPr>
+                <a:lstStyle/>
+                <a:p>
+                  <a:pPr/>
+                  <a14:m>
+                    <m:oMathPara xmlns:m="http://schemas.openxmlformats.org/officeDocument/2006/math">
+                      <m:oMathParaPr>
+                        <m:jc m:val="centerGroup"/>
+                      </m:oMathParaPr>
+                      <m:oMath xmlns:m="http://schemas.openxmlformats.org/officeDocument/2006/math">
+                        <m:sSub>
+                          <m:sSubPr>
+                            <m:ctrlPr>
+                              <a:rPr lang="en-CA" i="1" smtClean="0">
+                                <a:latin typeface="Cambria Math" panose="02040503050406030204" pitchFamily="18" charset="0"/>
+                              </a:rPr>
+                            </m:ctrlPr>
+                          </m:sSubPr>
+                          <m:e>
+                            <m:r>
+                              <a:rPr lang="en-CA" b="0" i="1" smtClean="0">
+                                <a:latin typeface="Cambria Math" panose="02040503050406030204" pitchFamily="18" charset="0"/>
+                              </a:rPr>
+                              <m:t>𝑋</m:t>
+                            </m:r>
+                          </m:e>
+                          <m:sub>
+                            <m:r>
+                              <a:rPr lang="en-CA" i="1">
+                                <a:latin typeface="Cambria Math" panose="02040503050406030204" pitchFamily="18" charset="0"/>
+                              </a:rPr>
+                              <m:t>𝑤</m:t>
+                            </m:r>
+                          </m:sub>
+                        </m:sSub>
+                      </m:oMath>
+                    </m:oMathPara>
+                  </a14:m>
+                  <a:endParaRPr lang="fr-CA" dirty="0"/>
+                </a:p>
+              </p:txBody>
+            </p:sp>
+          </mc:Choice>
+          <mc:Fallback>
+            <p:sp>
+              <p:nvSpPr>
+                <p:cNvPr id="17" name="TextBox 16">
+                  <a:extLst>
+                    <a:ext uri="{FF2B5EF4-FFF2-40B4-BE49-F238E27FC236}">
+                      <a16:creationId xmlns:a16="http://schemas.microsoft.com/office/drawing/2014/main" id="{4236B924-A3A3-4985-A6CE-6158DD846318}"/>
+                    </a:ext>
+                  </a:extLst>
+                </p:cNvPr>
+                <p:cNvSpPr txBox="1">
+                  <a:spLocks noRot="1" noChangeAspect="1" noMove="1" noResize="1" noEditPoints="1" noAdjustHandles="1" noChangeArrowheads="1" noChangeShapeType="1" noTextEdit="1"/>
+                </p:cNvSpPr>
+                <p:nvPr/>
+              </p:nvSpPr>
+              <p:spPr>
+                <a:xfrm>
+                  <a:off x="4396224" y="3298830"/>
+                  <a:ext cx="343556" cy="276999"/>
+                </a:xfrm>
+                <a:prstGeom prst="rect">
+                  <a:avLst/>
+                </a:prstGeom>
+                <a:blipFill>
+                  <a:blip r:embed="rId5"/>
+                  <a:stretch>
+                    <a:fillRect l="-14035" r="-1754" b="-10870"/>
+                  </a:stretch>
+                </a:blipFill>
+              </p:spPr>
+              <p:txBody>
+                <a:bodyPr/>
+                <a:lstStyle/>
+                <a:p>
+                  <a:r>
+                    <a:rPr lang="fr-CA">
+                      <a:noFill/>
+                    </a:rPr>
+                    <a:t> </a:t>
+                  </a:r>
+                </a:p>
+              </p:txBody>
+            </p:sp>
+          </mc:Fallback>
+        </mc:AlternateContent>
+        <p:cxnSp>
+          <p:nvCxnSpPr>
+            <p:cNvPr id="18" name="Straight Arrow Connector 17">
+              <a:extLst>
+                <a:ext uri="{FF2B5EF4-FFF2-40B4-BE49-F238E27FC236}">
+                  <a16:creationId xmlns:a16="http://schemas.microsoft.com/office/drawing/2014/main" id="{00AECDEF-A006-4F77-A6FE-92277BC5C68D}"/>
+                </a:ext>
+              </a:extLst>
+            </p:cNvPr>
+            <p:cNvCxnSpPr>
+              <a:cxnSpLocks/>
+            </p:cNvCxnSpPr>
+            <p:nvPr/>
+          </p:nvCxnSpPr>
+          <p:spPr>
+            <a:xfrm>
+              <a:off x="5135423" y="3611746"/>
+              <a:ext cx="322130" cy="220088"/>
+            </a:xfrm>
+            <a:prstGeom prst="straightConnector1">
+              <a:avLst/>
+            </a:prstGeom>
+            <a:ln w="28575">
+              <a:solidFill>
+                <a:schemeClr val="accent1">
+                  <a:lumMod val="75000"/>
+                </a:schemeClr>
+              </a:solidFill>
+              <a:tailEnd type="triangle"/>
+            </a:ln>
+          </p:spPr>
+          <p:style>
+            <a:lnRef idx="1">
+              <a:schemeClr val="accent1"/>
+            </a:lnRef>
+            <a:fillRef idx="0">
+              <a:schemeClr val="accent1"/>
+            </a:fillRef>
+            <a:effectRef idx="0">
+              <a:schemeClr val="accent1"/>
+            </a:effectRef>
+            <a:fontRef idx="minor">
+              <a:schemeClr val="tx1"/>
+            </a:fontRef>
+          </p:style>
+        </p:cxnSp>
+        <p:cxnSp>
+          <p:nvCxnSpPr>
+            <p:cNvPr id="19" name="Straight Arrow Connector 18">
+              <a:extLst>
+                <a:ext uri="{FF2B5EF4-FFF2-40B4-BE49-F238E27FC236}">
+                  <a16:creationId xmlns:a16="http://schemas.microsoft.com/office/drawing/2014/main" id="{9111D38A-36A0-4A20-A548-615821157D35}"/>
+                </a:ext>
+              </a:extLst>
+            </p:cNvPr>
+            <p:cNvCxnSpPr>
+              <a:cxnSpLocks/>
+            </p:cNvCxnSpPr>
+            <p:nvPr/>
+          </p:nvCxnSpPr>
+          <p:spPr>
+            <a:xfrm>
+              <a:off x="5157020" y="3626284"/>
+              <a:ext cx="0" cy="372503"/>
+            </a:xfrm>
+            <a:prstGeom prst="straightConnector1">
+              <a:avLst/>
+            </a:prstGeom>
+            <a:ln w="28575">
+              <a:solidFill>
+                <a:srgbClr val="00B050"/>
+              </a:solidFill>
+              <a:tailEnd type="triangle"/>
+            </a:ln>
+          </p:spPr>
+          <p:style>
+            <a:lnRef idx="1">
+              <a:schemeClr val="accent1"/>
+            </a:lnRef>
+            <a:fillRef idx="0">
+              <a:schemeClr val="accent1"/>
+            </a:fillRef>
+            <a:effectRef idx="0">
+              <a:schemeClr val="accent1"/>
+            </a:effectRef>
+            <a:fontRef idx="minor">
+              <a:schemeClr val="tx1"/>
+            </a:fontRef>
+          </p:style>
+        </p:cxnSp>
+        <p:cxnSp>
+          <p:nvCxnSpPr>
+            <p:cNvPr id="20" name="Straight Arrow Connector 19">
+              <a:extLst>
+                <a:ext uri="{FF2B5EF4-FFF2-40B4-BE49-F238E27FC236}">
+                  <a16:creationId xmlns:a16="http://schemas.microsoft.com/office/drawing/2014/main" id="{B1629D65-2EA0-4ECD-95B7-0D4C6818AA9E}"/>
+                </a:ext>
+              </a:extLst>
+            </p:cNvPr>
+            <p:cNvCxnSpPr>
+              <a:cxnSpLocks/>
+            </p:cNvCxnSpPr>
+            <p:nvPr/>
+          </p:nvCxnSpPr>
+          <p:spPr>
+            <a:xfrm flipH="1">
+              <a:off x="4859725" y="3626284"/>
+              <a:ext cx="297295" cy="138498"/>
+            </a:xfrm>
+            <a:prstGeom prst="straightConnector1">
+              <a:avLst/>
+            </a:prstGeom>
+            <a:ln w="28575">
+              <a:solidFill>
+                <a:srgbClr val="FF0000"/>
+              </a:solidFill>
+              <a:tailEnd type="triangle"/>
+            </a:ln>
+          </p:spPr>
+          <p:style>
+            <a:lnRef idx="1">
+              <a:schemeClr val="accent1"/>
+            </a:lnRef>
+            <a:fillRef idx="0">
+              <a:schemeClr val="accent1"/>
+            </a:fillRef>
+            <a:effectRef idx="0">
+              <a:schemeClr val="accent1"/>
+            </a:effectRef>
+            <a:fontRef idx="minor">
+              <a:schemeClr val="tx1"/>
+            </a:fontRef>
+          </p:style>
+        </p:cxnSp>
+        <p:cxnSp>
+          <p:nvCxnSpPr>
+            <p:cNvPr id="25" name="Straight Arrow Connector 24">
+              <a:extLst>
+                <a:ext uri="{FF2B5EF4-FFF2-40B4-BE49-F238E27FC236}">
+                  <a16:creationId xmlns:a16="http://schemas.microsoft.com/office/drawing/2014/main" id="{86541ABC-D80F-4AC6-A8AF-B59F90E31FAA}"/>
+                </a:ext>
+              </a:extLst>
+            </p:cNvPr>
+            <p:cNvCxnSpPr>
+              <a:cxnSpLocks/>
+            </p:cNvCxnSpPr>
+            <p:nvPr/>
+          </p:nvCxnSpPr>
+          <p:spPr>
+            <a:xfrm>
+              <a:off x="5208425" y="1034971"/>
+              <a:ext cx="322130" cy="220088"/>
+            </a:xfrm>
+            <a:prstGeom prst="straightConnector1">
+              <a:avLst/>
+            </a:prstGeom>
+            <a:ln w="28575">
+              <a:solidFill>
+                <a:srgbClr val="FF0000"/>
+              </a:solidFill>
+              <a:tailEnd type="triangle"/>
+            </a:ln>
+          </p:spPr>
+          <p:style>
+            <a:lnRef idx="1">
+              <a:schemeClr val="accent1"/>
+            </a:lnRef>
+            <a:fillRef idx="0">
+              <a:schemeClr val="accent1"/>
+            </a:fillRef>
+            <a:effectRef idx="0">
+              <a:schemeClr val="accent1"/>
+            </a:effectRef>
+            <a:fontRef idx="minor">
+              <a:schemeClr val="tx1"/>
+            </a:fontRef>
+          </p:style>
+        </p:cxnSp>
+        <p:cxnSp>
+          <p:nvCxnSpPr>
+            <p:cNvPr id="26" name="Straight Arrow Connector 25">
+              <a:extLst>
+                <a:ext uri="{FF2B5EF4-FFF2-40B4-BE49-F238E27FC236}">
+                  <a16:creationId xmlns:a16="http://schemas.microsoft.com/office/drawing/2014/main" id="{AD7459D9-7FFC-4824-9577-F5D6B6EA2AD6}"/>
+                </a:ext>
+              </a:extLst>
+            </p:cNvPr>
+            <p:cNvCxnSpPr>
+              <a:cxnSpLocks/>
+            </p:cNvCxnSpPr>
+            <p:nvPr/>
+          </p:nvCxnSpPr>
+          <p:spPr>
+            <a:xfrm>
+              <a:off x="5230022" y="1049509"/>
+              <a:ext cx="0" cy="372503"/>
+            </a:xfrm>
+            <a:prstGeom prst="straightConnector1">
+              <a:avLst/>
+            </a:prstGeom>
+            <a:ln w="28575">
+              <a:solidFill>
+                <a:schemeClr val="accent1">
+                  <a:lumMod val="75000"/>
+                </a:schemeClr>
+              </a:solidFill>
+              <a:tailEnd type="triangle"/>
+            </a:ln>
+          </p:spPr>
+          <p:style>
+            <a:lnRef idx="1">
+              <a:schemeClr val="accent1"/>
+            </a:lnRef>
+            <a:fillRef idx="0">
+              <a:schemeClr val="accent1"/>
+            </a:fillRef>
+            <a:effectRef idx="0">
+              <a:schemeClr val="accent1"/>
+            </a:effectRef>
+            <a:fontRef idx="minor">
+              <a:schemeClr val="tx1"/>
+            </a:fontRef>
+          </p:style>
+        </p:cxnSp>
+        <p:cxnSp>
+          <p:nvCxnSpPr>
+            <p:cNvPr id="27" name="Straight Arrow Connector 26">
+              <a:extLst>
+                <a:ext uri="{FF2B5EF4-FFF2-40B4-BE49-F238E27FC236}">
+                  <a16:creationId xmlns:a16="http://schemas.microsoft.com/office/drawing/2014/main" id="{632A5BF5-D167-4DC1-8341-33E14F66A200}"/>
+                </a:ext>
+              </a:extLst>
+            </p:cNvPr>
+            <p:cNvCxnSpPr>
+              <a:cxnSpLocks/>
+            </p:cNvCxnSpPr>
+            <p:nvPr/>
+          </p:nvCxnSpPr>
+          <p:spPr>
+            <a:xfrm flipH="1">
+              <a:off x="4907893" y="1049510"/>
+              <a:ext cx="322130" cy="124949"/>
+            </a:xfrm>
+            <a:prstGeom prst="straightConnector1">
+              <a:avLst/>
+            </a:prstGeom>
+            <a:ln w="28575">
+              <a:solidFill>
+                <a:srgbClr val="00B050"/>
+              </a:solidFill>
+              <a:tailEnd type="triangle"/>
+            </a:ln>
+          </p:spPr>
+          <p:style>
+            <a:lnRef idx="1">
+              <a:schemeClr val="accent1"/>
+            </a:lnRef>
+            <a:fillRef idx="0">
+              <a:schemeClr val="accent1"/>
+            </a:fillRef>
+            <a:effectRef idx="0">
+              <a:schemeClr val="accent1"/>
+            </a:effectRef>
+            <a:fontRef idx="minor">
+              <a:schemeClr val="tx1"/>
+            </a:fontRef>
+          </p:style>
+        </p:cxnSp>
+        <mc:AlternateContent xmlns:mc="http://schemas.openxmlformats.org/markup-compatibility/2006">
+          <mc:Choice xmlns:a14="http://schemas.microsoft.com/office/drawing/2010/main" Requires="a14">
+            <p:sp>
+              <p:nvSpPr>
+                <p:cNvPr id="32" name="TextBox 31">
+                  <a:extLst>
+                    <a:ext uri="{FF2B5EF4-FFF2-40B4-BE49-F238E27FC236}">
+                      <a16:creationId xmlns:a16="http://schemas.microsoft.com/office/drawing/2014/main" id="{41FE93DE-DC56-4EE8-9E9A-80BE3E7B76B8}"/>
+                    </a:ext>
+                  </a:extLst>
+                </p:cNvPr>
+                <p:cNvSpPr txBox="1"/>
+                <p:nvPr/>
+              </p:nvSpPr>
+              <p:spPr>
+                <a:xfrm>
+                  <a:off x="5552152" y="1084580"/>
+                  <a:ext cx="603883" cy="232051"/>
+                </a:xfrm>
+                <a:prstGeom prst="rect">
+                  <a:avLst/>
+                </a:prstGeom>
+                <a:noFill/>
+              </p:spPr>
+              <p:txBody>
+                <a:bodyPr wrap="none" lIns="0" tIns="0" rIns="0" bIns="0" rtlCol="0">
+                  <a:spAutoFit/>
+                </a:bodyPr>
+                <a:lstStyle/>
+                <a:p>
+                  <a:pPr/>
+                  <a14:m>
+                    <m:oMathPara xmlns:m="http://schemas.openxmlformats.org/officeDocument/2006/math">
+                      <m:oMathParaPr>
+                        <m:jc m:val="centerGroup"/>
+                      </m:oMathParaPr>
+                      <m:oMath xmlns:m="http://schemas.openxmlformats.org/officeDocument/2006/math">
+                        <m:sSub>
+                          <m:sSubPr>
+                            <m:ctrlPr>
+                              <a:rPr lang="en-CA" sz="1400" i="1" smtClean="0">
+                                <a:latin typeface="Cambria Math" panose="02040503050406030204" pitchFamily="18" charset="0"/>
+                              </a:rPr>
+                            </m:ctrlPr>
+                          </m:sSubPr>
+                          <m:e>
+                            <m:r>
+                              <a:rPr lang="en-CA" sz="1400" b="0" i="1" smtClean="0">
+                                <a:latin typeface="Cambria Math" panose="02040503050406030204" pitchFamily="18" charset="0"/>
+                              </a:rPr>
+                              <m:t>𝑋</m:t>
+                            </m:r>
+                          </m:e>
+                          <m:sub>
+                            <m:r>
+                              <a:rPr lang="en-CA" sz="1400" b="0" i="1" smtClean="0">
+                                <a:latin typeface="Cambria Math" panose="02040503050406030204" pitchFamily="18" charset="0"/>
+                              </a:rPr>
+                              <m:t>𝑞𝑐</m:t>
+                            </m:r>
+                            <m:r>
+                              <a:rPr lang="en-CA" sz="1400" b="0" i="1" smtClean="0">
+                                <a:latin typeface="Cambria Math" panose="02040503050406030204" pitchFamily="18" charset="0"/>
+                              </a:rPr>
+                              <m:t> </m:t>
+                            </m:r>
+                            <m:r>
+                              <a:rPr lang="en-CA" sz="1400" b="0" i="1" smtClean="0">
+                                <a:latin typeface="Cambria Math" panose="02040503050406030204" pitchFamily="18" charset="0"/>
+                              </a:rPr>
+                              <m:t>𝑐𝑎𝑚</m:t>
+                            </m:r>
+                          </m:sub>
+                        </m:sSub>
+                      </m:oMath>
+                    </m:oMathPara>
+                  </a14:m>
+                  <a:endParaRPr lang="fr-CA" dirty="0"/>
+                </a:p>
+              </p:txBody>
+            </p:sp>
+          </mc:Choice>
+          <mc:Fallback>
+            <p:sp>
+              <p:nvSpPr>
+                <p:cNvPr id="32" name="TextBox 31">
+                  <a:extLst>
+                    <a:ext uri="{FF2B5EF4-FFF2-40B4-BE49-F238E27FC236}">
+                      <a16:creationId xmlns:a16="http://schemas.microsoft.com/office/drawing/2014/main" id="{41FE93DE-DC56-4EE8-9E9A-80BE3E7B76B8}"/>
+                    </a:ext>
+                  </a:extLst>
+                </p:cNvPr>
+                <p:cNvSpPr txBox="1">
+                  <a:spLocks noRot="1" noChangeAspect="1" noMove="1" noResize="1" noEditPoints="1" noAdjustHandles="1" noChangeArrowheads="1" noChangeShapeType="1" noTextEdit="1"/>
+                </p:cNvSpPr>
+                <p:nvPr/>
+              </p:nvSpPr>
+              <p:spPr>
+                <a:xfrm>
+                  <a:off x="5552152" y="1084580"/>
+                  <a:ext cx="603883" cy="232051"/>
+                </a:xfrm>
+                <a:prstGeom prst="rect">
+                  <a:avLst/>
+                </a:prstGeom>
+                <a:blipFill>
+                  <a:blip r:embed="rId6"/>
+                  <a:stretch>
+                    <a:fillRect l="-6061" r="-1010" b="-18421"/>
+                  </a:stretch>
+                </a:blipFill>
+              </p:spPr>
+              <p:txBody>
+                <a:bodyPr/>
+                <a:lstStyle/>
+                <a:p>
+                  <a:r>
+                    <a:rPr lang="fr-CA">
+                      <a:noFill/>
+                    </a:rPr>
+                    <a:t> </a:t>
+                  </a:r>
+                </a:p>
+              </p:txBody>
+            </p:sp>
+          </mc:Fallback>
+        </mc:AlternateContent>
+        <mc:AlternateContent xmlns:mc="http://schemas.openxmlformats.org/markup-compatibility/2006">
+          <mc:Choice xmlns:a14="http://schemas.microsoft.com/office/drawing/2010/main" Requires="a14">
+            <p:sp>
+              <p:nvSpPr>
+                <p:cNvPr id="33" name="TextBox 32">
+                  <a:extLst>
+                    <a:ext uri="{FF2B5EF4-FFF2-40B4-BE49-F238E27FC236}">
+                      <a16:creationId xmlns:a16="http://schemas.microsoft.com/office/drawing/2014/main" id="{13ED934C-0B17-464A-A077-69961F460D5E}"/>
+                    </a:ext>
+                  </a:extLst>
+                </p:cNvPr>
+                <p:cNvSpPr txBox="1"/>
+                <p:nvPr/>
+              </p:nvSpPr>
+              <p:spPr>
+                <a:xfrm>
+                  <a:off x="4618973" y="1076295"/>
+                  <a:ext cx="574324" cy="232051"/>
+                </a:xfrm>
+                <a:prstGeom prst="rect">
+                  <a:avLst/>
+                </a:prstGeom>
+                <a:noFill/>
+              </p:spPr>
+              <p:txBody>
+                <a:bodyPr wrap="none" lIns="0" tIns="0" rIns="0" bIns="0" rtlCol="0">
+                  <a:spAutoFit/>
+                </a:bodyPr>
+                <a:lstStyle/>
+                <a:p>
+                  <a:pPr/>
+                  <a14:m>
+                    <m:oMathPara xmlns:m="http://schemas.openxmlformats.org/officeDocument/2006/math">
+                      <m:oMathParaPr>
+                        <m:jc m:val="centerGroup"/>
+                      </m:oMathParaPr>
+                      <m:oMath xmlns:m="http://schemas.openxmlformats.org/officeDocument/2006/math">
+                        <m:sSub>
+                          <m:sSubPr>
+                            <m:ctrlPr>
+                              <a:rPr lang="en-CA" sz="1400" i="1" smtClean="0">
+                                <a:latin typeface="Cambria Math" panose="02040503050406030204" pitchFamily="18" charset="0"/>
+                              </a:rPr>
+                            </m:ctrlPr>
+                          </m:sSubPr>
+                          <m:e>
+                            <m:r>
+                              <a:rPr lang="en-CA" sz="1400" b="0" i="1" smtClean="0">
+                                <a:latin typeface="Cambria Math" panose="02040503050406030204" pitchFamily="18" charset="0"/>
+                              </a:rPr>
+                              <m:t>𝑌</m:t>
+                            </m:r>
+                          </m:e>
+                          <m:sub>
+                            <m:r>
+                              <a:rPr lang="en-CA" sz="1400" b="0" i="1" smtClean="0">
+                                <a:latin typeface="Cambria Math" panose="02040503050406030204" pitchFamily="18" charset="0"/>
+                              </a:rPr>
+                              <m:t>𝑞𝑐</m:t>
+                            </m:r>
+                            <m:r>
+                              <a:rPr lang="en-CA" sz="1400" b="0" i="1" smtClean="0">
+                                <a:latin typeface="Cambria Math" panose="02040503050406030204" pitchFamily="18" charset="0"/>
+                              </a:rPr>
+                              <m:t> </m:t>
+                            </m:r>
+                            <m:r>
+                              <a:rPr lang="en-CA" sz="1400" i="1">
+                                <a:latin typeface="Cambria Math" panose="02040503050406030204" pitchFamily="18" charset="0"/>
+                              </a:rPr>
+                              <m:t>𝑐𝑎𝑚</m:t>
+                            </m:r>
+                          </m:sub>
+                        </m:sSub>
+                      </m:oMath>
+                    </m:oMathPara>
+                  </a14:m>
+                  <a:endParaRPr lang="fr-CA" dirty="0"/>
+                </a:p>
+              </p:txBody>
+            </p:sp>
+          </mc:Choice>
+          <mc:Fallback>
+            <p:sp>
+              <p:nvSpPr>
+                <p:cNvPr id="33" name="TextBox 32">
+                  <a:extLst>
+                    <a:ext uri="{FF2B5EF4-FFF2-40B4-BE49-F238E27FC236}">
+                      <a16:creationId xmlns:a16="http://schemas.microsoft.com/office/drawing/2014/main" id="{13ED934C-0B17-464A-A077-69961F460D5E}"/>
+                    </a:ext>
+                  </a:extLst>
+                </p:cNvPr>
+                <p:cNvSpPr txBox="1">
+                  <a:spLocks noRot="1" noChangeAspect="1" noMove="1" noResize="1" noEditPoints="1" noAdjustHandles="1" noChangeArrowheads="1" noChangeShapeType="1" noTextEdit="1"/>
+                </p:cNvSpPr>
+                <p:nvPr/>
+              </p:nvSpPr>
+              <p:spPr>
+                <a:xfrm>
+                  <a:off x="4618973" y="1076295"/>
+                  <a:ext cx="574324" cy="232051"/>
+                </a:xfrm>
+                <a:prstGeom prst="rect">
+                  <a:avLst/>
+                </a:prstGeom>
+                <a:blipFill>
+                  <a:blip r:embed="rId7"/>
+                  <a:stretch>
+                    <a:fillRect l="-6383" b="-18421"/>
+                  </a:stretch>
+                </a:blipFill>
+              </p:spPr>
+              <p:txBody>
+                <a:bodyPr/>
+                <a:lstStyle/>
+                <a:p>
+                  <a:r>
+                    <a:rPr lang="fr-CA">
+                      <a:noFill/>
+                    </a:rPr>
+                    <a:t> </a:t>
+                  </a:r>
+                </a:p>
+              </p:txBody>
+            </p:sp>
+          </mc:Fallback>
+        </mc:AlternateContent>
+        <mc:AlternateContent xmlns:mc="http://schemas.openxmlformats.org/markup-compatibility/2006">
+          <mc:Choice xmlns:a14="http://schemas.microsoft.com/office/drawing/2010/main" Requires="a14">
+            <p:sp>
+              <p:nvSpPr>
+                <p:cNvPr id="34" name="TextBox 33">
+                  <a:extLst>
+                    <a:ext uri="{FF2B5EF4-FFF2-40B4-BE49-F238E27FC236}">
+                      <a16:creationId xmlns:a16="http://schemas.microsoft.com/office/drawing/2014/main" id="{0E85C2AE-89C0-4221-95FA-2F03EB001C36}"/>
+                    </a:ext>
+                  </a:extLst>
+                </p:cNvPr>
+                <p:cNvSpPr txBox="1"/>
+                <p:nvPr/>
+              </p:nvSpPr>
+              <p:spPr>
+                <a:xfrm>
+                  <a:off x="5176894" y="1381136"/>
+                  <a:ext cx="596894" cy="232051"/>
+                </a:xfrm>
+                <a:prstGeom prst="rect">
+                  <a:avLst/>
+                </a:prstGeom>
+                <a:noFill/>
+              </p:spPr>
+              <p:txBody>
+                <a:bodyPr wrap="none" lIns="0" tIns="0" rIns="0" bIns="0" rtlCol="0">
+                  <a:spAutoFit/>
+                </a:bodyPr>
+                <a:lstStyle/>
+                <a:p>
+                  <a:pPr/>
+                  <a14:m>
+                    <m:oMathPara xmlns:m="http://schemas.openxmlformats.org/officeDocument/2006/math">
+                      <m:oMathParaPr>
+                        <m:jc m:val="centerGroup"/>
+                      </m:oMathParaPr>
+                      <m:oMath xmlns:m="http://schemas.openxmlformats.org/officeDocument/2006/math">
+                        <m:sSub>
+                          <m:sSubPr>
+                            <m:ctrlPr>
+                              <a:rPr lang="en-CA" sz="1400" i="1" smtClean="0">
+                                <a:latin typeface="Cambria Math" panose="02040503050406030204" pitchFamily="18" charset="0"/>
+                              </a:rPr>
+                            </m:ctrlPr>
+                          </m:sSubPr>
+                          <m:e>
+                            <m:r>
+                              <a:rPr lang="en-CA" sz="1400" b="0" i="1" smtClean="0">
+                                <a:latin typeface="Cambria Math" panose="02040503050406030204" pitchFamily="18" charset="0"/>
+                              </a:rPr>
+                              <m:t>𝑍</m:t>
+                            </m:r>
+                          </m:e>
+                          <m:sub>
+                            <m:r>
+                              <a:rPr lang="en-CA" sz="1400" b="0" i="1" smtClean="0">
+                                <a:latin typeface="Cambria Math" panose="02040503050406030204" pitchFamily="18" charset="0"/>
+                              </a:rPr>
+                              <m:t>𝑞𝑐</m:t>
+                            </m:r>
+                            <m:r>
+                              <a:rPr lang="en-CA" sz="1400" b="0" i="1" smtClean="0">
+                                <a:latin typeface="Cambria Math" panose="02040503050406030204" pitchFamily="18" charset="0"/>
+                              </a:rPr>
+                              <m:t> </m:t>
+                            </m:r>
+                            <m:r>
+                              <a:rPr lang="en-CA" sz="1400" i="1">
+                                <a:latin typeface="Cambria Math" panose="02040503050406030204" pitchFamily="18" charset="0"/>
+                              </a:rPr>
+                              <m:t>𝑐𝑎𝑚</m:t>
+                            </m:r>
+                          </m:sub>
+                        </m:sSub>
+                      </m:oMath>
+                    </m:oMathPara>
+                  </a14:m>
+                  <a:endParaRPr lang="fr-CA" dirty="0"/>
+                </a:p>
+              </p:txBody>
+            </p:sp>
+          </mc:Choice>
+          <mc:Fallback>
+            <p:sp>
+              <p:nvSpPr>
+                <p:cNvPr id="34" name="TextBox 33">
+                  <a:extLst>
+                    <a:ext uri="{FF2B5EF4-FFF2-40B4-BE49-F238E27FC236}">
+                      <a16:creationId xmlns:a16="http://schemas.microsoft.com/office/drawing/2014/main" id="{0E85C2AE-89C0-4221-95FA-2F03EB001C36}"/>
+                    </a:ext>
+                  </a:extLst>
+                </p:cNvPr>
+                <p:cNvSpPr txBox="1">
+                  <a:spLocks noRot="1" noChangeAspect="1" noMove="1" noResize="1" noEditPoints="1" noAdjustHandles="1" noChangeArrowheads="1" noChangeShapeType="1" noTextEdit="1"/>
+                </p:cNvSpPr>
+                <p:nvPr/>
+              </p:nvSpPr>
+              <p:spPr>
+                <a:xfrm>
+                  <a:off x="5176894" y="1381136"/>
+                  <a:ext cx="596894" cy="232051"/>
+                </a:xfrm>
+                <a:prstGeom prst="rect">
+                  <a:avLst/>
+                </a:prstGeom>
+                <a:blipFill>
+                  <a:blip r:embed="rId8"/>
+                  <a:stretch>
+                    <a:fillRect l="-6122" r="-1020" b="-18421"/>
+                  </a:stretch>
+                </a:blipFill>
+              </p:spPr>
+              <p:txBody>
+                <a:bodyPr/>
+                <a:lstStyle/>
+                <a:p>
+                  <a:r>
+                    <a:rPr lang="fr-CA">
+                      <a:noFill/>
+                    </a:rPr>
+                    <a:t> </a:t>
+                  </a:r>
+                </a:p>
+              </p:txBody>
+            </p:sp>
+          </mc:Fallback>
+        </mc:AlternateContent>
+        <mc:AlternateContent xmlns:mc="http://schemas.openxmlformats.org/markup-compatibility/2006">
+          <mc:Choice xmlns:a14="http://schemas.microsoft.com/office/drawing/2010/main" Requires="a14">
+            <p:sp>
+              <p:nvSpPr>
+                <p:cNvPr id="35" name="TextBox 34">
+                  <a:extLst>
+                    <a:ext uri="{FF2B5EF4-FFF2-40B4-BE49-F238E27FC236}">
+                      <a16:creationId xmlns:a16="http://schemas.microsoft.com/office/drawing/2014/main" id="{9B6CD510-F096-4374-BEAA-B68A0F041C16}"/>
+                    </a:ext>
+                  </a:extLst>
+                </p:cNvPr>
+                <p:cNvSpPr txBox="1"/>
+                <p:nvPr/>
+              </p:nvSpPr>
+              <p:spPr>
+                <a:xfrm>
+                  <a:off x="5486252" y="3559030"/>
+                  <a:ext cx="637932" cy="215444"/>
+                </a:xfrm>
+                <a:prstGeom prst="rect">
+                  <a:avLst/>
+                </a:prstGeom>
+                <a:noFill/>
+              </p:spPr>
+              <p:txBody>
+                <a:bodyPr wrap="none" lIns="0" tIns="0" rIns="0" bIns="0" rtlCol="0">
+                  <a:spAutoFit/>
+                </a:bodyPr>
+                <a:lstStyle/>
+                <a:p>
+                  <a:pPr/>
+                  <a14:m>
+                    <m:oMathPara xmlns:m="http://schemas.openxmlformats.org/officeDocument/2006/math">
+                      <m:oMathParaPr>
+                        <m:jc m:val="centerGroup"/>
+                      </m:oMathParaPr>
+                      <m:oMath xmlns:m="http://schemas.openxmlformats.org/officeDocument/2006/math">
+                        <m:sSub>
+                          <m:sSubPr>
+                            <m:ctrlPr>
+                              <a:rPr lang="en-CA" sz="1400" i="1" smtClean="0">
+                                <a:latin typeface="Cambria Math" panose="02040503050406030204" pitchFamily="18" charset="0"/>
+                              </a:rPr>
+                            </m:ctrlPr>
+                          </m:sSubPr>
+                          <m:e>
+                            <m:r>
+                              <a:rPr lang="en-CA" sz="1400" b="0" i="1" smtClean="0">
+                                <a:latin typeface="Cambria Math" panose="02040503050406030204" pitchFamily="18" charset="0"/>
+                              </a:rPr>
+                              <m:t>𝑍</m:t>
+                            </m:r>
+                          </m:e>
+                          <m:sub>
+                            <m:r>
+                              <a:rPr lang="en-CA" sz="1400" i="1">
+                                <a:latin typeface="Cambria Math" panose="02040503050406030204" pitchFamily="18" charset="0"/>
+                              </a:rPr>
+                              <m:t>𝑤</m:t>
+                            </m:r>
+                            <m:r>
+                              <a:rPr lang="en-CA" sz="1400" b="0" i="1" smtClean="0">
+                                <a:latin typeface="Cambria Math" panose="02040503050406030204" pitchFamily="18" charset="0"/>
+                              </a:rPr>
+                              <m:t>𝑏</m:t>
+                            </m:r>
+                            <m:r>
+                              <a:rPr lang="en-CA" sz="1400" b="0" i="1" smtClean="0">
+                                <a:latin typeface="Cambria Math" panose="02040503050406030204" pitchFamily="18" charset="0"/>
+                              </a:rPr>
+                              <m:t> </m:t>
+                            </m:r>
+                            <m:r>
+                              <a:rPr lang="en-CA" sz="1400" i="1">
+                                <a:latin typeface="Cambria Math" panose="02040503050406030204" pitchFamily="18" charset="0"/>
+                              </a:rPr>
+                              <m:t>𝑐𝑎𝑚</m:t>
+                            </m:r>
+                          </m:sub>
+                        </m:sSub>
+                      </m:oMath>
+                    </m:oMathPara>
+                  </a14:m>
+                  <a:endParaRPr lang="fr-CA" dirty="0"/>
+                </a:p>
+              </p:txBody>
+            </p:sp>
+          </mc:Choice>
+          <mc:Fallback>
+            <p:sp>
+              <p:nvSpPr>
+                <p:cNvPr id="35" name="TextBox 34">
+                  <a:extLst>
+                    <a:ext uri="{FF2B5EF4-FFF2-40B4-BE49-F238E27FC236}">
+                      <a16:creationId xmlns:a16="http://schemas.microsoft.com/office/drawing/2014/main" id="{9B6CD510-F096-4374-BEAA-B68A0F041C16}"/>
+                    </a:ext>
+                  </a:extLst>
+                </p:cNvPr>
+                <p:cNvSpPr txBox="1">
+                  <a:spLocks noRot="1" noChangeAspect="1" noMove="1" noResize="1" noEditPoints="1" noAdjustHandles="1" noChangeArrowheads="1" noChangeShapeType="1" noTextEdit="1"/>
+                </p:cNvSpPr>
+                <p:nvPr/>
+              </p:nvSpPr>
+              <p:spPr>
+                <a:xfrm>
+                  <a:off x="5486252" y="3559030"/>
+                  <a:ext cx="637932" cy="215444"/>
+                </a:xfrm>
+                <a:prstGeom prst="rect">
+                  <a:avLst/>
+                </a:prstGeom>
+                <a:blipFill>
+                  <a:blip r:embed="rId9"/>
+                  <a:stretch>
+                    <a:fillRect l="-5714" b="-14286"/>
+                  </a:stretch>
+                </a:blipFill>
+              </p:spPr>
+              <p:txBody>
+                <a:bodyPr/>
+                <a:lstStyle/>
+                <a:p>
+                  <a:r>
+                    <a:rPr lang="fr-CA">
+                      <a:noFill/>
+                    </a:rPr>
+                    <a:t> </a:t>
+                  </a:r>
+                </a:p>
+              </p:txBody>
+            </p:sp>
+          </mc:Fallback>
+        </mc:AlternateContent>
+        <mc:AlternateContent xmlns:mc="http://schemas.openxmlformats.org/markup-compatibility/2006">
+          <mc:Choice xmlns:a14="http://schemas.microsoft.com/office/drawing/2010/main" Requires="a14">
+            <p:sp>
+              <p:nvSpPr>
+                <p:cNvPr id="36" name="TextBox 35">
+                  <a:extLst>
+                    <a:ext uri="{FF2B5EF4-FFF2-40B4-BE49-F238E27FC236}">
+                      <a16:creationId xmlns:a16="http://schemas.microsoft.com/office/drawing/2014/main" id="{17B39CC6-431D-48A0-96B8-203F68A808C6}"/>
+                    </a:ext>
+                  </a:extLst>
+                </p:cNvPr>
+                <p:cNvSpPr txBox="1"/>
+                <p:nvPr/>
+              </p:nvSpPr>
+              <p:spPr>
+                <a:xfrm>
+                  <a:off x="5080200" y="3945397"/>
+                  <a:ext cx="615360" cy="215444"/>
+                </a:xfrm>
+                <a:prstGeom prst="rect">
+                  <a:avLst/>
+                </a:prstGeom>
+                <a:noFill/>
+              </p:spPr>
+              <p:txBody>
+                <a:bodyPr wrap="none" lIns="0" tIns="0" rIns="0" bIns="0" rtlCol="0">
+                  <a:spAutoFit/>
+                </a:bodyPr>
+                <a:lstStyle/>
+                <a:p>
+                  <a:pPr/>
+                  <a14:m>
+                    <m:oMathPara xmlns:m="http://schemas.openxmlformats.org/officeDocument/2006/math">
+                      <m:oMathParaPr>
+                        <m:jc m:val="centerGroup"/>
+                      </m:oMathParaPr>
+                      <m:oMath xmlns:m="http://schemas.openxmlformats.org/officeDocument/2006/math">
+                        <m:sSub>
+                          <m:sSubPr>
+                            <m:ctrlPr>
+                              <a:rPr lang="en-CA" sz="1400" i="1" smtClean="0">
+                                <a:latin typeface="Cambria Math" panose="02040503050406030204" pitchFamily="18" charset="0"/>
+                              </a:rPr>
+                            </m:ctrlPr>
+                          </m:sSubPr>
+                          <m:e>
+                            <m:r>
+                              <a:rPr lang="en-CA" sz="1400" b="0" i="1" smtClean="0">
+                                <a:latin typeface="Cambria Math" panose="02040503050406030204" pitchFamily="18" charset="0"/>
+                              </a:rPr>
+                              <m:t>𝑌</m:t>
+                            </m:r>
+                          </m:e>
+                          <m:sub>
+                            <m:r>
+                              <a:rPr lang="en-CA" sz="1400" b="0" i="1" smtClean="0">
+                                <a:latin typeface="Cambria Math" panose="02040503050406030204" pitchFamily="18" charset="0"/>
+                              </a:rPr>
+                              <m:t>𝑤𝑏</m:t>
+                            </m:r>
+                            <m:r>
+                              <a:rPr lang="en-CA" sz="1400" b="0" i="1" smtClean="0">
+                                <a:latin typeface="Cambria Math" panose="02040503050406030204" pitchFamily="18" charset="0"/>
+                              </a:rPr>
+                              <m:t> </m:t>
+                            </m:r>
+                            <m:r>
+                              <a:rPr lang="en-CA" sz="1400" i="1">
+                                <a:latin typeface="Cambria Math" panose="02040503050406030204" pitchFamily="18" charset="0"/>
+                              </a:rPr>
+                              <m:t>𝑐𝑎𝑚</m:t>
+                            </m:r>
+                          </m:sub>
+                        </m:sSub>
+                      </m:oMath>
+                    </m:oMathPara>
+                  </a14:m>
+                  <a:endParaRPr lang="fr-CA" dirty="0"/>
+                </a:p>
+              </p:txBody>
+            </p:sp>
+          </mc:Choice>
+          <mc:Fallback>
+            <p:sp>
+              <p:nvSpPr>
+                <p:cNvPr id="36" name="TextBox 35">
+                  <a:extLst>
+                    <a:ext uri="{FF2B5EF4-FFF2-40B4-BE49-F238E27FC236}">
+                      <a16:creationId xmlns:a16="http://schemas.microsoft.com/office/drawing/2014/main" id="{17B39CC6-431D-48A0-96B8-203F68A808C6}"/>
+                    </a:ext>
+                  </a:extLst>
+                </p:cNvPr>
+                <p:cNvSpPr txBox="1">
+                  <a:spLocks noRot="1" noChangeAspect="1" noMove="1" noResize="1" noEditPoints="1" noAdjustHandles="1" noChangeArrowheads="1" noChangeShapeType="1" noTextEdit="1"/>
+                </p:cNvSpPr>
+                <p:nvPr/>
+              </p:nvSpPr>
+              <p:spPr>
+                <a:xfrm>
+                  <a:off x="5080200" y="3945397"/>
+                  <a:ext cx="615360" cy="215444"/>
+                </a:xfrm>
+                <a:prstGeom prst="rect">
+                  <a:avLst/>
+                </a:prstGeom>
+                <a:blipFill>
+                  <a:blip r:embed="rId10"/>
+                  <a:stretch>
+                    <a:fillRect l="-5941" r="-990" b="-13889"/>
+                  </a:stretch>
+                </a:blipFill>
+              </p:spPr>
+              <p:txBody>
+                <a:bodyPr/>
+                <a:lstStyle/>
+                <a:p>
+                  <a:r>
+                    <a:rPr lang="fr-CA">
+                      <a:noFill/>
+                    </a:rPr>
+                    <a:t> </a:t>
+                  </a:r>
+                </a:p>
+              </p:txBody>
+            </p:sp>
+          </mc:Fallback>
+        </mc:AlternateContent>
+        <mc:AlternateContent xmlns:mc="http://schemas.openxmlformats.org/markup-compatibility/2006">
+          <mc:Choice xmlns:a14="http://schemas.microsoft.com/office/drawing/2010/main" Requires="a14">
+            <p:sp>
+              <p:nvSpPr>
+                <p:cNvPr id="37" name="TextBox 36">
+                  <a:extLst>
+                    <a:ext uri="{FF2B5EF4-FFF2-40B4-BE49-F238E27FC236}">
+                      <a16:creationId xmlns:a16="http://schemas.microsoft.com/office/drawing/2014/main" id="{5C78CABB-779E-41B4-924E-7B9E3D90BE3E}"/>
+                    </a:ext>
+                  </a:extLst>
+                </p:cNvPr>
+                <p:cNvSpPr txBox="1"/>
+                <p:nvPr/>
+              </p:nvSpPr>
+              <p:spPr>
+                <a:xfrm>
+                  <a:off x="4504523" y="3686960"/>
+                  <a:ext cx="644920" cy="215444"/>
+                </a:xfrm>
+                <a:prstGeom prst="rect">
+                  <a:avLst/>
+                </a:prstGeom>
+                <a:noFill/>
+              </p:spPr>
+              <p:txBody>
+                <a:bodyPr wrap="none" lIns="0" tIns="0" rIns="0" bIns="0" rtlCol="0">
+                  <a:spAutoFit/>
+                </a:bodyPr>
+                <a:lstStyle/>
+                <a:p>
+                  <a:pPr/>
+                  <a14:m>
+                    <m:oMathPara xmlns:m="http://schemas.openxmlformats.org/officeDocument/2006/math">
+                      <m:oMathParaPr>
+                        <m:jc m:val="centerGroup"/>
+                      </m:oMathParaPr>
+                      <m:oMath xmlns:m="http://schemas.openxmlformats.org/officeDocument/2006/math">
+                        <m:sSub>
+                          <m:sSubPr>
+                            <m:ctrlPr>
+                              <a:rPr lang="en-CA" sz="1400" i="1" smtClean="0">
+                                <a:latin typeface="Cambria Math" panose="02040503050406030204" pitchFamily="18" charset="0"/>
+                              </a:rPr>
+                            </m:ctrlPr>
+                          </m:sSubPr>
+                          <m:e>
+                            <m:r>
+                              <a:rPr lang="en-CA" sz="1400" b="0" i="1" smtClean="0">
+                                <a:latin typeface="Cambria Math" panose="02040503050406030204" pitchFamily="18" charset="0"/>
+                              </a:rPr>
+                              <m:t>𝑋</m:t>
+                            </m:r>
+                          </m:e>
+                          <m:sub>
+                            <m:r>
+                              <a:rPr lang="en-CA" sz="1400" i="1">
+                                <a:latin typeface="Cambria Math" panose="02040503050406030204" pitchFamily="18" charset="0"/>
+                              </a:rPr>
+                              <m:t>𝑤</m:t>
+                            </m:r>
+                            <m:r>
+                              <a:rPr lang="en-CA" sz="1400" b="0" i="1" smtClean="0">
+                                <a:latin typeface="Cambria Math" panose="02040503050406030204" pitchFamily="18" charset="0"/>
+                              </a:rPr>
+                              <m:t>𝑏</m:t>
+                            </m:r>
+                            <m:r>
+                              <a:rPr lang="en-CA" sz="1400" b="0" i="1" smtClean="0">
+                                <a:latin typeface="Cambria Math" panose="02040503050406030204" pitchFamily="18" charset="0"/>
+                              </a:rPr>
+                              <m:t> </m:t>
+                            </m:r>
+                            <m:r>
+                              <a:rPr lang="en-CA" sz="1400" i="1">
+                                <a:latin typeface="Cambria Math" panose="02040503050406030204" pitchFamily="18" charset="0"/>
+                              </a:rPr>
+                              <m:t>𝑐𝑎𝑚</m:t>
+                            </m:r>
+                          </m:sub>
+                        </m:sSub>
+                      </m:oMath>
+                    </m:oMathPara>
+                  </a14:m>
+                  <a:endParaRPr lang="fr-CA" sz="1400" dirty="0"/>
+                </a:p>
+              </p:txBody>
+            </p:sp>
+          </mc:Choice>
+          <mc:Fallback>
+            <p:sp>
+              <p:nvSpPr>
+                <p:cNvPr id="37" name="TextBox 36">
+                  <a:extLst>
+                    <a:ext uri="{FF2B5EF4-FFF2-40B4-BE49-F238E27FC236}">
+                      <a16:creationId xmlns:a16="http://schemas.microsoft.com/office/drawing/2014/main" id="{5C78CABB-779E-41B4-924E-7B9E3D90BE3E}"/>
+                    </a:ext>
+                  </a:extLst>
+                </p:cNvPr>
+                <p:cNvSpPr txBox="1">
+                  <a:spLocks noRot="1" noChangeAspect="1" noMove="1" noResize="1" noEditPoints="1" noAdjustHandles="1" noChangeArrowheads="1" noChangeShapeType="1" noTextEdit="1"/>
+                </p:cNvSpPr>
+                <p:nvPr/>
+              </p:nvSpPr>
+              <p:spPr>
+                <a:xfrm>
+                  <a:off x="4504523" y="3686960"/>
+                  <a:ext cx="644920" cy="215444"/>
+                </a:xfrm>
+                <a:prstGeom prst="rect">
+                  <a:avLst/>
+                </a:prstGeom>
+                <a:blipFill>
+                  <a:blip r:embed="rId11"/>
+                  <a:stretch>
+                    <a:fillRect l="-5660" b="-14286"/>
+                  </a:stretch>
+                </a:blipFill>
+              </p:spPr>
+              <p:txBody>
+                <a:bodyPr/>
+                <a:lstStyle/>
+                <a:p>
+                  <a:r>
+                    <a:rPr lang="fr-CA">
+                      <a:noFill/>
+                    </a:rPr>
+                    <a:t> </a:t>
+                  </a:r>
+                </a:p>
+              </p:txBody>
+            </p:sp>
+          </mc:Fallback>
+        </mc:AlternateContent>
+      </p:grpSp>
+    </p:spTree>
+    <p:extLst>
+      <p:ext uri="{BB962C8B-B14F-4D97-AF65-F5344CB8AC3E}">
+        <p14:creationId xmlns:p14="http://schemas.microsoft.com/office/powerpoint/2010/main" val="1996358742"/>
+      </p:ext>
+    </p:extLst>
+  </p:cSld>
+  <p:clrMapOvr>
+    <a:masterClrMapping/>
+  </p:clrMapOvr>
+</p:sld>
+</file>
+
+<file path=ppt/slides/slide3.xml><?xml version="1.0" encoding="utf-8"?>
 <p:sld xmlns:a="http://schemas.openxmlformats.org/drawingml/2006/main" xmlns:r="http://schemas.openxmlformats.org/officeDocument/2006/relationships" xmlns:p="http://schemas.openxmlformats.org/presentationml/2006/main">
   <p:cSld>
     <p:spTree>
@@ -3672,7 +5275,177 @@
 </p:sld>
 </file>
 
-<file path=ppt/slides/slide3.xml><?xml version="1.0" encoding="utf-8"?>
+<file path=ppt/slides/slide4.xml><?xml version="1.0" encoding="utf-8"?>
+<p:sld xmlns:a="http://schemas.openxmlformats.org/drawingml/2006/main" xmlns:r="http://schemas.openxmlformats.org/officeDocument/2006/relationships" xmlns:p="http://schemas.openxmlformats.org/presentationml/2006/main">
+  <p:cSld>
+    <p:spTree>
+      <p:nvGrpSpPr>
+        <p:cNvPr id="1" name=""/>
+        <p:cNvGrpSpPr/>
+        <p:nvPr/>
+      </p:nvGrpSpPr>
+      <p:grpSpPr>
+        <a:xfrm>
+          <a:off x="0" y="0"/>
+          <a:ext cx="0" cy="0"/>
+          <a:chOff x="0" y="0"/>
+          <a:chExt cx="0" cy="0"/>
+        </a:xfrm>
+      </p:grpSpPr>
+      <p:grpSp>
+        <p:nvGrpSpPr>
+          <p:cNvPr id="14" name="Group 13">
+            <a:extLst>
+              <a:ext uri="{FF2B5EF4-FFF2-40B4-BE49-F238E27FC236}">
+                <a16:creationId xmlns:a16="http://schemas.microsoft.com/office/drawing/2014/main" id="{747904AA-1CF3-4C54-A989-826EBA344349}"/>
+              </a:ext>
+            </a:extLst>
+          </p:cNvPr>
+          <p:cNvGrpSpPr/>
+          <p:nvPr/>
+        </p:nvGrpSpPr>
+        <p:grpSpPr>
+          <a:xfrm>
+            <a:off x="3962400" y="280987"/>
+            <a:ext cx="2659380" cy="4260533"/>
+            <a:chOff x="3962400" y="280987"/>
+            <a:chExt cx="2659380" cy="4260533"/>
+          </a:xfrm>
+        </p:grpSpPr>
+        <p:pic>
+          <p:nvPicPr>
+            <p:cNvPr id="4" name="Picture 3">
+              <a:extLst>
+                <a:ext uri="{FF2B5EF4-FFF2-40B4-BE49-F238E27FC236}">
+                  <a16:creationId xmlns:a16="http://schemas.microsoft.com/office/drawing/2014/main" id="{D2D26DD7-604B-44C0-969D-5EA4A1FFB3C9}"/>
+                </a:ext>
+              </a:extLst>
+            </p:cNvPr>
+            <p:cNvPicPr>
+              <a:picLocks noChangeAspect="1"/>
+            </p:cNvPicPr>
+            <p:nvPr/>
+          </p:nvPicPr>
+          <p:blipFill rotWithShape="1">
+            <a:blip r:embed="rId2"/>
+            <a:srcRect l="20370" r="42699" b="32330"/>
+            <a:stretch/>
+          </p:blipFill>
+          <p:spPr>
+            <a:xfrm>
+              <a:off x="3962400" y="280987"/>
+              <a:ext cx="2659380" cy="4260533"/>
+            </a:xfrm>
+            <a:prstGeom prst="rect">
+              <a:avLst/>
+            </a:prstGeom>
+          </p:spPr>
+        </p:pic>
+        <p:pic>
+          <p:nvPicPr>
+            <p:cNvPr id="6" name="Picture 5">
+              <a:extLst>
+                <a:ext uri="{FF2B5EF4-FFF2-40B4-BE49-F238E27FC236}">
+                  <a16:creationId xmlns:a16="http://schemas.microsoft.com/office/drawing/2014/main" id="{CCA5A843-A9F7-4F28-9BB6-2A6342917C65}"/>
+                </a:ext>
+              </a:extLst>
+            </p:cNvPr>
+            <p:cNvPicPr>
+              <a:picLocks noChangeAspect="1"/>
+            </p:cNvPicPr>
+            <p:nvPr/>
+          </p:nvPicPr>
+          <p:blipFill>
+            <a:blip r:embed="rId3">
+              <a:extLst>
+                <a:ext uri="{BEBA8EAE-BF5A-486C-A8C5-ECC9F3942E4B}">
+                  <a14:imgProps xmlns:a14="http://schemas.microsoft.com/office/drawing/2010/main">
+                    <a14:imgLayer r:embed="rId4">
+                      <a14:imgEffect>
+                        <a14:backgroundRemoval t="9375" b="89286" l="4889" r="95556"/>
+                      </a14:imgEffect>
+                    </a14:imgLayer>
+                  </a14:imgProps>
+                </a:ext>
+                <a:ext uri="{28A0092B-C50C-407E-A947-70E740481C1C}">
+                  <a14:useLocalDpi xmlns:a14="http://schemas.microsoft.com/office/drawing/2010/main" val="0"/>
+                </a:ext>
+              </a:extLst>
+            </a:blip>
+            <a:stretch>
+              <a:fillRect/>
+            </a:stretch>
+          </p:blipFill>
+          <p:spPr>
+            <a:xfrm rot="16200000">
+              <a:off x="4848770" y="1013460"/>
+              <a:ext cx="520473" cy="518160"/>
+            </a:xfrm>
+            <a:prstGeom prst="rect">
+              <a:avLst/>
+            </a:prstGeom>
+          </p:spPr>
+        </p:pic>
+        <p:pic>
+          <p:nvPicPr>
+            <p:cNvPr id="7" name="Picture 6">
+              <a:extLst>
+                <a:ext uri="{FF2B5EF4-FFF2-40B4-BE49-F238E27FC236}">
+                  <a16:creationId xmlns:a16="http://schemas.microsoft.com/office/drawing/2014/main" id="{AC7927A3-5D39-40CE-9C53-8D6555AC4D26}"/>
+                </a:ext>
+              </a:extLst>
+            </p:cNvPr>
+            <p:cNvPicPr>
+              <a:picLocks noChangeAspect="1"/>
+            </p:cNvPicPr>
+            <p:nvPr/>
+          </p:nvPicPr>
+          <p:blipFill>
+            <a:blip r:embed="rId3">
+              <a:extLst>
+                <a:ext uri="{BEBA8EAE-BF5A-486C-A8C5-ECC9F3942E4B}">
+                  <a14:imgProps xmlns:a14="http://schemas.microsoft.com/office/drawing/2010/main">
+                    <a14:imgLayer r:embed="rId4">
+                      <a14:imgEffect>
+                        <a14:backgroundRemoval t="9375" b="89286" l="4889" r="95556"/>
+                      </a14:imgEffect>
+                    </a14:imgLayer>
+                  </a14:imgProps>
+                </a:ext>
+                <a:ext uri="{28A0092B-C50C-407E-A947-70E740481C1C}">
+                  <a14:useLocalDpi xmlns:a14="http://schemas.microsoft.com/office/drawing/2010/main" val="0"/>
+                </a:ext>
+              </a:extLst>
+            </a:blip>
+            <a:stretch>
+              <a:fillRect/>
+            </a:stretch>
+          </p:blipFill>
+          <p:spPr>
+            <a:xfrm rot="11570353" flipV="1">
+              <a:off x="5031853" y="3169919"/>
+              <a:ext cx="520473" cy="518160"/>
+            </a:xfrm>
+            <a:prstGeom prst="rect">
+              <a:avLst/>
+            </a:prstGeom>
+          </p:spPr>
+        </p:pic>
+      </p:grpSp>
+    </p:spTree>
+    <p:extLst>
+      <p:ext uri="{BB962C8B-B14F-4D97-AF65-F5344CB8AC3E}">
+        <p14:creationId xmlns:p14="http://schemas.microsoft.com/office/powerpoint/2010/main" val="1521728603"/>
+      </p:ext>
+    </p:extLst>
+  </p:cSld>
+  <p:clrMapOvr>
+    <a:masterClrMapping/>
+  </p:clrMapOvr>
+</p:sld>
+</file>
+
+<file path=ppt/slides/slide5.xml><?xml version="1.0" encoding="utf-8"?>
 <p:sld xmlns:a="http://schemas.openxmlformats.org/drawingml/2006/main" xmlns:r="http://schemas.openxmlformats.org/officeDocument/2006/relationships" xmlns:p="http://schemas.openxmlformats.org/presentationml/2006/main">
   <p:cSld>
     <p:spTree>
@@ -3836,7 +5609,7 @@
 </p:sld>
 </file>
 
-<file path=ppt/slides/slide4.xml><?xml version="1.0" encoding="utf-8"?>
+<file path=ppt/slides/slide6.xml><?xml version="1.0" encoding="utf-8"?>
 <p:sld xmlns:a="http://schemas.openxmlformats.org/drawingml/2006/main" xmlns:r="http://schemas.openxmlformats.org/officeDocument/2006/relationships" xmlns:p="http://schemas.openxmlformats.org/presentationml/2006/main">
   <p:cSld>
     <p:spTree>
@@ -4275,8 +6048,8 @@
             </a:p>
           </p:txBody>
         </p:sp>
-        <mc:AlternateContent xmlns:mc="http://schemas.openxmlformats.org/markup-compatibility/2006">
-          <mc:Choice xmlns:a14="http://schemas.microsoft.com/office/drawing/2010/main" Requires="a14">
+        <mc:AlternateContent xmlns:mc="http://schemas.openxmlformats.org/markup-compatibility/2006" xmlns:a14="http://schemas.microsoft.com/office/drawing/2010/main">
+          <mc:Choice Requires="a14">
             <p:sp>
               <p:nvSpPr>
                 <p:cNvPr id="38" name="TextBox 37">
@@ -4305,6 +6078,7 @@
                 </a:bodyPr>
                 <a:lstStyle/>
                 <a:p>
+                  <a:pPr/>
                   <a14:m>
                     <m:oMathPara xmlns:m="http://schemas.openxmlformats.org/officeDocument/2006/math">
                       <m:oMathParaPr>
@@ -4424,7 +6198,7 @@
               </p:txBody>
             </p:sp>
           </mc:Choice>
-          <mc:Fallback>
+          <mc:Fallback xmlns="">
             <p:sp>
               <p:nvSpPr>
                 <p:cNvPr id="38" name="TextBox 37">
@@ -4469,8 +6243,8 @@
             </p:sp>
           </mc:Fallback>
         </mc:AlternateContent>
-        <mc:AlternateContent xmlns:mc="http://schemas.openxmlformats.org/markup-compatibility/2006">
-          <mc:Choice xmlns:a14="http://schemas.microsoft.com/office/drawing/2010/main" Requires="a14">
+        <mc:AlternateContent xmlns:mc="http://schemas.openxmlformats.org/markup-compatibility/2006" xmlns:a14="http://schemas.microsoft.com/office/drawing/2010/main">
+          <mc:Choice Requires="a14">
             <p:sp>
               <p:nvSpPr>
                 <p:cNvPr id="39" name="TextBox 38">
@@ -4499,6 +6273,7 @@
                 </a:bodyPr>
                 <a:lstStyle/>
                 <a:p>
+                  <a:pPr/>
                   <a14:m>
                     <m:oMathPara xmlns:m="http://schemas.openxmlformats.org/officeDocument/2006/math">
                       <m:oMathParaPr>
@@ -4618,7 +6393,7 @@
               </p:txBody>
             </p:sp>
           </mc:Choice>
-          <mc:Fallback>
+          <mc:Fallback xmlns="">
             <p:sp>
               <p:nvSpPr>
                 <p:cNvPr id="39" name="TextBox 38">
@@ -4663,8 +6438,8 @@
             </p:sp>
           </mc:Fallback>
         </mc:AlternateContent>
-        <mc:AlternateContent xmlns:mc="http://schemas.openxmlformats.org/markup-compatibility/2006">
-          <mc:Choice xmlns:a14="http://schemas.microsoft.com/office/drawing/2010/main" Requires="a14">
+        <mc:AlternateContent xmlns:mc="http://schemas.openxmlformats.org/markup-compatibility/2006" xmlns:a14="http://schemas.microsoft.com/office/drawing/2010/main">
+          <mc:Choice Requires="a14">
             <p:sp>
               <p:nvSpPr>
                 <p:cNvPr id="40" name="TextBox 39">
@@ -4693,6 +6468,7 @@
                 </a:bodyPr>
                 <a:lstStyle/>
                 <a:p>
+                  <a:pPr/>
                   <a14:m>
                     <m:oMathPara xmlns:m="http://schemas.openxmlformats.org/officeDocument/2006/math">
                       <m:oMathParaPr>
@@ -4812,7 +6588,7 @@
               </p:txBody>
             </p:sp>
           </mc:Choice>
-          <mc:Fallback>
+          <mc:Fallback xmlns="">
             <p:sp>
               <p:nvSpPr>
                 <p:cNvPr id="40" name="TextBox 39">
@@ -4857,8 +6633,8 @@
             </p:sp>
           </mc:Fallback>
         </mc:AlternateContent>
-        <mc:AlternateContent xmlns:mc="http://schemas.openxmlformats.org/markup-compatibility/2006">
-          <mc:Choice xmlns:a14="http://schemas.microsoft.com/office/drawing/2010/main" Requires="a14">
+        <mc:AlternateContent xmlns:mc="http://schemas.openxmlformats.org/markup-compatibility/2006" xmlns:a14="http://schemas.microsoft.com/office/drawing/2010/main">
+          <mc:Choice Requires="a14">
             <p:sp>
               <p:nvSpPr>
                 <p:cNvPr id="41" name="TextBox 40">
@@ -4887,6 +6663,7 @@
                 </a:bodyPr>
                 <a:lstStyle/>
                 <a:p>
+                  <a:pPr/>
                   <a14:m>
                     <m:oMathPara xmlns:m="http://schemas.openxmlformats.org/officeDocument/2006/math">
                       <m:oMathParaPr>
@@ -4908,7 +6685,7 @@
               </p:txBody>
             </p:sp>
           </mc:Choice>
-          <mc:Fallback>
+          <mc:Fallback xmlns="">
             <p:sp>
               <p:nvSpPr>
                 <p:cNvPr id="41" name="TextBox 40">
@@ -4953,8 +6730,8 @@
             </p:sp>
           </mc:Fallback>
         </mc:AlternateContent>
-        <mc:AlternateContent xmlns:mc="http://schemas.openxmlformats.org/markup-compatibility/2006">
-          <mc:Choice xmlns:a14="http://schemas.microsoft.com/office/drawing/2010/main" Requires="a14">
+        <mc:AlternateContent xmlns:mc="http://schemas.openxmlformats.org/markup-compatibility/2006" xmlns:a14="http://schemas.microsoft.com/office/drawing/2010/main">
+          <mc:Choice Requires="a14">
             <p:sp>
               <p:nvSpPr>
                 <p:cNvPr id="42" name="TextBox 41">
@@ -4983,6 +6760,7 @@
                 </a:bodyPr>
                 <a:lstStyle/>
                 <a:p>
+                  <a:pPr/>
                   <a14:m>
                     <m:oMathPara xmlns:m="http://schemas.openxmlformats.org/officeDocument/2006/math">
                       <m:oMathParaPr>
@@ -5004,7 +6782,7 @@
               </p:txBody>
             </p:sp>
           </mc:Choice>
-          <mc:Fallback>
+          <mc:Fallback xmlns="">
             <p:sp>
               <p:nvSpPr>
                 <p:cNvPr id="42" name="TextBox 41">
@@ -5049,8 +6827,8 @@
             </p:sp>
           </mc:Fallback>
         </mc:AlternateContent>
-        <mc:AlternateContent xmlns:mc="http://schemas.openxmlformats.org/markup-compatibility/2006">
-          <mc:Choice xmlns:a14="http://schemas.microsoft.com/office/drawing/2010/main" Requires="a14">
+        <mc:AlternateContent xmlns:mc="http://schemas.openxmlformats.org/markup-compatibility/2006" xmlns:a14="http://schemas.microsoft.com/office/drawing/2010/main">
+          <mc:Choice Requires="a14">
             <p:sp>
               <p:nvSpPr>
                 <p:cNvPr id="43" name="TextBox 42">
@@ -5079,6 +6857,7 @@
                 </a:bodyPr>
                 <a:lstStyle/>
                 <a:p>
+                  <a:pPr/>
                   <a14:m>
                     <m:oMathPara xmlns:m="http://schemas.openxmlformats.org/officeDocument/2006/math">
                       <m:oMathParaPr>
@@ -5100,7 +6879,7 @@
               </p:txBody>
             </p:sp>
           </mc:Choice>
-          <mc:Fallback>
+          <mc:Fallback xmlns="">
             <p:sp>
               <p:nvSpPr>
                 <p:cNvPr id="43" name="TextBox 42">
@@ -5145,8 +6924,8 @@
             </p:sp>
           </mc:Fallback>
         </mc:AlternateContent>
-        <mc:AlternateContent xmlns:mc="http://schemas.openxmlformats.org/markup-compatibility/2006">
-          <mc:Choice xmlns:a14="http://schemas.microsoft.com/office/drawing/2010/main" Requires="a14">
+        <mc:AlternateContent xmlns:mc="http://schemas.openxmlformats.org/markup-compatibility/2006" xmlns:a14="http://schemas.microsoft.com/office/drawing/2010/main">
+          <mc:Choice Requires="a14">
             <p:sp>
               <p:nvSpPr>
                 <p:cNvPr id="44" name="TextBox 43">
@@ -5175,6 +6954,7 @@
                 </a:bodyPr>
                 <a:lstStyle/>
                 <a:p>
+                  <a:pPr/>
                   <a14:m>
                     <m:oMathPara xmlns:m="http://schemas.openxmlformats.org/officeDocument/2006/math">
                       <m:oMathParaPr>
@@ -5207,7 +6987,7 @@
               </p:txBody>
             </p:sp>
           </mc:Choice>
-          <mc:Fallback>
+          <mc:Fallback xmlns="">
             <p:sp>
               <p:nvSpPr>
                 <p:cNvPr id="44" name="TextBox 43">
@@ -5252,8 +7032,8 @@
             </p:sp>
           </mc:Fallback>
         </mc:AlternateContent>
-        <mc:AlternateContent xmlns:mc="http://schemas.openxmlformats.org/markup-compatibility/2006">
-          <mc:Choice xmlns:a14="http://schemas.microsoft.com/office/drawing/2010/main" Requires="a14">
+        <mc:AlternateContent xmlns:mc="http://schemas.openxmlformats.org/markup-compatibility/2006" xmlns:a14="http://schemas.microsoft.com/office/drawing/2010/main">
+          <mc:Choice Requires="a14">
             <p:sp>
               <p:nvSpPr>
                 <p:cNvPr id="45" name="TextBox 44">
@@ -5282,6 +7062,7 @@
                 </a:bodyPr>
                 <a:lstStyle/>
                 <a:p>
+                  <a:pPr/>
                   <a14:m>
                     <m:oMathPara xmlns:m="http://schemas.openxmlformats.org/officeDocument/2006/math">
                       <m:oMathParaPr>
@@ -5314,7 +7095,7 @@
               </p:txBody>
             </p:sp>
           </mc:Choice>
-          <mc:Fallback>
+          <mc:Fallback xmlns="">
             <p:sp>
               <p:nvSpPr>
                 <p:cNvPr id="45" name="TextBox 44">
@@ -5359,8 +7140,8 @@
             </p:sp>
           </mc:Fallback>
         </mc:AlternateContent>
-        <mc:AlternateContent xmlns:mc="http://schemas.openxmlformats.org/markup-compatibility/2006">
-          <mc:Choice xmlns:a14="http://schemas.microsoft.com/office/drawing/2010/main" Requires="a14">
+        <mc:AlternateContent xmlns:mc="http://schemas.openxmlformats.org/markup-compatibility/2006" xmlns:a14="http://schemas.microsoft.com/office/drawing/2010/main">
+          <mc:Choice Requires="a14">
             <p:sp>
               <p:nvSpPr>
                 <p:cNvPr id="46" name="TextBox 45">
@@ -5389,6 +7170,7 @@
                 </a:bodyPr>
                 <a:lstStyle/>
                 <a:p>
+                  <a:pPr/>
                   <a14:m>
                     <m:oMathPara xmlns:m="http://schemas.openxmlformats.org/officeDocument/2006/math">
                       <m:oMathParaPr>
@@ -5427,7 +7209,7 @@
               </p:txBody>
             </p:sp>
           </mc:Choice>
-          <mc:Fallback>
+          <mc:Fallback xmlns="">
             <p:sp>
               <p:nvSpPr>
                 <p:cNvPr id="46" name="TextBox 45">
@@ -5560,8 +7342,8 @@
             </a:fontRef>
           </p:style>
         </p:cxnSp>
-        <mc:AlternateContent xmlns:mc="http://schemas.openxmlformats.org/markup-compatibility/2006">
-          <mc:Choice xmlns:a14="http://schemas.microsoft.com/office/drawing/2010/main" Requires="a14">
+        <mc:AlternateContent xmlns:mc="http://schemas.openxmlformats.org/markup-compatibility/2006" xmlns:a14="http://schemas.microsoft.com/office/drawing/2010/main">
+          <mc:Choice Requires="a14">
             <p:sp>
               <p:nvSpPr>
                 <p:cNvPr id="55" name="TextBox 54">
@@ -5590,6 +7372,7 @@
                 </a:bodyPr>
                 <a:lstStyle/>
                 <a:p>
+                  <a:pPr/>
                   <a14:m>
                     <m:oMathPara xmlns:m="http://schemas.openxmlformats.org/officeDocument/2006/math">
                       <m:oMathParaPr>
@@ -5622,7 +7405,7 @@
               </p:txBody>
             </p:sp>
           </mc:Choice>
-          <mc:Fallback>
+          <mc:Fallback xmlns="">
             <p:sp>
               <p:nvSpPr>
                 <p:cNvPr id="55" name="TextBox 54">
@@ -5667,8 +7450,8 @@
             </p:sp>
           </mc:Fallback>
         </mc:AlternateContent>
-        <mc:AlternateContent xmlns:mc="http://schemas.openxmlformats.org/markup-compatibility/2006">
-          <mc:Choice xmlns:a14="http://schemas.microsoft.com/office/drawing/2010/main" Requires="a14">
+        <mc:AlternateContent xmlns:mc="http://schemas.openxmlformats.org/markup-compatibility/2006" xmlns:a14="http://schemas.microsoft.com/office/drawing/2010/main">
+          <mc:Choice Requires="a14">
             <p:sp>
               <p:nvSpPr>
                 <p:cNvPr id="56" name="TextBox 55">
@@ -5697,6 +7480,7 @@
                 </a:bodyPr>
                 <a:lstStyle/>
                 <a:p>
+                  <a:pPr/>
                   <a14:m>
                     <m:oMathPara xmlns:m="http://schemas.openxmlformats.org/officeDocument/2006/math">
                       <m:oMathParaPr>
@@ -5735,7 +7519,7 @@
               </p:txBody>
             </p:sp>
           </mc:Choice>
-          <mc:Fallback>
+          <mc:Fallback xmlns="">
             <p:sp>
               <p:nvSpPr>
                 <p:cNvPr id="56" name="TextBox 55">
@@ -5780,8 +7564,8 @@
             </p:sp>
           </mc:Fallback>
         </mc:AlternateContent>
-        <mc:AlternateContent xmlns:mc="http://schemas.openxmlformats.org/markup-compatibility/2006">
-          <mc:Choice xmlns:a14="http://schemas.microsoft.com/office/drawing/2010/main" Requires="a14">
+        <mc:AlternateContent xmlns:mc="http://schemas.openxmlformats.org/markup-compatibility/2006" xmlns:a14="http://schemas.microsoft.com/office/drawing/2010/main">
+          <mc:Choice Requires="a14">
             <p:sp>
               <p:nvSpPr>
                 <p:cNvPr id="57" name="TextBox 56">
@@ -5810,6 +7594,7 @@
                 </a:bodyPr>
                 <a:lstStyle/>
                 <a:p>
+                  <a:pPr/>
                   <a14:m>
                     <m:oMathPara xmlns:m="http://schemas.openxmlformats.org/officeDocument/2006/math">
                       <m:oMathParaPr>
@@ -5842,7 +7627,7 @@
               </p:txBody>
             </p:sp>
           </mc:Choice>
-          <mc:Fallback>
+          <mc:Fallback xmlns="">
             <p:sp>
               <p:nvSpPr>
                 <p:cNvPr id="57" name="TextBox 56">
@@ -5931,8 +7716,8 @@
             </a:fontRef>
           </p:style>
         </p:cxnSp>
-        <mc:AlternateContent xmlns:mc="http://schemas.openxmlformats.org/markup-compatibility/2006">
-          <mc:Choice xmlns:a14="http://schemas.microsoft.com/office/drawing/2010/main" Requires="a14">
+        <mc:AlternateContent xmlns:mc="http://schemas.openxmlformats.org/markup-compatibility/2006" xmlns:a14="http://schemas.microsoft.com/office/drawing/2010/main">
+          <mc:Choice Requires="a14">
             <p:sp>
               <p:nvSpPr>
                 <p:cNvPr id="61" name="TextBox 60">
@@ -5961,6 +7746,7 @@
                 </a:bodyPr>
                 <a:lstStyle/>
                 <a:p>
+                  <a:pPr/>
                   <a14:m>
                     <m:oMathPara xmlns:m="http://schemas.openxmlformats.org/officeDocument/2006/math">
                       <m:oMathParaPr>
@@ -5981,13 +7767,7 @@
                               <a:rPr lang="en-US" b="0" i="1" smtClean="0">
                                 <a:latin typeface="Cambria Math" panose="02040503050406030204" pitchFamily="18" charset="0"/>
                               </a:rPr>
-                              <m:t>𝐵</m:t>
-                            </m:r>
-                            <m:r>
-                              <a:rPr lang="en-US" b="0" i="1" smtClean="0">
-                                <a:latin typeface="Cambria Math" panose="02040503050406030204" pitchFamily="18" charset="0"/>
-                              </a:rPr>
-                              <m:t>𝐶</m:t>
+                              <m:t>𝐵𝐶</m:t>
                             </m:r>
                           </m:e>
                         </m:acc>
@@ -5999,7 +7779,7 @@
               </p:txBody>
             </p:sp>
           </mc:Choice>
-          <mc:Fallback>
+          <mc:Fallback xmlns="">
             <p:sp>
               <p:nvSpPr>
                 <p:cNvPr id="61" name="TextBox 60">
@@ -6088,8 +7868,8 @@
             </a:fontRef>
           </p:style>
         </p:cxnSp>
-        <mc:AlternateContent xmlns:mc="http://schemas.openxmlformats.org/markup-compatibility/2006">
-          <mc:Choice xmlns:a14="http://schemas.microsoft.com/office/drawing/2010/main" Requires="a14">
+        <mc:AlternateContent xmlns:mc="http://schemas.openxmlformats.org/markup-compatibility/2006" xmlns:a14="http://schemas.microsoft.com/office/drawing/2010/main">
+          <mc:Choice Requires="a14">
             <p:sp>
               <p:nvSpPr>
                 <p:cNvPr id="67" name="TextBox 66">
@@ -6118,6 +7898,7 @@
                 </a:bodyPr>
                 <a:lstStyle/>
                 <a:p>
+                  <a:pPr/>
                   <a14:m>
                     <m:oMathPara xmlns:m="http://schemas.openxmlformats.org/officeDocument/2006/math">
                       <m:oMathParaPr>
@@ -6156,7 +7937,7 @@
               </p:txBody>
             </p:sp>
           </mc:Choice>
-          <mc:Fallback>
+          <mc:Fallback xmlns="">
             <p:sp>
               <p:nvSpPr>
                 <p:cNvPr id="67" name="TextBox 66">
@@ -6289,8 +8070,8 @@
             </a:fontRef>
           </p:style>
         </p:cxnSp>
-        <mc:AlternateContent xmlns:mc="http://schemas.openxmlformats.org/markup-compatibility/2006">
-          <mc:Choice xmlns:a14="http://schemas.microsoft.com/office/drawing/2010/main" Requires="a14">
+        <mc:AlternateContent xmlns:mc="http://schemas.openxmlformats.org/markup-compatibility/2006" xmlns:a14="http://schemas.microsoft.com/office/drawing/2010/main">
+          <mc:Choice Requires="a14">
             <p:sp>
               <p:nvSpPr>
                 <p:cNvPr id="77" name="TextBox 76">
@@ -6319,6 +8100,7 @@
                 </a:bodyPr>
                 <a:lstStyle/>
                 <a:p>
+                  <a:pPr/>
                   <a14:m>
                     <m:oMathPara xmlns:m="http://schemas.openxmlformats.org/officeDocument/2006/math">
                       <m:oMathParaPr>
@@ -6357,7 +8139,7 @@
               </p:txBody>
             </p:sp>
           </mc:Choice>
-          <mc:Fallback>
+          <mc:Fallback xmlns="">
             <p:sp>
               <p:nvSpPr>
                 <p:cNvPr id="77" name="TextBox 76">
@@ -6416,7 +8198,2558 @@
 </p:sld>
 </file>
 
-<file path=ppt/slides/slide5.xml><?xml version="1.0" encoding="utf-8"?>
+<file path=ppt/slides/slide7.xml><?xml version="1.0" encoding="utf-8"?>
+<p:sld xmlns:a="http://schemas.openxmlformats.org/drawingml/2006/main" xmlns:r="http://schemas.openxmlformats.org/officeDocument/2006/relationships" xmlns:p="http://schemas.openxmlformats.org/presentationml/2006/main">
+  <p:cSld>
+    <p:spTree>
+      <p:nvGrpSpPr>
+        <p:cNvPr id="1" name=""/>
+        <p:cNvGrpSpPr/>
+        <p:nvPr/>
+      </p:nvGrpSpPr>
+      <p:grpSpPr>
+        <a:xfrm>
+          <a:off x="0" y="0"/>
+          <a:ext cx="0" cy="0"/>
+          <a:chOff x="0" y="0"/>
+          <a:chExt cx="0" cy="0"/>
+        </a:xfrm>
+      </p:grpSpPr>
+      <p:grpSp>
+        <p:nvGrpSpPr>
+          <p:cNvPr id="117" name="Group 116">
+            <a:extLst>
+              <a:ext uri="{FF2B5EF4-FFF2-40B4-BE49-F238E27FC236}">
+                <a16:creationId xmlns:a16="http://schemas.microsoft.com/office/drawing/2014/main" id="{4E634AC6-AB60-4ED9-9557-956638FA5274}"/>
+              </a:ext>
+            </a:extLst>
+          </p:cNvPr>
+          <p:cNvGrpSpPr/>
+          <p:nvPr/>
+        </p:nvGrpSpPr>
+        <p:grpSpPr>
+          <a:xfrm>
+            <a:off x="1581584" y="610867"/>
+            <a:ext cx="6247423" cy="2538301"/>
+            <a:chOff x="1581584" y="610867"/>
+            <a:chExt cx="6247423" cy="2538301"/>
+          </a:xfrm>
+        </p:grpSpPr>
+        <p:grpSp>
+          <p:nvGrpSpPr>
+            <p:cNvPr id="51" name="Group 50">
+              <a:extLst>
+                <a:ext uri="{FF2B5EF4-FFF2-40B4-BE49-F238E27FC236}">
+                  <a16:creationId xmlns:a16="http://schemas.microsoft.com/office/drawing/2014/main" id="{9E9B190F-5A9C-4651-8AF0-408C46D1081D}"/>
+                </a:ext>
+              </a:extLst>
+            </p:cNvPr>
+            <p:cNvGrpSpPr>
+              <a:grpSpLocks noChangeAspect="1"/>
+            </p:cNvGrpSpPr>
+            <p:nvPr/>
+          </p:nvGrpSpPr>
+          <p:grpSpPr>
+            <a:xfrm>
+              <a:off x="3753844" y="1412151"/>
+              <a:ext cx="484372" cy="550800"/>
+              <a:chOff x="4257674" y="3086100"/>
+              <a:chExt cx="2438089" cy="2772457"/>
+            </a:xfrm>
+          </p:grpSpPr>
+          <p:pic>
+            <p:nvPicPr>
+              <p:cNvPr id="52" name="Picture 51">
+                <a:extLst>
+                  <a:ext uri="{FF2B5EF4-FFF2-40B4-BE49-F238E27FC236}">
+                    <a16:creationId xmlns:a16="http://schemas.microsoft.com/office/drawing/2014/main" id="{3EBD7D33-7AB0-4BB8-8FE1-FEFC7BABDDF1}"/>
+                  </a:ext>
+                </a:extLst>
+              </p:cNvPr>
+              <p:cNvPicPr>
+                <a:picLocks noChangeAspect="1"/>
+              </p:cNvPicPr>
+              <p:nvPr/>
+            </p:nvPicPr>
+            <p:blipFill rotWithShape="1">
+              <a:blip r:embed="rId2"/>
+              <a:srcRect t="27375"/>
+              <a:stretch/>
+            </p:blipFill>
+            <p:spPr>
+              <a:xfrm>
+                <a:off x="4257674" y="3190880"/>
+                <a:ext cx="2438089" cy="2667677"/>
+              </a:xfrm>
+              <a:prstGeom prst="rect">
+                <a:avLst/>
+              </a:prstGeom>
+            </p:spPr>
+          </p:pic>
+          <p:sp>
+            <p:nvSpPr>
+              <p:cNvPr id="53" name="Oval 52">
+                <a:extLst>
+                  <a:ext uri="{FF2B5EF4-FFF2-40B4-BE49-F238E27FC236}">
+                    <a16:creationId xmlns:a16="http://schemas.microsoft.com/office/drawing/2014/main" id="{ADD1D229-1631-4BD9-B582-3895F4334DC5}"/>
+                  </a:ext>
+                </a:extLst>
+              </p:cNvPr>
+              <p:cNvSpPr/>
+              <p:nvPr/>
+            </p:nvSpPr>
+            <p:spPr>
+              <a:xfrm>
+                <a:off x="4453557" y="3086100"/>
+                <a:ext cx="470868" cy="342900"/>
+              </a:xfrm>
+              <a:prstGeom prst="ellipse">
+                <a:avLst/>
+              </a:prstGeom>
+              <a:solidFill>
+                <a:schemeClr val="bg1"/>
+              </a:solidFill>
+              <a:ln>
+                <a:solidFill>
+                  <a:schemeClr val="bg1"/>
+                </a:solidFill>
+              </a:ln>
+            </p:spPr>
+            <p:style>
+              <a:lnRef idx="2">
+                <a:schemeClr val="accent1">
+                  <a:shade val="50000"/>
+                </a:schemeClr>
+              </a:lnRef>
+              <a:fillRef idx="1">
+                <a:schemeClr val="accent1"/>
+              </a:fillRef>
+              <a:effectRef idx="0">
+                <a:schemeClr val="accent1"/>
+              </a:effectRef>
+              <a:fontRef idx="minor">
+                <a:schemeClr val="lt1"/>
+              </a:fontRef>
+            </p:style>
+            <p:txBody>
+              <a:bodyPr rtlCol="0" anchor="ctr"/>
+              <a:lstStyle/>
+              <a:p>
+                <a:pPr algn="ctr"/>
+                <a:endParaRPr lang="fr-CA"/>
+              </a:p>
+            </p:txBody>
+          </p:sp>
+        </p:grpSp>
+        <p:grpSp>
+          <p:nvGrpSpPr>
+            <p:cNvPr id="47" name="Group 46">
+              <a:extLst>
+                <a:ext uri="{FF2B5EF4-FFF2-40B4-BE49-F238E27FC236}">
+                  <a16:creationId xmlns:a16="http://schemas.microsoft.com/office/drawing/2014/main" id="{5C93009D-41FB-4550-8358-14B350059DDD}"/>
+                </a:ext>
+              </a:extLst>
+            </p:cNvPr>
+            <p:cNvGrpSpPr/>
+            <p:nvPr/>
+          </p:nvGrpSpPr>
+          <p:grpSpPr>
+            <a:xfrm>
+              <a:off x="5801174" y="951741"/>
+              <a:ext cx="915900" cy="1041509"/>
+              <a:chOff x="4257676" y="3086100"/>
+              <a:chExt cx="2438090" cy="2772454"/>
+            </a:xfrm>
+          </p:grpSpPr>
+          <p:pic>
+            <p:nvPicPr>
+              <p:cNvPr id="48" name="Picture 47">
+                <a:extLst>
+                  <a:ext uri="{FF2B5EF4-FFF2-40B4-BE49-F238E27FC236}">
+                    <a16:creationId xmlns:a16="http://schemas.microsoft.com/office/drawing/2014/main" id="{86E08B0A-8C6D-46AF-BCA7-ADD55819CA01}"/>
+                  </a:ext>
+                </a:extLst>
+              </p:cNvPr>
+              <p:cNvPicPr>
+                <a:picLocks noChangeAspect="1"/>
+              </p:cNvPicPr>
+              <p:nvPr/>
+            </p:nvPicPr>
+            <p:blipFill rotWithShape="1">
+              <a:blip r:embed="rId2"/>
+              <a:srcRect t="27375"/>
+              <a:stretch/>
+            </p:blipFill>
+            <p:spPr>
+              <a:xfrm>
+                <a:off x="4257676" y="3190875"/>
+                <a:ext cx="2438090" cy="2667679"/>
+              </a:xfrm>
+              <a:prstGeom prst="rect">
+                <a:avLst/>
+              </a:prstGeom>
+            </p:spPr>
+          </p:pic>
+          <p:sp>
+            <p:nvSpPr>
+              <p:cNvPr id="49" name="Oval 48">
+                <a:extLst>
+                  <a:ext uri="{FF2B5EF4-FFF2-40B4-BE49-F238E27FC236}">
+                    <a16:creationId xmlns:a16="http://schemas.microsoft.com/office/drawing/2014/main" id="{22B0E459-1719-4A14-AE21-C59E1A007AB2}"/>
+                  </a:ext>
+                </a:extLst>
+              </p:cNvPr>
+              <p:cNvSpPr/>
+              <p:nvPr/>
+            </p:nvSpPr>
+            <p:spPr>
+              <a:xfrm>
+                <a:off x="4453557" y="3086100"/>
+                <a:ext cx="470868" cy="342900"/>
+              </a:xfrm>
+              <a:prstGeom prst="ellipse">
+                <a:avLst/>
+              </a:prstGeom>
+              <a:solidFill>
+                <a:schemeClr val="bg1"/>
+              </a:solidFill>
+              <a:ln>
+                <a:solidFill>
+                  <a:schemeClr val="bg1"/>
+                </a:solidFill>
+              </a:ln>
+            </p:spPr>
+            <p:style>
+              <a:lnRef idx="2">
+                <a:schemeClr val="accent1">
+                  <a:shade val="50000"/>
+                </a:schemeClr>
+              </a:lnRef>
+              <a:fillRef idx="1">
+                <a:schemeClr val="accent1"/>
+              </a:fillRef>
+              <a:effectRef idx="0">
+                <a:schemeClr val="accent1"/>
+              </a:effectRef>
+              <a:fontRef idx="minor">
+                <a:schemeClr val="lt1"/>
+              </a:fontRef>
+            </p:style>
+            <p:txBody>
+              <a:bodyPr rtlCol="0" anchor="ctr"/>
+              <a:lstStyle/>
+              <a:p>
+                <a:pPr algn="ctr"/>
+                <a:endParaRPr lang="fr-CA"/>
+              </a:p>
+            </p:txBody>
+          </p:sp>
+        </p:grpSp>
+        <p:cxnSp>
+          <p:nvCxnSpPr>
+            <p:cNvPr id="96" name="Straight Connector 95">
+              <a:extLst>
+                <a:ext uri="{FF2B5EF4-FFF2-40B4-BE49-F238E27FC236}">
+                  <a16:creationId xmlns:a16="http://schemas.microsoft.com/office/drawing/2014/main" id="{33100C3A-F4F1-4491-A930-B3A1AF7780E6}"/>
+                </a:ext>
+              </a:extLst>
+            </p:cNvPr>
+            <p:cNvCxnSpPr>
+              <a:cxnSpLocks/>
+            </p:cNvCxnSpPr>
+            <p:nvPr/>
+          </p:nvCxnSpPr>
+          <p:spPr>
+            <a:xfrm flipV="1">
+              <a:off x="1751254" y="1097051"/>
+              <a:ext cx="4488732" cy="773474"/>
+            </a:xfrm>
+            <a:prstGeom prst="line">
+              <a:avLst/>
+            </a:prstGeom>
+            <a:ln w="28575">
+              <a:solidFill>
+                <a:schemeClr val="tx1"/>
+              </a:solidFill>
+              <a:prstDash val="dashDot"/>
+            </a:ln>
+          </p:spPr>
+          <p:style>
+            <a:lnRef idx="1">
+              <a:schemeClr val="accent1"/>
+            </a:lnRef>
+            <a:fillRef idx="0">
+              <a:schemeClr val="accent1"/>
+            </a:fillRef>
+            <a:effectRef idx="0">
+              <a:schemeClr val="accent1"/>
+            </a:effectRef>
+            <a:fontRef idx="minor">
+              <a:schemeClr val="tx1"/>
+            </a:fontRef>
+          </p:style>
+        </p:cxnSp>
+        <p:cxnSp>
+          <p:nvCxnSpPr>
+            <p:cNvPr id="6" name="Straight Arrow Connector 5">
+              <a:extLst>
+                <a:ext uri="{FF2B5EF4-FFF2-40B4-BE49-F238E27FC236}">
+                  <a16:creationId xmlns:a16="http://schemas.microsoft.com/office/drawing/2014/main" id="{FACBD571-E06F-4E1C-88B2-B517AC7F1A51}"/>
+                </a:ext>
+              </a:extLst>
+            </p:cNvPr>
+            <p:cNvCxnSpPr>
+              <a:cxnSpLocks/>
+            </p:cNvCxnSpPr>
+            <p:nvPr/>
+          </p:nvCxnSpPr>
+          <p:spPr>
+            <a:xfrm>
+              <a:off x="1732256" y="1875575"/>
+              <a:ext cx="0" cy="725012"/>
+            </a:xfrm>
+            <a:prstGeom prst="straightConnector1">
+              <a:avLst/>
+            </a:prstGeom>
+            <a:ln w="28575">
+              <a:solidFill>
+                <a:srgbClr val="00B050"/>
+              </a:solidFill>
+              <a:tailEnd type="triangle"/>
+            </a:ln>
+          </p:spPr>
+          <p:style>
+            <a:lnRef idx="1">
+              <a:schemeClr val="accent1"/>
+            </a:lnRef>
+            <a:fillRef idx="0">
+              <a:schemeClr val="accent1"/>
+            </a:fillRef>
+            <a:effectRef idx="0">
+              <a:schemeClr val="accent1"/>
+            </a:effectRef>
+            <a:fontRef idx="minor">
+              <a:schemeClr val="tx1"/>
+            </a:fontRef>
+          </p:style>
+        </p:cxnSp>
+        <p:sp>
+          <p:nvSpPr>
+            <p:cNvPr id="45" name="Parallelogram 44">
+              <a:extLst>
+                <a:ext uri="{FF2B5EF4-FFF2-40B4-BE49-F238E27FC236}">
+                  <a16:creationId xmlns:a16="http://schemas.microsoft.com/office/drawing/2014/main" id="{933702A2-B24F-4655-BCBC-850DD5AA96FA}"/>
+                </a:ext>
+              </a:extLst>
+            </p:cNvPr>
+            <p:cNvSpPr/>
+            <p:nvPr/>
+          </p:nvSpPr>
+          <p:spPr>
+            <a:xfrm rot="5400000">
+              <a:off x="3418605" y="1200133"/>
+              <a:ext cx="1348846" cy="1359771"/>
+            </a:xfrm>
+            <a:prstGeom prst="parallelogram">
+              <a:avLst/>
+            </a:prstGeom>
+            <a:noFill/>
+          </p:spPr>
+          <p:style>
+            <a:lnRef idx="2">
+              <a:schemeClr val="accent1">
+                <a:shade val="50000"/>
+              </a:schemeClr>
+            </a:lnRef>
+            <a:fillRef idx="1">
+              <a:schemeClr val="accent1"/>
+            </a:fillRef>
+            <a:effectRef idx="0">
+              <a:schemeClr val="accent1"/>
+            </a:effectRef>
+            <a:fontRef idx="minor">
+              <a:schemeClr val="lt1"/>
+            </a:fontRef>
+          </p:style>
+          <p:txBody>
+            <a:bodyPr rtlCol="0" anchor="ctr"/>
+            <a:lstStyle/>
+            <a:p>
+              <a:pPr algn="ctr"/>
+              <a:endParaRPr lang="fr-CA"/>
+            </a:p>
+          </p:txBody>
+        </p:sp>
+        <p:sp>
+          <p:nvSpPr>
+            <p:cNvPr id="46" name="Parallelogram 45">
+              <a:extLst>
+                <a:ext uri="{FF2B5EF4-FFF2-40B4-BE49-F238E27FC236}">
+                  <a16:creationId xmlns:a16="http://schemas.microsoft.com/office/drawing/2014/main" id="{9314D7CF-CB4C-4516-8DF6-50BEA5C3CAEF}"/>
+                </a:ext>
+              </a:extLst>
+            </p:cNvPr>
+            <p:cNvSpPr/>
+            <p:nvPr/>
+          </p:nvSpPr>
+          <p:spPr>
+            <a:xfrm rot="5400000">
+              <a:off x="5281856" y="602018"/>
+              <a:ext cx="2538301" cy="2556000"/>
+            </a:xfrm>
+            <a:prstGeom prst="parallelogram">
+              <a:avLst/>
+            </a:prstGeom>
+            <a:noFill/>
+          </p:spPr>
+          <p:style>
+            <a:lnRef idx="2">
+              <a:schemeClr val="accent1">
+                <a:shade val="50000"/>
+              </a:schemeClr>
+            </a:lnRef>
+            <a:fillRef idx="1">
+              <a:schemeClr val="accent1"/>
+            </a:fillRef>
+            <a:effectRef idx="0">
+              <a:schemeClr val="accent1"/>
+            </a:effectRef>
+            <a:fontRef idx="minor">
+              <a:schemeClr val="lt1"/>
+            </a:fontRef>
+          </p:style>
+          <p:txBody>
+            <a:bodyPr rtlCol="0" anchor="ctr"/>
+            <a:lstStyle/>
+            <a:p>
+              <a:pPr algn="ctr"/>
+              <a:endParaRPr lang="fr-CA"/>
+            </a:p>
+          </p:txBody>
+        </p:sp>
+        <p:cxnSp>
+          <p:nvCxnSpPr>
+            <p:cNvPr id="55" name="Straight Connector 54">
+              <a:extLst>
+                <a:ext uri="{FF2B5EF4-FFF2-40B4-BE49-F238E27FC236}">
+                  <a16:creationId xmlns:a16="http://schemas.microsoft.com/office/drawing/2014/main" id="{F16690A6-0AD0-40F8-BF0F-C8BC24FA0E81}"/>
+                </a:ext>
+              </a:extLst>
+            </p:cNvPr>
+            <p:cNvCxnSpPr>
+              <a:cxnSpLocks/>
+            </p:cNvCxnSpPr>
+            <p:nvPr/>
+          </p:nvCxnSpPr>
+          <p:spPr>
+            <a:xfrm flipV="1">
+              <a:off x="1732256" y="1879735"/>
+              <a:ext cx="4752000" cy="0"/>
+            </a:xfrm>
+            <a:prstGeom prst="line">
+              <a:avLst/>
+            </a:prstGeom>
+            <a:ln w="28575">
+              <a:solidFill>
+                <a:schemeClr val="tx1"/>
+              </a:solidFill>
+              <a:prstDash val="dashDot"/>
+            </a:ln>
+          </p:spPr>
+          <p:style>
+            <a:lnRef idx="1">
+              <a:schemeClr val="accent1"/>
+            </a:lnRef>
+            <a:fillRef idx="0">
+              <a:schemeClr val="accent1"/>
+            </a:fillRef>
+            <a:effectRef idx="0">
+              <a:schemeClr val="accent1"/>
+            </a:effectRef>
+            <a:fontRef idx="minor">
+              <a:schemeClr val="tx1"/>
+            </a:fontRef>
+          </p:style>
+        </p:cxnSp>
+        <p:sp>
+          <p:nvSpPr>
+            <p:cNvPr id="59" name="Right Brace 58">
+              <a:extLst>
+                <a:ext uri="{FF2B5EF4-FFF2-40B4-BE49-F238E27FC236}">
+                  <a16:creationId xmlns:a16="http://schemas.microsoft.com/office/drawing/2014/main" id="{25EE2052-298E-43CF-BB07-1FF04FF44DD2}"/>
+                </a:ext>
+              </a:extLst>
+            </p:cNvPr>
+            <p:cNvSpPr/>
+            <p:nvPr/>
+          </p:nvSpPr>
+          <p:spPr>
+            <a:xfrm rot="5400000">
+              <a:off x="2662479" y="968794"/>
+              <a:ext cx="486561" cy="2309011"/>
+            </a:xfrm>
+            <a:prstGeom prst="rightBrace">
+              <a:avLst>
+                <a:gd name="adj1" fmla="val 118639"/>
+                <a:gd name="adj2" fmla="val 50000"/>
+              </a:avLst>
+            </a:prstGeom>
+            <a:ln w="12700">
+              <a:solidFill>
+                <a:schemeClr val="accent2"/>
+              </a:solidFill>
+            </a:ln>
+          </p:spPr>
+          <p:style>
+            <a:lnRef idx="1">
+              <a:schemeClr val="accent1"/>
+            </a:lnRef>
+            <a:fillRef idx="0">
+              <a:schemeClr val="accent1"/>
+            </a:fillRef>
+            <a:effectRef idx="0">
+              <a:schemeClr val="accent1"/>
+            </a:effectRef>
+            <a:fontRef idx="minor">
+              <a:schemeClr val="tx1"/>
+            </a:fontRef>
+          </p:style>
+          <p:txBody>
+            <a:bodyPr rtlCol="0" anchor="ctr"/>
+            <a:lstStyle/>
+            <a:p>
+              <a:pPr algn="ctr"/>
+              <a:endParaRPr lang="fr-CA"/>
+            </a:p>
+          </p:txBody>
+        </p:sp>
+        <mc:AlternateContent xmlns:mc="http://schemas.openxmlformats.org/markup-compatibility/2006">
+          <mc:Choice xmlns:a14="http://schemas.microsoft.com/office/drawing/2010/main" Requires="a14">
+            <p:sp>
+              <p:nvSpPr>
+                <p:cNvPr id="61" name="TextBox 60">
+                  <a:extLst>
+                    <a:ext uri="{FF2B5EF4-FFF2-40B4-BE49-F238E27FC236}">
+                      <a16:creationId xmlns:a16="http://schemas.microsoft.com/office/drawing/2014/main" id="{5A0061E2-5BCA-4094-8717-DBA002F94899}"/>
+                    </a:ext>
+                  </a:extLst>
+                </p:cNvPr>
+                <p:cNvSpPr txBox="1"/>
+                <p:nvPr/>
+              </p:nvSpPr>
+              <p:spPr>
+                <a:xfrm>
+                  <a:off x="2812625" y="2415942"/>
+                  <a:ext cx="186268" cy="276999"/>
+                </a:xfrm>
+                <a:prstGeom prst="rect">
+                  <a:avLst/>
+                </a:prstGeom>
+                <a:noFill/>
+              </p:spPr>
+              <p:txBody>
+                <a:bodyPr wrap="none" lIns="0" tIns="0" rIns="0" bIns="0" rtlCol="0">
+                  <a:spAutoFit/>
+                </a:bodyPr>
+                <a:lstStyle/>
+                <a:p>
+                  <a14:m>
+                    <m:oMathPara xmlns:m="http://schemas.openxmlformats.org/officeDocument/2006/math">
+                      <m:oMathParaPr>
+                        <m:jc m:val="centerGroup"/>
+                      </m:oMathParaPr>
+                      <m:oMath xmlns:m="http://schemas.openxmlformats.org/officeDocument/2006/math">
+                        <m:r>
+                          <a:rPr lang="en-US" b="0" i="1" smtClean="0">
+                            <a:latin typeface="Cambria Math" panose="02040503050406030204" pitchFamily="18" charset="0"/>
+                          </a:rPr>
+                          <m:t>𝑓</m:t>
+                        </m:r>
+                      </m:oMath>
+                    </m:oMathPara>
+                  </a14:m>
+                  <a:endParaRPr lang="fr-CA" dirty="0"/>
+                </a:p>
+              </p:txBody>
+            </p:sp>
+          </mc:Choice>
+          <mc:Fallback>
+            <p:sp>
+              <p:nvSpPr>
+                <p:cNvPr id="61" name="TextBox 60">
+                  <a:extLst>
+                    <a:ext uri="{FF2B5EF4-FFF2-40B4-BE49-F238E27FC236}">
+                      <a16:creationId xmlns:a16="http://schemas.microsoft.com/office/drawing/2014/main" id="{5A0061E2-5BCA-4094-8717-DBA002F94899}"/>
+                    </a:ext>
+                  </a:extLst>
+                </p:cNvPr>
+                <p:cNvSpPr txBox="1">
+                  <a:spLocks noRot="1" noChangeAspect="1" noMove="1" noResize="1" noEditPoints="1" noAdjustHandles="1" noChangeArrowheads="1" noChangeShapeType="1" noTextEdit="1"/>
+                </p:cNvSpPr>
+                <p:nvPr/>
+              </p:nvSpPr>
+              <p:spPr>
+                <a:xfrm>
+                  <a:off x="2812625" y="2415942"/>
+                  <a:ext cx="186268" cy="276999"/>
+                </a:xfrm>
+                <a:prstGeom prst="rect">
+                  <a:avLst/>
+                </a:prstGeom>
+                <a:blipFill>
+                  <a:blip r:embed="rId3"/>
+                  <a:stretch>
+                    <a:fillRect l="-45161" t="-2174" r="-38710" b="-32609"/>
+                  </a:stretch>
+                </a:blipFill>
+              </p:spPr>
+              <p:txBody>
+                <a:bodyPr/>
+                <a:lstStyle/>
+                <a:p>
+                  <a:r>
+                    <a:rPr lang="fr-CA">
+                      <a:noFill/>
+                    </a:rPr>
+                    <a:t> </a:t>
+                  </a:r>
+                </a:p>
+              </p:txBody>
+            </p:sp>
+          </mc:Fallback>
+        </mc:AlternateContent>
+        <p:sp>
+          <p:nvSpPr>
+            <p:cNvPr id="62" name="Oval 61">
+              <a:extLst>
+                <a:ext uri="{FF2B5EF4-FFF2-40B4-BE49-F238E27FC236}">
+                  <a16:creationId xmlns:a16="http://schemas.microsoft.com/office/drawing/2014/main" id="{9C0C9AA9-9328-4FFA-8A7E-4A5FA739A36C}"/>
+                </a:ext>
+              </a:extLst>
+            </p:cNvPr>
+            <p:cNvSpPr/>
+            <p:nvPr/>
+          </p:nvSpPr>
+          <p:spPr>
+            <a:xfrm>
+              <a:off x="3925223" y="1476390"/>
+              <a:ext cx="46800" cy="45719"/>
+            </a:xfrm>
+            <a:prstGeom prst="ellipse">
+              <a:avLst/>
+            </a:prstGeom>
+            <a:solidFill>
+              <a:srgbClr val="00B050"/>
+            </a:solidFill>
+            <a:ln>
+              <a:solidFill>
+                <a:srgbClr val="00B050"/>
+              </a:solidFill>
+            </a:ln>
+          </p:spPr>
+          <p:style>
+            <a:lnRef idx="2">
+              <a:schemeClr val="accent1">
+                <a:shade val="50000"/>
+              </a:schemeClr>
+            </a:lnRef>
+            <a:fillRef idx="1">
+              <a:schemeClr val="accent1"/>
+            </a:fillRef>
+            <a:effectRef idx="0">
+              <a:schemeClr val="accent1"/>
+            </a:effectRef>
+            <a:fontRef idx="minor">
+              <a:schemeClr val="lt1"/>
+            </a:fontRef>
+          </p:style>
+          <p:txBody>
+            <a:bodyPr rtlCol="0" anchor="ctr"/>
+            <a:lstStyle/>
+            <a:p>
+              <a:pPr algn="ctr"/>
+              <a:endParaRPr lang="fr-CA"/>
+            </a:p>
+          </p:txBody>
+        </p:sp>
+        <p:sp>
+          <p:nvSpPr>
+            <p:cNvPr id="63" name="Oval 62">
+              <a:extLst>
+                <a:ext uri="{FF2B5EF4-FFF2-40B4-BE49-F238E27FC236}">
+                  <a16:creationId xmlns:a16="http://schemas.microsoft.com/office/drawing/2014/main" id="{5F129744-03AB-446A-8222-E2BC1234142C}"/>
+                </a:ext>
+              </a:extLst>
+            </p:cNvPr>
+            <p:cNvSpPr/>
+            <p:nvPr/>
+          </p:nvSpPr>
+          <p:spPr>
+            <a:xfrm>
+              <a:off x="6200040" y="1075116"/>
+              <a:ext cx="46800" cy="45719"/>
+            </a:xfrm>
+            <a:prstGeom prst="ellipse">
+              <a:avLst/>
+            </a:prstGeom>
+            <a:solidFill>
+              <a:schemeClr val="tx1"/>
+            </a:solidFill>
+            <a:ln>
+              <a:solidFill>
+                <a:schemeClr val="tx1"/>
+              </a:solidFill>
+            </a:ln>
+          </p:spPr>
+          <p:style>
+            <a:lnRef idx="2">
+              <a:schemeClr val="accent1">
+                <a:shade val="50000"/>
+              </a:schemeClr>
+            </a:lnRef>
+            <a:fillRef idx="1">
+              <a:schemeClr val="accent1"/>
+            </a:fillRef>
+            <a:effectRef idx="0">
+              <a:schemeClr val="accent1"/>
+            </a:effectRef>
+            <a:fontRef idx="minor">
+              <a:schemeClr val="lt1"/>
+            </a:fontRef>
+          </p:style>
+          <p:txBody>
+            <a:bodyPr rtlCol="0" anchor="ctr"/>
+            <a:lstStyle/>
+            <a:p>
+              <a:pPr algn="ctr"/>
+              <a:endParaRPr lang="fr-CA"/>
+            </a:p>
+          </p:txBody>
+        </p:sp>
+        <mc:AlternateContent xmlns:mc="http://schemas.openxmlformats.org/markup-compatibility/2006">
+          <mc:Choice xmlns:a14="http://schemas.microsoft.com/office/drawing/2010/main" Requires="a14">
+            <p:sp>
+              <p:nvSpPr>
+                <p:cNvPr id="64" name="TextBox 63">
+                  <a:extLst>
+                    <a:ext uri="{FF2B5EF4-FFF2-40B4-BE49-F238E27FC236}">
+                      <a16:creationId xmlns:a16="http://schemas.microsoft.com/office/drawing/2014/main" id="{8460AE61-23CA-496B-8E1E-F9BBC0357145}"/>
+                    </a:ext>
+                  </a:extLst>
+                </p:cNvPr>
+                <p:cNvSpPr txBox="1"/>
+                <p:nvPr/>
+              </p:nvSpPr>
+              <p:spPr>
+                <a:xfrm>
+                  <a:off x="2298892" y="2228080"/>
+                  <a:ext cx="552139" cy="276999"/>
+                </a:xfrm>
+                <a:prstGeom prst="rect">
+                  <a:avLst/>
+                </a:prstGeom>
+                <a:noFill/>
+              </p:spPr>
+              <p:txBody>
+                <a:bodyPr wrap="none" lIns="0" tIns="0" rIns="0" bIns="0" rtlCol="0">
+                  <a:spAutoFit/>
+                </a:bodyPr>
+                <a:lstStyle/>
+                <a:p>
+                  <a14:m>
+                    <m:oMathPara xmlns:m="http://schemas.openxmlformats.org/officeDocument/2006/math">
+                      <m:oMathParaPr>
+                        <m:jc m:val="centerGroup"/>
+                      </m:oMathParaPr>
+                      <m:oMath xmlns:m="http://schemas.openxmlformats.org/officeDocument/2006/math">
+                        <m:sSub>
+                          <m:sSubPr>
+                            <m:ctrlPr>
+                              <a:rPr lang="en-US" b="0" i="1" smtClean="0">
+                                <a:latin typeface="Cambria Math" panose="02040503050406030204" pitchFamily="18" charset="0"/>
+                              </a:rPr>
+                            </m:ctrlPr>
+                          </m:sSubPr>
+                          <m:e>
+                            <m:r>
+                              <a:rPr lang="en-US" b="0" i="1" smtClean="0">
+                                <a:latin typeface="Cambria Math" panose="02040503050406030204" pitchFamily="18" charset="0"/>
+                              </a:rPr>
+                              <m:t>𝑋</m:t>
+                            </m:r>
+                          </m:e>
+                          <m:sub>
+                            <m:r>
+                              <a:rPr lang="en-US" b="0" i="1" smtClean="0">
+                                <a:latin typeface="Cambria Math" panose="02040503050406030204" pitchFamily="18" charset="0"/>
+                              </a:rPr>
+                              <m:t>𝑐</m:t>
+                            </m:r>
+                            <m:r>
+                              <a:rPr lang="en-CA" b="0" i="1" smtClean="0">
+                                <a:latin typeface="Cambria Math" panose="02040503050406030204" pitchFamily="18" charset="0"/>
+                              </a:rPr>
+                              <m:t>𝑎𝑚</m:t>
+                            </m:r>
+                          </m:sub>
+                        </m:sSub>
+                      </m:oMath>
+                    </m:oMathPara>
+                  </a14:m>
+                  <a:endParaRPr lang="fr-CA" dirty="0"/>
+                </a:p>
+              </p:txBody>
+            </p:sp>
+          </mc:Choice>
+          <mc:Fallback>
+            <p:sp>
+              <p:nvSpPr>
+                <p:cNvPr id="64" name="TextBox 63">
+                  <a:extLst>
+                    <a:ext uri="{FF2B5EF4-FFF2-40B4-BE49-F238E27FC236}">
+                      <a16:creationId xmlns:a16="http://schemas.microsoft.com/office/drawing/2014/main" id="{8460AE61-23CA-496B-8E1E-F9BBC0357145}"/>
+                    </a:ext>
+                  </a:extLst>
+                </p:cNvPr>
+                <p:cNvSpPr txBox="1">
+                  <a:spLocks noRot="1" noChangeAspect="1" noMove="1" noResize="1" noEditPoints="1" noAdjustHandles="1" noChangeArrowheads="1" noChangeShapeType="1" noTextEdit="1"/>
+                </p:cNvSpPr>
+                <p:nvPr/>
+              </p:nvSpPr>
+              <p:spPr>
+                <a:xfrm>
+                  <a:off x="2298892" y="2228080"/>
+                  <a:ext cx="552139" cy="276999"/>
+                </a:xfrm>
+                <a:prstGeom prst="rect">
+                  <a:avLst/>
+                </a:prstGeom>
+                <a:blipFill>
+                  <a:blip r:embed="rId4"/>
+                  <a:stretch>
+                    <a:fillRect l="-8791" r="-2198" b="-10870"/>
+                  </a:stretch>
+                </a:blipFill>
+              </p:spPr>
+              <p:txBody>
+                <a:bodyPr/>
+                <a:lstStyle/>
+                <a:p>
+                  <a:r>
+                    <a:rPr lang="fr-CA">
+                      <a:noFill/>
+                    </a:rPr>
+                    <a:t> </a:t>
+                  </a:r>
+                </a:p>
+              </p:txBody>
+            </p:sp>
+          </mc:Fallback>
+        </mc:AlternateContent>
+        <mc:AlternateContent xmlns:mc="http://schemas.openxmlformats.org/markup-compatibility/2006">
+          <mc:Choice xmlns:a14="http://schemas.microsoft.com/office/drawing/2010/main" Requires="a14">
+            <p:sp>
+              <p:nvSpPr>
+                <p:cNvPr id="65" name="TextBox 64">
+                  <a:extLst>
+                    <a:ext uri="{FF2B5EF4-FFF2-40B4-BE49-F238E27FC236}">
+                      <a16:creationId xmlns:a16="http://schemas.microsoft.com/office/drawing/2014/main" id="{83DBC90B-59F0-4208-BD0A-9422E5840AA2}"/>
+                    </a:ext>
+                  </a:extLst>
+                </p:cNvPr>
+                <p:cNvSpPr txBox="1"/>
+                <p:nvPr/>
+              </p:nvSpPr>
+              <p:spPr>
+                <a:xfrm>
+                  <a:off x="3391257" y="1233245"/>
+                  <a:ext cx="586530" cy="232436"/>
+                </a:xfrm>
+                <a:prstGeom prst="rect">
+                  <a:avLst/>
+                </a:prstGeom>
+                <a:noFill/>
+              </p:spPr>
+              <p:txBody>
+                <a:bodyPr wrap="square" lIns="0" tIns="0" rIns="0" bIns="0" rtlCol="0">
+                  <a:spAutoFit/>
+                </a:bodyPr>
+                <a:lstStyle/>
+                <a:p>
+                  <a14:m>
+                    <m:oMath xmlns:m="http://schemas.openxmlformats.org/officeDocument/2006/math">
+                      <m:r>
+                        <a:rPr lang="en-US" sz="1400" b="0" i="1" smtClean="0">
+                          <a:latin typeface="Cambria Math" panose="02040503050406030204" pitchFamily="18" charset="0"/>
+                        </a:rPr>
+                        <m:t>(</m:t>
+                      </m:r>
+                      <m:sSub>
+                        <m:sSubPr>
+                          <m:ctrlPr>
+                            <a:rPr lang="en-US" sz="1400" b="0" i="1" smtClean="0">
+                              <a:latin typeface="Cambria Math" panose="02040503050406030204" pitchFamily="18" charset="0"/>
+                            </a:rPr>
+                          </m:ctrlPr>
+                        </m:sSubPr>
+                        <m:e>
+                          <m:r>
+                            <a:rPr lang="en-US" sz="1400" b="0" i="1" smtClean="0">
+                              <a:latin typeface="Cambria Math" panose="02040503050406030204" pitchFamily="18" charset="0"/>
+                            </a:rPr>
+                            <m:t>𝑝</m:t>
+                          </m:r>
+                        </m:e>
+                        <m:sub>
+                          <m:r>
+                            <a:rPr lang="en-US" sz="1400" b="0" i="1" smtClean="0">
+                              <a:latin typeface="Cambria Math" panose="02040503050406030204" pitchFamily="18" charset="0"/>
+                            </a:rPr>
+                            <m:t>𝑥</m:t>
+                          </m:r>
+                        </m:sub>
+                      </m:sSub>
+                      <m:r>
+                        <a:rPr lang="en-US" sz="1400" b="0" i="1" smtClean="0">
+                          <a:latin typeface="Cambria Math" panose="02040503050406030204" pitchFamily="18" charset="0"/>
+                        </a:rPr>
+                        <m:t>,</m:t>
+                      </m:r>
+                      <m:sSub>
+                        <m:sSubPr>
+                          <m:ctrlPr>
+                            <a:rPr lang="en-US" sz="1400" i="1">
+                              <a:latin typeface="Cambria Math" panose="02040503050406030204" pitchFamily="18" charset="0"/>
+                            </a:rPr>
+                          </m:ctrlPr>
+                        </m:sSubPr>
+                        <m:e>
+                          <m:r>
+                            <a:rPr lang="en-US" sz="1400" i="1">
+                              <a:latin typeface="Cambria Math" panose="02040503050406030204" pitchFamily="18" charset="0"/>
+                            </a:rPr>
+                            <m:t>𝑝</m:t>
+                          </m:r>
+                        </m:e>
+                        <m:sub>
+                          <m:r>
+                            <a:rPr lang="en-US" sz="1400" b="0" i="1" smtClean="0">
+                              <a:latin typeface="Cambria Math" panose="02040503050406030204" pitchFamily="18" charset="0"/>
+                            </a:rPr>
+                            <m:t>𝑦</m:t>
+                          </m:r>
+                        </m:sub>
+                      </m:sSub>
+                    </m:oMath>
+                  </a14:m>
+                  <a:r>
+                    <a:rPr lang="fr-CA" sz="1400" dirty="0"/>
+                    <a:t>) </a:t>
+                  </a:r>
+                  <a:endParaRPr lang="fr-CA" dirty="0"/>
+                </a:p>
+              </p:txBody>
+            </p:sp>
+          </mc:Choice>
+          <mc:Fallback>
+            <p:sp>
+              <p:nvSpPr>
+                <p:cNvPr id="65" name="TextBox 64">
+                  <a:extLst>
+                    <a:ext uri="{FF2B5EF4-FFF2-40B4-BE49-F238E27FC236}">
+                      <a16:creationId xmlns:a16="http://schemas.microsoft.com/office/drawing/2014/main" id="{83DBC90B-59F0-4208-BD0A-9422E5840AA2}"/>
+                    </a:ext>
+                  </a:extLst>
+                </p:cNvPr>
+                <p:cNvSpPr txBox="1">
+                  <a:spLocks noRot="1" noChangeAspect="1" noMove="1" noResize="1" noEditPoints="1" noAdjustHandles="1" noChangeArrowheads="1" noChangeShapeType="1" noTextEdit="1"/>
+                </p:cNvSpPr>
+                <p:nvPr/>
+              </p:nvSpPr>
+              <p:spPr>
+                <a:xfrm>
+                  <a:off x="3391257" y="1233245"/>
+                  <a:ext cx="586530" cy="232436"/>
+                </a:xfrm>
+                <a:prstGeom prst="rect">
+                  <a:avLst/>
+                </a:prstGeom>
+                <a:blipFill>
+                  <a:blip r:embed="rId5"/>
+                  <a:stretch>
+                    <a:fillRect l="-13402" t="-21053" r="-18557" b="-42105"/>
+                  </a:stretch>
+                </a:blipFill>
+              </p:spPr>
+              <p:txBody>
+                <a:bodyPr/>
+                <a:lstStyle/>
+                <a:p>
+                  <a:r>
+                    <a:rPr lang="fr-CA">
+                      <a:noFill/>
+                    </a:rPr>
+                    <a:t> </a:t>
+                  </a:r>
+                </a:p>
+              </p:txBody>
+            </p:sp>
+          </mc:Fallback>
+        </mc:AlternateContent>
+        <mc:AlternateContent xmlns:mc="http://schemas.openxmlformats.org/markup-compatibility/2006">
+          <mc:Choice xmlns:a14="http://schemas.microsoft.com/office/drawing/2010/main" Requires="a14">
+            <p:sp>
+              <p:nvSpPr>
+                <p:cNvPr id="67" name="TextBox 66">
+                  <a:extLst>
+                    <a:ext uri="{FF2B5EF4-FFF2-40B4-BE49-F238E27FC236}">
+                      <a16:creationId xmlns:a16="http://schemas.microsoft.com/office/drawing/2014/main" id="{E055CE53-BBE0-4F48-A552-90D2099EE542}"/>
+                    </a:ext>
+                  </a:extLst>
+                </p:cNvPr>
+                <p:cNvSpPr txBox="1"/>
+                <p:nvPr/>
+              </p:nvSpPr>
+              <p:spPr>
+                <a:xfrm>
+                  <a:off x="1614245" y="2607658"/>
+                  <a:ext cx="514756" cy="276999"/>
+                </a:xfrm>
+                <a:prstGeom prst="rect">
+                  <a:avLst/>
+                </a:prstGeom>
+                <a:noFill/>
+              </p:spPr>
+              <p:txBody>
+                <a:bodyPr wrap="none" lIns="0" tIns="0" rIns="0" bIns="0" rtlCol="0">
+                  <a:spAutoFit/>
+                </a:bodyPr>
+                <a:lstStyle/>
+                <a:p>
+                  <a14:m>
+                    <m:oMathPara xmlns:m="http://schemas.openxmlformats.org/officeDocument/2006/math">
+                      <m:oMathParaPr>
+                        <m:jc m:val="centerGroup"/>
+                      </m:oMathParaPr>
+                      <m:oMath xmlns:m="http://schemas.openxmlformats.org/officeDocument/2006/math">
+                        <m:sSub>
+                          <m:sSubPr>
+                            <m:ctrlPr>
+                              <a:rPr lang="en-US" b="0" i="1" smtClean="0">
+                                <a:latin typeface="Cambria Math" panose="02040503050406030204" pitchFamily="18" charset="0"/>
+                              </a:rPr>
+                            </m:ctrlPr>
+                          </m:sSubPr>
+                          <m:e>
+                            <m:r>
+                              <a:rPr lang="en-US" b="0" i="1" smtClean="0">
+                                <a:latin typeface="Cambria Math" panose="02040503050406030204" pitchFamily="18" charset="0"/>
+                              </a:rPr>
+                              <m:t>𝑌</m:t>
+                            </m:r>
+                          </m:e>
+                          <m:sub>
+                            <m:r>
+                              <a:rPr lang="en-US" b="0" i="1" smtClean="0">
+                                <a:latin typeface="Cambria Math" panose="02040503050406030204" pitchFamily="18" charset="0"/>
+                              </a:rPr>
+                              <m:t>𝑐</m:t>
+                            </m:r>
+                            <m:r>
+                              <a:rPr lang="en-CA" b="0" i="1" smtClean="0">
+                                <a:latin typeface="Cambria Math" panose="02040503050406030204" pitchFamily="18" charset="0"/>
+                              </a:rPr>
+                              <m:t>𝑎𝑚</m:t>
+                            </m:r>
+                          </m:sub>
+                        </m:sSub>
+                      </m:oMath>
+                    </m:oMathPara>
+                  </a14:m>
+                  <a:endParaRPr lang="fr-CA" dirty="0"/>
+                </a:p>
+              </p:txBody>
+            </p:sp>
+          </mc:Choice>
+          <mc:Fallback>
+            <p:sp>
+              <p:nvSpPr>
+                <p:cNvPr id="67" name="TextBox 66">
+                  <a:extLst>
+                    <a:ext uri="{FF2B5EF4-FFF2-40B4-BE49-F238E27FC236}">
+                      <a16:creationId xmlns:a16="http://schemas.microsoft.com/office/drawing/2014/main" id="{E055CE53-BBE0-4F48-A552-90D2099EE542}"/>
+                    </a:ext>
+                  </a:extLst>
+                </p:cNvPr>
+                <p:cNvSpPr txBox="1">
+                  <a:spLocks noRot="1" noChangeAspect="1" noMove="1" noResize="1" noEditPoints="1" noAdjustHandles="1" noChangeArrowheads="1" noChangeShapeType="1" noTextEdit="1"/>
+                </p:cNvSpPr>
+                <p:nvPr/>
+              </p:nvSpPr>
+              <p:spPr>
+                <a:xfrm>
+                  <a:off x="1614245" y="2607658"/>
+                  <a:ext cx="514756" cy="276999"/>
+                </a:xfrm>
+                <a:prstGeom prst="rect">
+                  <a:avLst/>
+                </a:prstGeom>
+                <a:blipFill>
+                  <a:blip r:embed="rId6"/>
+                  <a:stretch>
+                    <a:fillRect l="-10714" r="-2381" b="-11111"/>
+                  </a:stretch>
+                </a:blipFill>
+              </p:spPr>
+              <p:txBody>
+                <a:bodyPr/>
+                <a:lstStyle/>
+                <a:p>
+                  <a:r>
+                    <a:rPr lang="fr-CA">
+                      <a:noFill/>
+                    </a:rPr>
+                    <a:t> </a:t>
+                  </a:r>
+                </a:p>
+              </p:txBody>
+            </p:sp>
+          </mc:Fallback>
+        </mc:AlternateContent>
+        <mc:AlternateContent xmlns:mc="http://schemas.openxmlformats.org/markup-compatibility/2006">
+          <mc:Choice xmlns:a14="http://schemas.microsoft.com/office/drawing/2010/main" Requires="a14">
+            <p:sp>
+              <p:nvSpPr>
+                <p:cNvPr id="68" name="TextBox 67">
+                  <a:extLst>
+                    <a:ext uri="{FF2B5EF4-FFF2-40B4-BE49-F238E27FC236}">
+                      <a16:creationId xmlns:a16="http://schemas.microsoft.com/office/drawing/2014/main" id="{A5E03041-5DB9-4BBA-9249-F8AF45B8B456}"/>
+                    </a:ext>
+                  </a:extLst>
+                </p:cNvPr>
+                <p:cNvSpPr txBox="1"/>
+                <p:nvPr/>
+              </p:nvSpPr>
+              <p:spPr>
+                <a:xfrm>
+                  <a:off x="2613648" y="1872947"/>
+                  <a:ext cx="542713" cy="276999"/>
+                </a:xfrm>
+                <a:prstGeom prst="rect">
+                  <a:avLst/>
+                </a:prstGeom>
+                <a:noFill/>
+              </p:spPr>
+              <p:txBody>
+                <a:bodyPr wrap="none" lIns="0" tIns="0" rIns="0" bIns="0" rtlCol="0">
+                  <a:spAutoFit/>
+                </a:bodyPr>
+                <a:lstStyle/>
+                <a:p>
+                  <a14:m>
+                    <m:oMathPara xmlns:m="http://schemas.openxmlformats.org/officeDocument/2006/math">
+                      <m:oMathParaPr>
+                        <m:jc m:val="centerGroup"/>
+                      </m:oMathParaPr>
+                      <m:oMath xmlns:m="http://schemas.openxmlformats.org/officeDocument/2006/math">
+                        <m:sSub>
+                          <m:sSubPr>
+                            <m:ctrlPr>
+                              <a:rPr lang="en-US" b="0" i="1" smtClean="0">
+                                <a:latin typeface="Cambria Math" panose="02040503050406030204" pitchFamily="18" charset="0"/>
+                              </a:rPr>
+                            </m:ctrlPr>
+                          </m:sSubPr>
+                          <m:e>
+                            <m:r>
+                              <a:rPr lang="en-US" b="0" i="1" smtClean="0">
+                                <a:latin typeface="Cambria Math" panose="02040503050406030204" pitchFamily="18" charset="0"/>
+                              </a:rPr>
+                              <m:t>𝑍</m:t>
+                            </m:r>
+                          </m:e>
+                          <m:sub>
+                            <m:r>
+                              <a:rPr lang="en-US" b="0" i="1" smtClean="0">
+                                <a:latin typeface="Cambria Math" panose="02040503050406030204" pitchFamily="18" charset="0"/>
+                              </a:rPr>
+                              <m:t>𝑐</m:t>
+                            </m:r>
+                            <m:r>
+                              <a:rPr lang="en-CA" b="0" i="1" smtClean="0">
+                                <a:latin typeface="Cambria Math" panose="02040503050406030204" pitchFamily="18" charset="0"/>
+                              </a:rPr>
+                              <m:t>𝑎𝑚</m:t>
+                            </m:r>
+                          </m:sub>
+                        </m:sSub>
+                      </m:oMath>
+                    </m:oMathPara>
+                  </a14:m>
+                  <a:endParaRPr lang="fr-CA" dirty="0"/>
+                </a:p>
+              </p:txBody>
+            </p:sp>
+          </mc:Choice>
+          <mc:Fallback>
+            <p:sp>
+              <p:nvSpPr>
+                <p:cNvPr id="68" name="TextBox 67">
+                  <a:extLst>
+                    <a:ext uri="{FF2B5EF4-FFF2-40B4-BE49-F238E27FC236}">
+                      <a16:creationId xmlns:a16="http://schemas.microsoft.com/office/drawing/2014/main" id="{A5E03041-5DB9-4BBA-9249-F8AF45B8B456}"/>
+                    </a:ext>
+                  </a:extLst>
+                </p:cNvPr>
+                <p:cNvSpPr txBox="1">
+                  <a:spLocks noRot="1" noChangeAspect="1" noMove="1" noResize="1" noEditPoints="1" noAdjustHandles="1" noChangeArrowheads="1" noChangeShapeType="1" noTextEdit="1"/>
+                </p:cNvSpPr>
+                <p:nvPr/>
+              </p:nvSpPr>
+              <p:spPr>
+                <a:xfrm>
+                  <a:off x="2613648" y="1872947"/>
+                  <a:ext cx="542713" cy="276999"/>
+                </a:xfrm>
+                <a:prstGeom prst="rect">
+                  <a:avLst/>
+                </a:prstGeom>
+                <a:blipFill>
+                  <a:blip r:embed="rId7"/>
+                  <a:stretch>
+                    <a:fillRect l="-10112" r="-1124" b="-10870"/>
+                  </a:stretch>
+                </a:blipFill>
+              </p:spPr>
+              <p:txBody>
+                <a:bodyPr/>
+                <a:lstStyle/>
+                <a:p>
+                  <a:r>
+                    <a:rPr lang="fr-CA">
+                      <a:noFill/>
+                    </a:rPr>
+                    <a:t> </a:t>
+                  </a:r>
+                </a:p>
+              </p:txBody>
+            </p:sp>
+          </mc:Fallback>
+        </mc:AlternateContent>
+        <p:cxnSp>
+          <p:nvCxnSpPr>
+            <p:cNvPr id="69" name="Straight Arrow Connector 68">
+              <a:extLst>
+                <a:ext uri="{FF2B5EF4-FFF2-40B4-BE49-F238E27FC236}">
+                  <a16:creationId xmlns:a16="http://schemas.microsoft.com/office/drawing/2014/main" id="{12ABFAA4-F2AF-4DD8-B2A2-13B369D0ABCD}"/>
+                </a:ext>
+              </a:extLst>
+            </p:cNvPr>
+            <p:cNvCxnSpPr>
+              <a:cxnSpLocks/>
+              <a:endCxn id="62" idx="0"/>
+            </p:cNvCxnSpPr>
+            <p:nvPr/>
+          </p:nvCxnSpPr>
+          <p:spPr>
+            <a:xfrm flipV="1">
+              <a:off x="1732256" y="1476390"/>
+              <a:ext cx="2216367" cy="396558"/>
+            </a:xfrm>
+            <a:prstGeom prst="straightConnector1">
+              <a:avLst/>
+            </a:prstGeom>
+            <a:ln w="28575">
+              <a:solidFill>
+                <a:schemeClr val="bg1">
+                  <a:lumMod val="75000"/>
+                </a:schemeClr>
+              </a:solidFill>
+              <a:tailEnd type="triangle"/>
+            </a:ln>
+          </p:spPr>
+          <p:style>
+            <a:lnRef idx="1">
+              <a:schemeClr val="accent1"/>
+            </a:lnRef>
+            <a:fillRef idx="0">
+              <a:schemeClr val="accent1"/>
+            </a:fillRef>
+            <a:effectRef idx="0">
+              <a:schemeClr val="accent1"/>
+            </a:effectRef>
+            <a:fontRef idx="minor">
+              <a:schemeClr val="tx1"/>
+            </a:fontRef>
+          </p:style>
+        </p:cxnSp>
+        <mc:AlternateContent xmlns:mc="http://schemas.openxmlformats.org/markup-compatibility/2006">
+          <mc:Choice xmlns:a14="http://schemas.microsoft.com/office/drawing/2010/main" Requires="a14">
+            <p:sp>
+              <p:nvSpPr>
+                <p:cNvPr id="71" name="TextBox 70">
+                  <a:extLst>
+                    <a:ext uri="{FF2B5EF4-FFF2-40B4-BE49-F238E27FC236}">
+                      <a16:creationId xmlns:a16="http://schemas.microsoft.com/office/drawing/2014/main" id="{058EAEB5-1947-4814-BAEA-5E3E732AB29E}"/>
+                    </a:ext>
+                  </a:extLst>
+                </p:cNvPr>
+                <p:cNvSpPr txBox="1"/>
+                <p:nvPr/>
+              </p:nvSpPr>
+              <p:spPr>
+                <a:xfrm>
+                  <a:off x="2936054" y="1356815"/>
+                  <a:ext cx="184666" cy="276999"/>
+                </a:xfrm>
+                <a:prstGeom prst="rect">
+                  <a:avLst/>
+                </a:prstGeom>
+                <a:noFill/>
+              </p:spPr>
+              <p:txBody>
+                <a:bodyPr wrap="none" lIns="0" tIns="0" rIns="0" bIns="0" rtlCol="0">
+                  <a:spAutoFit/>
+                </a:bodyPr>
+                <a:lstStyle/>
+                <a:p>
+                  <a14:m>
+                    <m:oMathPara xmlns:m="http://schemas.openxmlformats.org/officeDocument/2006/math">
+                      <m:oMathParaPr>
+                        <m:jc m:val="centerGroup"/>
+                      </m:oMathParaPr>
+                      <m:oMath xmlns:m="http://schemas.openxmlformats.org/officeDocument/2006/math">
+                        <m:r>
+                          <a:rPr lang="en-US" b="0" i="1" smtClean="0">
+                            <a:latin typeface="Cambria Math" panose="02040503050406030204" pitchFamily="18" charset="0"/>
+                          </a:rPr>
+                          <m:t>𝑣</m:t>
+                        </m:r>
+                      </m:oMath>
+                    </m:oMathPara>
+                  </a14:m>
+                  <a:endParaRPr lang="fr-CA" dirty="0"/>
+                </a:p>
+              </p:txBody>
+            </p:sp>
+          </mc:Choice>
+          <mc:Fallback>
+            <p:sp>
+              <p:nvSpPr>
+                <p:cNvPr id="71" name="TextBox 70">
+                  <a:extLst>
+                    <a:ext uri="{FF2B5EF4-FFF2-40B4-BE49-F238E27FC236}">
+                      <a16:creationId xmlns:a16="http://schemas.microsoft.com/office/drawing/2014/main" id="{058EAEB5-1947-4814-BAEA-5E3E732AB29E}"/>
+                    </a:ext>
+                  </a:extLst>
+                </p:cNvPr>
+                <p:cNvSpPr txBox="1">
+                  <a:spLocks noRot="1" noChangeAspect="1" noMove="1" noResize="1" noEditPoints="1" noAdjustHandles="1" noChangeArrowheads="1" noChangeShapeType="1" noTextEdit="1"/>
+                </p:cNvSpPr>
+                <p:nvPr/>
+              </p:nvSpPr>
+              <p:spPr>
+                <a:xfrm>
+                  <a:off x="2936054" y="1356815"/>
+                  <a:ext cx="184666" cy="276999"/>
+                </a:xfrm>
+                <a:prstGeom prst="rect">
+                  <a:avLst/>
+                </a:prstGeom>
+                <a:blipFill>
+                  <a:blip r:embed="rId8"/>
+                  <a:stretch>
+                    <a:fillRect l="-20000" r="-16667"/>
+                  </a:stretch>
+                </a:blipFill>
+              </p:spPr>
+              <p:txBody>
+                <a:bodyPr/>
+                <a:lstStyle/>
+                <a:p>
+                  <a:r>
+                    <a:rPr lang="fr-CA">
+                      <a:noFill/>
+                    </a:rPr>
+                    <a:t> </a:t>
+                  </a:r>
+                </a:p>
+              </p:txBody>
+            </p:sp>
+          </mc:Fallback>
+        </mc:AlternateContent>
+        <p:grpSp>
+          <p:nvGrpSpPr>
+            <p:cNvPr id="103" name="Group 102">
+              <a:extLst>
+                <a:ext uri="{FF2B5EF4-FFF2-40B4-BE49-F238E27FC236}">
+                  <a16:creationId xmlns:a16="http://schemas.microsoft.com/office/drawing/2014/main" id="{FB0DE733-1C42-41CE-ACF6-CC73E2465797}"/>
+                </a:ext>
+              </a:extLst>
+            </p:cNvPr>
+            <p:cNvGrpSpPr/>
+            <p:nvPr/>
+          </p:nvGrpSpPr>
+          <p:grpSpPr>
+            <a:xfrm>
+              <a:off x="6464881" y="1751139"/>
+              <a:ext cx="847719" cy="842709"/>
+              <a:chOff x="8488932" y="667202"/>
+              <a:chExt cx="847719" cy="842709"/>
+            </a:xfrm>
+          </p:grpSpPr>
+          <p:cxnSp>
+            <p:nvCxnSpPr>
+              <p:cNvPr id="75" name="Straight Arrow Connector 74">
+                <a:extLst>
+                  <a:ext uri="{FF2B5EF4-FFF2-40B4-BE49-F238E27FC236}">
+                    <a16:creationId xmlns:a16="http://schemas.microsoft.com/office/drawing/2014/main" id="{30680DBE-B3C1-4E11-94F4-C37DAFEE9264}"/>
+                  </a:ext>
+                </a:extLst>
+              </p:cNvPr>
+              <p:cNvCxnSpPr>
+                <a:cxnSpLocks/>
+              </p:cNvCxnSpPr>
+              <p:nvPr/>
+            </p:nvCxnSpPr>
+            <p:spPr>
+              <a:xfrm>
+                <a:off x="8562294" y="790569"/>
+                <a:ext cx="522983" cy="0"/>
+              </a:xfrm>
+              <a:prstGeom prst="straightConnector1">
+                <a:avLst/>
+              </a:prstGeom>
+              <a:ln w="28575">
+                <a:solidFill>
+                  <a:schemeClr val="accent1">
+                    <a:lumMod val="75000"/>
+                  </a:schemeClr>
+                </a:solidFill>
+                <a:tailEnd type="triangle"/>
+              </a:ln>
+            </p:spPr>
+            <p:style>
+              <a:lnRef idx="1">
+                <a:schemeClr val="accent1"/>
+              </a:lnRef>
+              <a:fillRef idx="0">
+                <a:schemeClr val="accent1"/>
+              </a:fillRef>
+              <a:effectRef idx="0">
+                <a:schemeClr val="accent1"/>
+              </a:effectRef>
+              <a:fontRef idx="minor">
+                <a:schemeClr val="tx1"/>
+              </a:fontRef>
+            </p:style>
+          </p:cxnSp>
+          <p:cxnSp>
+            <p:nvCxnSpPr>
+              <p:cNvPr id="76" name="Straight Arrow Connector 75">
+                <a:extLst>
+                  <a:ext uri="{FF2B5EF4-FFF2-40B4-BE49-F238E27FC236}">
+                    <a16:creationId xmlns:a16="http://schemas.microsoft.com/office/drawing/2014/main" id="{3CF6ADC1-4A1B-4AE3-8994-815707055F91}"/>
+                  </a:ext>
+                </a:extLst>
+              </p:cNvPr>
+              <p:cNvCxnSpPr>
+                <a:cxnSpLocks/>
+              </p:cNvCxnSpPr>
+              <p:nvPr/>
+            </p:nvCxnSpPr>
+            <p:spPr>
+              <a:xfrm>
+                <a:off x="8553904" y="782057"/>
+                <a:ext cx="0" cy="522000"/>
+              </a:xfrm>
+              <a:prstGeom prst="straightConnector1">
+                <a:avLst/>
+              </a:prstGeom>
+              <a:ln w="28575">
+                <a:solidFill>
+                  <a:srgbClr val="00B050"/>
+                </a:solidFill>
+                <a:tailEnd type="triangle"/>
+              </a:ln>
+            </p:spPr>
+            <p:style>
+              <a:lnRef idx="1">
+                <a:schemeClr val="accent1"/>
+              </a:lnRef>
+              <a:fillRef idx="0">
+                <a:schemeClr val="accent1"/>
+              </a:fillRef>
+              <a:effectRef idx="0">
+                <a:schemeClr val="accent1"/>
+              </a:effectRef>
+              <a:fontRef idx="minor">
+                <a:schemeClr val="tx1"/>
+              </a:fontRef>
+            </p:style>
+          </p:cxnSp>
+          <p:cxnSp>
+            <p:nvCxnSpPr>
+              <p:cNvPr id="77" name="Straight Arrow Connector 76">
+                <a:extLst>
+                  <a:ext uri="{FF2B5EF4-FFF2-40B4-BE49-F238E27FC236}">
+                    <a16:creationId xmlns:a16="http://schemas.microsoft.com/office/drawing/2014/main" id="{B4A94039-5C29-494D-A453-4D5DC75BE581}"/>
+                  </a:ext>
+                </a:extLst>
+              </p:cNvPr>
+              <p:cNvCxnSpPr>
+                <a:cxnSpLocks/>
+              </p:cNvCxnSpPr>
+              <p:nvPr/>
+            </p:nvCxnSpPr>
+            <p:spPr>
+              <a:xfrm>
+                <a:off x="8562292" y="786125"/>
+                <a:ext cx="328827" cy="309048"/>
+              </a:xfrm>
+              <a:prstGeom prst="straightConnector1">
+                <a:avLst/>
+              </a:prstGeom>
+              <a:ln w="28575">
+                <a:solidFill>
+                  <a:srgbClr val="FF0000"/>
+                </a:solidFill>
+                <a:tailEnd type="triangle"/>
+              </a:ln>
+            </p:spPr>
+            <p:style>
+              <a:lnRef idx="1">
+                <a:schemeClr val="accent1"/>
+              </a:lnRef>
+              <a:fillRef idx="0">
+                <a:schemeClr val="accent1"/>
+              </a:fillRef>
+              <a:effectRef idx="0">
+                <a:schemeClr val="accent1"/>
+              </a:effectRef>
+              <a:fontRef idx="minor">
+                <a:schemeClr val="tx1"/>
+              </a:fontRef>
+            </p:style>
+          </p:cxnSp>
+          <mc:AlternateContent xmlns:mc="http://schemas.openxmlformats.org/markup-compatibility/2006">
+            <mc:Choice xmlns:a14="http://schemas.microsoft.com/office/drawing/2010/main" Requires="a14">
+              <p:sp>
+                <p:nvSpPr>
+                  <p:cNvPr id="92" name="TextBox 91">
+                    <a:extLst>
+                      <a:ext uri="{FF2B5EF4-FFF2-40B4-BE49-F238E27FC236}">
+                        <a16:creationId xmlns:a16="http://schemas.microsoft.com/office/drawing/2014/main" id="{D07576E3-A329-4903-AC4A-F04B2305E35D}"/>
+                      </a:ext>
+                    </a:extLst>
+                  </p:cNvPr>
+                  <p:cNvSpPr txBox="1"/>
+                  <p:nvPr/>
+                </p:nvSpPr>
+                <p:spPr>
+                  <a:xfrm>
+                    <a:off x="8841459" y="1060631"/>
+                    <a:ext cx="265777" cy="215444"/>
+                  </a:xfrm>
+                  <a:prstGeom prst="rect">
+                    <a:avLst/>
+                  </a:prstGeom>
+                  <a:noFill/>
+                </p:spPr>
+                <p:txBody>
+                  <a:bodyPr wrap="none" lIns="0" tIns="0" rIns="0" bIns="0" rtlCol="0">
+                    <a:spAutoFit/>
+                  </a:bodyPr>
+                  <a:lstStyle/>
+                  <a:p>
+                    <a14:m>
+                      <m:oMathPara xmlns:m="http://schemas.openxmlformats.org/officeDocument/2006/math">
+                        <m:oMathParaPr>
+                          <m:jc m:val="centerGroup"/>
+                        </m:oMathParaPr>
+                        <m:oMath xmlns:m="http://schemas.openxmlformats.org/officeDocument/2006/math">
+                          <m:sSub>
+                            <m:sSubPr>
+                              <m:ctrlPr>
+                                <a:rPr lang="en-US" sz="1400" b="0" i="1" smtClean="0">
+                                  <a:latin typeface="Cambria Math" panose="02040503050406030204" pitchFamily="18" charset="0"/>
+                                </a:rPr>
+                              </m:ctrlPr>
+                            </m:sSubPr>
+                            <m:e>
+                              <m:r>
+                                <a:rPr lang="en-US" sz="1400" b="0" i="1" smtClean="0">
+                                  <a:latin typeface="Cambria Math" panose="02040503050406030204" pitchFamily="18" charset="0"/>
+                                </a:rPr>
+                                <m:t>𝑋</m:t>
+                              </m:r>
+                            </m:e>
+                            <m:sub>
+                              <m:r>
+                                <a:rPr lang="en-US" sz="1400" b="0" i="1" smtClean="0">
+                                  <a:latin typeface="Cambria Math" panose="02040503050406030204" pitchFamily="18" charset="0"/>
+                                </a:rPr>
+                                <m:t>𝑤</m:t>
+                              </m:r>
+                            </m:sub>
+                          </m:sSub>
+                        </m:oMath>
+                      </m:oMathPara>
+                    </a14:m>
+                    <a:endParaRPr lang="fr-CA" dirty="0"/>
+                  </a:p>
+                </p:txBody>
+              </p:sp>
+            </mc:Choice>
+            <mc:Fallback>
+              <p:sp>
+                <p:nvSpPr>
+                  <p:cNvPr id="92" name="TextBox 91">
+                    <a:extLst>
+                      <a:ext uri="{FF2B5EF4-FFF2-40B4-BE49-F238E27FC236}">
+                        <a16:creationId xmlns:a16="http://schemas.microsoft.com/office/drawing/2014/main" id="{D07576E3-A329-4903-AC4A-F04B2305E35D}"/>
+                      </a:ext>
+                    </a:extLst>
+                  </p:cNvPr>
+                  <p:cNvSpPr txBox="1">
+                    <a:spLocks noRot="1" noChangeAspect="1" noMove="1" noResize="1" noEditPoints="1" noAdjustHandles="1" noChangeArrowheads="1" noChangeShapeType="1" noTextEdit="1"/>
+                  </p:cNvSpPr>
+                  <p:nvPr/>
+                </p:nvSpPr>
+                <p:spPr>
+                  <a:xfrm>
+                    <a:off x="8841459" y="1060631"/>
+                    <a:ext cx="265777" cy="215444"/>
+                  </a:xfrm>
+                  <a:prstGeom prst="rect">
+                    <a:avLst/>
+                  </a:prstGeom>
+                  <a:blipFill>
+                    <a:blip r:embed="rId9"/>
+                    <a:stretch>
+                      <a:fillRect l="-15909" b="-8571"/>
+                    </a:stretch>
+                  </a:blipFill>
+                </p:spPr>
+                <p:txBody>
+                  <a:bodyPr/>
+                  <a:lstStyle/>
+                  <a:p>
+                    <a:r>
+                      <a:rPr lang="fr-CA">
+                        <a:noFill/>
+                      </a:rPr>
+                      <a:t> </a:t>
+                    </a:r>
+                  </a:p>
+                </p:txBody>
+              </p:sp>
+            </mc:Fallback>
+          </mc:AlternateContent>
+          <mc:AlternateContent xmlns:mc="http://schemas.openxmlformats.org/markup-compatibility/2006">
+            <mc:Choice xmlns:a14="http://schemas.microsoft.com/office/drawing/2010/main" Requires="a14">
+              <p:sp>
+                <p:nvSpPr>
+                  <p:cNvPr id="93" name="TextBox 92">
+                    <a:extLst>
+                      <a:ext uri="{FF2B5EF4-FFF2-40B4-BE49-F238E27FC236}">
+                        <a16:creationId xmlns:a16="http://schemas.microsoft.com/office/drawing/2014/main" id="{ECC9D6B9-7F58-4079-9AB3-84A3C1546C37}"/>
+                      </a:ext>
+                    </a:extLst>
+                  </p:cNvPr>
+                  <p:cNvSpPr txBox="1"/>
+                  <p:nvPr/>
+                </p:nvSpPr>
+                <p:spPr>
+                  <a:xfrm>
+                    <a:off x="8488932" y="1294467"/>
+                    <a:ext cx="236219" cy="215444"/>
+                  </a:xfrm>
+                  <a:prstGeom prst="rect">
+                    <a:avLst/>
+                  </a:prstGeom>
+                  <a:noFill/>
+                </p:spPr>
+                <p:txBody>
+                  <a:bodyPr wrap="none" lIns="0" tIns="0" rIns="0" bIns="0" rtlCol="0">
+                    <a:spAutoFit/>
+                  </a:bodyPr>
+                  <a:lstStyle/>
+                  <a:p>
+                    <a14:m>
+                      <m:oMathPara xmlns:m="http://schemas.openxmlformats.org/officeDocument/2006/math">
+                        <m:oMathParaPr>
+                          <m:jc m:val="centerGroup"/>
+                        </m:oMathParaPr>
+                        <m:oMath xmlns:m="http://schemas.openxmlformats.org/officeDocument/2006/math">
+                          <m:sSub>
+                            <m:sSubPr>
+                              <m:ctrlPr>
+                                <a:rPr lang="en-US" sz="1400" b="0" i="1" smtClean="0">
+                                  <a:latin typeface="Cambria Math" panose="02040503050406030204" pitchFamily="18" charset="0"/>
+                                </a:rPr>
+                              </m:ctrlPr>
+                            </m:sSubPr>
+                            <m:e>
+                              <m:r>
+                                <a:rPr lang="en-US" sz="1400" b="0" i="1" smtClean="0">
+                                  <a:latin typeface="Cambria Math" panose="02040503050406030204" pitchFamily="18" charset="0"/>
+                                </a:rPr>
+                                <m:t>𝑌</m:t>
+                              </m:r>
+                            </m:e>
+                            <m:sub>
+                              <m:r>
+                                <a:rPr lang="en-US" sz="1400" b="0" i="1" smtClean="0">
+                                  <a:latin typeface="Cambria Math" panose="02040503050406030204" pitchFamily="18" charset="0"/>
+                                </a:rPr>
+                                <m:t>𝑤</m:t>
+                              </m:r>
+                            </m:sub>
+                          </m:sSub>
+                        </m:oMath>
+                      </m:oMathPara>
+                    </a14:m>
+                    <a:endParaRPr lang="fr-CA" dirty="0"/>
+                  </a:p>
+                </p:txBody>
+              </p:sp>
+            </mc:Choice>
+            <mc:Fallback>
+              <p:sp>
+                <p:nvSpPr>
+                  <p:cNvPr id="93" name="TextBox 92">
+                    <a:extLst>
+                      <a:ext uri="{FF2B5EF4-FFF2-40B4-BE49-F238E27FC236}">
+                        <a16:creationId xmlns:a16="http://schemas.microsoft.com/office/drawing/2014/main" id="{ECC9D6B9-7F58-4079-9AB3-84A3C1546C37}"/>
+                      </a:ext>
+                    </a:extLst>
+                  </p:cNvPr>
+                  <p:cNvSpPr txBox="1">
+                    <a:spLocks noRot="1" noChangeAspect="1" noMove="1" noResize="1" noEditPoints="1" noAdjustHandles="1" noChangeArrowheads="1" noChangeShapeType="1" noTextEdit="1"/>
+                  </p:cNvSpPr>
+                  <p:nvPr/>
+                </p:nvSpPr>
+                <p:spPr>
+                  <a:xfrm>
+                    <a:off x="8488932" y="1294467"/>
+                    <a:ext cx="236219" cy="215444"/>
+                  </a:xfrm>
+                  <a:prstGeom prst="rect">
+                    <a:avLst/>
+                  </a:prstGeom>
+                  <a:blipFill>
+                    <a:blip r:embed="rId10"/>
+                    <a:stretch>
+                      <a:fillRect l="-18421" b="-8333"/>
+                    </a:stretch>
+                  </a:blipFill>
+                </p:spPr>
+                <p:txBody>
+                  <a:bodyPr/>
+                  <a:lstStyle/>
+                  <a:p>
+                    <a:r>
+                      <a:rPr lang="fr-CA">
+                        <a:noFill/>
+                      </a:rPr>
+                      <a:t> </a:t>
+                    </a:r>
+                  </a:p>
+                </p:txBody>
+              </p:sp>
+            </mc:Fallback>
+          </mc:AlternateContent>
+          <mc:AlternateContent xmlns:mc="http://schemas.openxmlformats.org/markup-compatibility/2006">
+            <mc:Choice xmlns:a14="http://schemas.microsoft.com/office/drawing/2010/main" Requires="a14">
+              <p:sp>
+                <p:nvSpPr>
+                  <p:cNvPr id="94" name="TextBox 93">
+                    <a:extLst>
+                      <a:ext uri="{FF2B5EF4-FFF2-40B4-BE49-F238E27FC236}">
+                        <a16:creationId xmlns:a16="http://schemas.microsoft.com/office/drawing/2014/main" id="{C38079E1-C7B0-4583-A9F4-4B9B98332726}"/>
+                      </a:ext>
+                    </a:extLst>
+                  </p:cNvPr>
+                  <p:cNvSpPr txBox="1"/>
+                  <p:nvPr/>
+                </p:nvSpPr>
+                <p:spPr>
+                  <a:xfrm>
+                    <a:off x="9077862" y="667202"/>
+                    <a:ext cx="258789" cy="215444"/>
+                  </a:xfrm>
+                  <a:prstGeom prst="rect">
+                    <a:avLst/>
+                  </a:prstGeom>
+                  <a:noFill/>
+                </p:spPr>
+                <p:txBody>
+                  <a:bodyPr wrap="none" lIns="0" tIns="0" rIns="0" bIns="0" rtlCol="0">
+                    <a:spAutoFit/>
+                  </a:bodyPr>
+                  <a:lstStyle/>
+                  <a:p>
+                    <a14:m>
+                      <m:oMathPara xmlns:m="http://schemas.openxmlformats.org/officeDocument/2006/math">
+                        <m:oMathParaPr>
+                          <m:jc m:val="centerGroup"/>
+                        </m:oMathParaPr>
+                        <m:oMath xmlns:m="http://schemas.openxmlformats.org/officeDocument/2006/math">
+                          <m:sSub>
+                            <m:sSubPr>
+                              <m:ctrlPr>
+                                <a:rPr lang="en-US" sz="1400" b="0" i="1" smtClean="0">
+                                  <a:latin typeface="Cambria Math" panose="02040503050406030204" pitchFamily="18" charset="0"/>
+                                </a:rPr>
+                              </m:ctrlPr>
+                            </m:sSubPr>
+                            <m:e>
+                              <m:r>
+                                <a:rPr lang="en-US" sz="1400" b="0" i="1" smtClean="0">
+                                  <a:latin typeface="Cambria Math" panose="02040503050406030204" pitchFamily="18" charset="0"/>
+                                </a:rPr>
+                                <m:t>𝑍</m:t>
+                              </m:r>
+                            </m:e>
+                            <m:sub>
+                              <m:r>
+                                <a:rPr lang="en-US" sz="1400" b="0" i="1" smtClean="0">
+                                  <a:latin typeface="Cambria Math" panose="02040503050406030204" pitchFamily="18" charset="0"/>
+                                </a:rPr>
+                                <m:t>𝑤</m:t>
+                              </m:r>
+                            </m:sub>
+                          </m:sSub>
+                        </m:oMath>
+                      </m:oMathPara>
+                    </a14:m>
+                    <a:endParaRPr lang="fr-CA" dirty="0"/>
+                  </a:p>
+                </p:txBody>
+              </p:sp>
+            </mc:Choice>
+            <mc:Fallback>
+              <p:sp>
+                <p:nvSpPr>
+                  <p:cNvPr id="94" name="TextBox 93">
+                    <a:extLst>
+                      <a:ext uri="{FF2B5EF4-FFF2-40B4-BE49-F238E27FC236}">
+                        <a16:creationId xmlns:a16="http://schemas.microsoft.com/office/drawing/2014/main" id="{C38079E1-C7B0-4583-A9F4-4B9B98332726}"/>
+                      </a:ext>
+                    </a:extLst>
+                  </p:cNvPr>
+                  <p:cNvSpPr txBox="1">
+                    <a:spLocks noRot="1" noChangeAspect="1" noMove="1" noResize="1" noEditPoints="1" noAdjustHandles="1" noChangeArrowheads="1" noChangeShapeType="1" noTextEdit="1"/>
+                  </p:cNvSpPr>
+                  <p:nvPr/>
+                </p:nvSpPr>
+                <p:spPr>
+                  <a:xfrm>
+                    <a:off x="9077862" y="667202"/>
+                    <a:ext cx="258789" cy="215444"/>
+                  </a:xfrm>
+                  <a:prstGeom prst="rect">
+                    <a:avLst/>
+                  </a:prstGeom>
+                  <a:blipFill>
+                    <a:blip r:embed="rId11"/>
+                    <a:stretch>
+                      <a:fillRect l="-16279" b="-8333"/>
+                    </a:stretch>
+                  </a:blipFill>
+                </p:spPr>
+                <p:txBody>
+                  <a:bodyPr/>
+                  <a:lstStyle/>
+                  <a:p>
+                    <a:r>
+                      <a:rPr lang="fr-CA">
+                        <a:noFill/>
+                      </a:rPr>
+                      <a:t> </a:t>
+                    </a:r>
+                  </a:p>
+                </p:txBody>
+              </p:sp>
+            </mc:Fallback>
+          </mc:AlternateContent>
+        </p:grpSp>
+        <mc:AlternateContent xmlns:mc="http://schemas.openxmlformats.org/markup-compatibility/2006">
+          <mc:Choice xmlns:a14="http://schemas.microsoft.com/office/drawing/2010/main" Requires="a14">
+            <p:sp>
+              <p:nvSpPr>
+                <p:cNvPr id="99" name="TextBox 98">
+                  <a:extLst>
+                    <a:ext uri="{FF2B5EF4-FFF2-40B4-BE49-F238E27FC236}">
+                      <a16:creationId xmlns:a16="http://schemas.microsoft.com/office/drawing/2014/main" id="{4E50FFBD-C22B-473F-8F14-343308795201}"/>
+                    </a:ext>
+                  </a:extLst>
+                </p:cNvPr>
+                <p:cNvSpPr txBox="1"/>
+                <p:nvPr/>
+              </p:nvSpPr>
+              <p:spPr>
+                <a:xfrm>
+                  <a:off x="4050689" y="1882654"/>
+                  <a:ext cx="575029" cy="232436"/>
+                </a:xfrm>
+                <a:prstGeom prst="rect">
+                  <a:avLst/>
+                </a:prstGeom>
+                <a:noFill/>
+              </p:spPr>
+              <p:txBody>
+                <a:bodyPr wrap="none" lIns="0" tIns="0" rIns="0" bIns="0" rtlCol="0">
+                  <a:spAutoFit/>
+                </a:bodyPr>
+                <a:lstStyle/>
+                <a:p>
+                  <a14:m>
+                    <m:oMath xmlns:m="http://schemas.openxmlformats.org/officeDocument/2006/math">
+                      <m:r>
+                        <a:rPr lang="en-US" sz="1400" b="0" i="1" smtClean="0">
+                          <a:latin typeface="Cambria Math" panose="02040503050406030204" pitchFamily="18" charset="0"/>
+                        </a:rPr>
+                        <m:t>(</m:t>
+                      </m:r>
+                      <m:sSub>
+                        <m:sSubPr>
+                          <m:ctrlPr>
+                            <a:rPr lang="en-US" sz="1400" b="0" i="1" smtClean="0">
+                              <a:latin typeface="Cambria Math" panose="02040503050406030204" pitchFamily="18" charset="0"/>
+                            </a:rPr>
+                          </m:ctrlPr>
+                        </m:sSubPr>
+                        <m:e>
+                          <m:r>
+                            <a:rPr lang="en-US" sz="1400" b="0" i="1" smtClean="0">
+                              <a:latin typeface="Cambria Math" panose="02040503050406030204" pitchFamily="18" charset="0"/>
+                            </a:rPr>
+                            <m:t>𝑐</m:t>
+                          </m:r>
+                        </m:e>
+                        <m:sub>
+                          <m:r>
+                            <a:rPr lang="en-US" sz="1400" b="0" i="1" smtClean="0">
+                              <a:latin typeface="Cambria Math" panose="02040503050406030204" pitchFamily="18" charset="0"/>
+                            </a:rPr>
+                            <m:t>𝑥</m:t>
+                          </m:r>
+                        </m:sub>
+                      </m:sSub>
+                      <m:r>
+                        <a:rPr lang="en-US" sz="1400" b="0" i="1" smtClean="0">
+                          <a:latin typeface="Cambria Math" panose="02040503050406030204" pitchFamily="18" charset="0"/>
+                        </a:rPr>
+                        <m:t>,</m:t>
+                      </m:r>
+                      <m:sSub>
+                        <m:sSubPr>
+                          <m:ctrlPr>
+                            <a:rPr lang="en-US" sz="1400" i="1">
+                              <a:latin typeface="Cambria Math" panose="02040503050406030204" pitchFamily="18" charset="0"/>
+                            </a:rPr>
+                          </m:ctrlPr>
+                        </m:sSubPr>
+                        <m:e>
+                          <m:r>
+                            <a:rPr lang="en-US" sz="1400" b="0" i="1" smtClean="0">
+                              <a:latin typeface="Cambria Math" panose="02040503050406030204" pitchFamily="18" charset="0"/>
+                            </a:rPr>
+                            <m:t>𝑐</m:t>
+                          </m:r>
+                        </m:e>
+                        <m:sub>
+                          <m:r>
+                            <a:rPr lang="en-US" sz="1400" b="0" i="1" smtClean="0">
+                              <a:latin typeface="Cambria Math" panose="02040503050406030204" pitchFamily="18" charset="0"/>
+                            </a:rPr>
+                            <m:t>𝑦</m:t>
+                          </m:r>
+                        </m:sub>
+                      </m:sSub>
+                    </m:oMath>
+                  </a14:m>
+                  <a:r>
+                    <a:rPr lang="fr-CA" sz="1400" dirty="0"/>
+                    <a:t>) </a:t>
+                  </a:r>
+                </a:p>
+              </p:txBody>
+            </p:sp>
+          </mc:Choice>
+          <mc:Fallback>
+            <p:sp>
+              <p:nvSpPr>
+                <p:cNvPr id="99" name="TextBox 98">
+                  <a:extLst>
+                    <a:ext uri="{FF2B5EF4-FFF2-40B4-BE49-F238E27FC236}">
+                      <a16:creationId xmlns:a16="http://schemas.microsoft.com/office/drawing/2014/main" id="{4E50FFBD-C22B-473F-8F14-343308795201}"/>
+                    </a:ext>
+                  </a:extLst>
+                </p:cNvPr>
+                <p:cNvSpPr txBox="1">
+                  <a:spLocks noRot="1" noChangeAspect="1" noMove="1" noResize="1" noEditPoints="1" noAdjustHandles="1" noChangeArrowheads="1" noChangeShapeType="1" noTextEdit="1"/>
+                </p:cNvSpPr>
+                <p:nvPr/>
+              </p:nvSpPr>
+              <p:spPr>
+                <a:xfrm>
+                  <a:off x="4050689" y="1882654"/>
+                  <a:ext cx="575029" cy="232436"/>
+                </a:xfrm>
+                <a:prstGeom prst="rect">
+                  <a:avLst/>
+                </a:prstGeom>
+                <a:blipFill>
+                  <a:blip r:embed="rId12"/>
+                  <a:stretch>
+                    <a:fillRect l="-13684" t="-21053" r="-16842" b="-42105"/>
+                  </a:stretch>
+                </a:blipFill>
+              </p:spPr>
+              <p:txBody>
+                <a:bodyPr/>
+                <a:lstStyle/>
+                <a:p>
+                  <a:r>
+                    <a:rPr lang="fr-CA">
+                      <a:noFill/>
+                    </a:rPr>
+                    <a:t> </a:t>
+                  </a:r>
+                </a:p>
+              </p:txBody>
+            </p:sp>
+          </mc:Fallback>
+        </mc:AlternateContent>
+        <p:sp>
+          <p:nvSpPr>
+            <p:cNvPr id="100" name="Oval 99">
+              <a:extLst>
+                <a:ext uri="{FF2B5EF4-FFF2-40B4-BE49-F238E27FC236}">
+                  <a16:creationId xmlns:a16="http://schemas.microsoft.com/office/drawing/2014/main" id="{4CCD624D-60E7-4489-8777-D8E2EA4314DE}"/>
+                </a:ext>
+              </a:extLst>
+            </p:cNvPr>
+            <p:cNvSpPr/>
+            <p:nvPr/>
+          </p:nvSpPr>
+          <p:spPr>
+            <a:xfrm>
+              <a:off x="4027289" y="1855293"/>
+              <a:ext cx="46800" cy="45719"/>
+            </a:xfrm>
+            <a:prstGeom prst="ellipse">
+              <a:avLst/>
+            </a:prstGeom>
+            <a:solidFill>
+              <a:srgbClr val="FF0000"/>
+            </a:solidFill>
+            <a:ln>
+              <a:solidFill>
+                <a:srgbClr val="FF0000"/>
+              </a:solidFill>
+            </a:ln>
+          </p:spPr>
+          <p:style>
+            <a:lnRef idx="2">
+              <a:schemeClr val="accent1">
+                <a:shade val="50000"/>
+              </a:schemeClr>
+            </a:lnRef>
+            <a:fillRef idx="1">
+              <a:schemeClr val="accent1"/>
+            </a:fillRef>
+            <a:effectRef idx="0">
+              <a:schemeClr val="accent1"/>
+            </a:effectRef>
+            <a:fontRef idx="minor">
+              <a:schemeClr val="lt1"/>
+            </a:fontRef>
+          </p:style>
+          <p:txBody>
+            <a:bodyPr rtlCol="0" anchor="ctr"/>
+            <a:lstStyle/>
+            <a:p>
+              <a:pPr algn="ctr"/>
+              <a:endParaRPr lang="fr-CA"/>
+            </a:p>
+          </p:txBody>
+        </p:sp>
+        <mc:AlternateContent xmlns:mc="http://schemas.openxmlformats.org/markup-compatibility/2006">
+          <mc:Choice xmlns:a14="http://schemas.microsoft.com/office/drawing/2010/main" Requires="a14">
+            <p:sp>
+              <p:nvSpPr>
+                <p:cNvPr id="101" name="TextBox 100">
+                  <a:extLst>
+                    <a:ext uri="{FF2B5EF4-FFF2-40B4-BE49-F238E27FC236}">
+                      <a16:creationId xmlns:a16="http://schemas.microsoft.com/office/drawing/2014/main" id="{F4711035-E854-4D4E-A7D2-24EA2C747FFD}"/>
+                    </a:ext>
+                  </a:extLst>
+                </p:cNvPr>
+                <p:cNvSpPr txBox="1"/>
+                <p:nvPr/>
+              </p:nvSpPr>
+              <p:spPr>
+                <a:xfrm>
+                  <a:off x="1581584" y="1569296"/>
+                  <a:ext cx="287963" cy="276999"/>
+                </a:xfrm>
+                <a:prstGeom prst="rect">
+                  <a:avLst/>
+                </a:prstGeom>
+                <a:noFill/>
+              </p:spPr>
+              <p:txBody>
+                <a:bodyPr wrap="none" lIns="0" tIns="0" rIns="0" bIns="0" rtlCol="0">
+                  <a:spAutoFit/>
+                </a:bodyPr>
+                <a:lstStyle/>
+                <a:p>
+                  <a14:m>
+                    <m:oMathPara xmlns:m="http://schemas.openxmlformats.org/officeDocument/2006/math">
+                      <m:oMathParaPr>
+                        <m:jc m:val="centerGroup"/>
+                      </m:oMathParaPr>
+                      <m:oMath xmlns:m="http://schemas.openxmlformats.org/officeDocument/2006/math">
+                        <m:sSub>
+                          <m:sSubPr>
+                            <m:ctrlPr>
+                              <a:rPr lang="en-US" b="0" i="1" smtClean="0">
+                                <a:latin typeface="Cambria Math" panose="02040503050406030204" pitchFamily="18" charset="0"/>
+                              </a:rPr>
+                            </m:ctrlPr>
+                          </m:sSubPr>
+                          <m:e>
+                            <m:r>
+                              <a:rPr lang="en-US" b="0" i="1" smtClean="0">
+                                <a:latin typeface="Cambria Math" panose="02040503050406030204" pitchFamily="18" charset="0"/>
+                              </a:rPr>
+                              <m:t>𝑂</m:t>
+                            </m:r>
+                          </m:e>
+                          <m:sub>
+                            <m:r>
+                              <a:rPr lang="en-US" b="0" i="1" smtClean="0">
+                                <a:latin typeface="Cambria Math" panose="02040503050406030204" pitchFamily="18" charset="0"/>
+                              </a:rPr>
+                              <m:t>𝑐</m:t>
+                            </m:r>
+                          </m:sub>
+                        </m:sSub>
+                      </m:oMath>
+                    </m:oMathPara>
+                  </a14:m>
+                  <a:endParaRPr lang="fr-CA" dirty="0"/>
+                </a:p>
+              </p:txBody>
+            </p:sp>
+          </mc:Choice>
+          <mc:Fallback>
+            <p:sp>
+              <p:nvSpPr>
+                <p:cNvPr id="101" name="TextBox 100">
+                  <a:extLst>
+                    <a:ext uri="{FF2B5EF4-FFF2-40B4-BE49-F238E27FC236}">
+                      <a16:creationId xmlns:a16="http://schemas.microsoft.com/office/drawing/2014/main" id="{F4711035-E854-4D4E-A7D2-24EA2C747FFD}"/>
+                    </a:ext>
+                  </a:extLst>
+                </p:cNvPr>
+                <p:cNvSpPr txBox="1">
+                  <a:spLocks noRot="1" noChangeAspect="1" noMove="1" noResize="1" noEditPoints="1" noAdjustHandles="1" noChangeArrowheads="1" noChangeShapeType="1" noTextEdit="1"/>
+                </p:cNvSpPr>
+                <p:nvPr/>
+              </p:nvSpPr>
+              <p:spPr>
+                <a:xfrm>
+                  <a:off x="1581584" y="1569296"/>
+                  <a:ext cx="287963" cy="276999"/>
+                </a:xfrm>
+                <a:prstGeom prst="rect">
+                  <a:avLst/>
+                </a:prstGeom>
+                <a:blipFill>
+                  <a:blip r:embed="rId13"/>
+                  <a:stretch>
+                    <a:fillRect l="-18750" r="-2083" b="-10870"/>
+                  </a:stretch>
+                </a:blipFill>
+              </p:spPr>
+              <p:txBody>
+                <a:bodyPr/>
+                <a:lstStyle/>
+                <a:p>
+                  <a:r>
+                    <a:rPr lang="fr-CA">
+                      <a:noFill/>
+                    </a:rPr>
+                    <a:t> </a:t>
+                  </a:r>
+                </a:p>
+              </p:txBody>
+            </p:sp>
+          </mc:Fallback>
+        </mc:AlternateContent>
+        <mc:AlternateContent xmlns:mc="http://schemas.openxmlformats.org/markup-compatibility/2006">
+          <mc:Choice xmlns:a14="http://schemas.microsoft.com/office/drawing/2010/main" Requires="a14">
+            <p:sp>
+              <p:nvSpPr>
+                <p:cNvPr id="104" name="TextBox 103">
+                  <a:extLst>
+                    <a:ext uri="{FF2B5EF4-FFF2-40B4-BE49-F238E27FC236}">
+                      <a16:creationId xmlns:a16="http://schemas.microsoft.com/office/drawing/2014/main" id="{AE65737E-BCE8-4216-B6CE-7D4FD1B08972}"/>
+                    </a:ext>
+                  </a:extLst>
+                </p:cNvPr>
+                <p:cNvSpPr txBox="1"/>
+                <p:nvPr/>
+              </p:nvSpPr>
+              <p:spPr>
+                <a:xfrm>
+                  <a:off x="6236866" y="1800994"/>
+                  <a:ext cx="264303" cy="215444"/>
+                </a:xfrm>
+                <a:prstGeom prst="rect">
+                  <a:avLst/>
+                </a:prstGeom>
+                <a:noFill/>
+              </p:spPr>
+              <p:txBody>
+                <a:bodyPr wrap="none" lIns="0" tIns="0" rIns="0" bIns="0" rtlCol="0">
+                  <a:spAutoFit/>
+                </a:bodyPr>
+                <a:lstStyle/>
+                <a:p>
+                  <a14:m>
+                    <m:oMathPara xmlns:m="http://schemas.openxmlformats.org/officeDocument/2006/math">
+                      <m:oMathParaPr>
+                        <m:jc m:val="centerGroup"/>
+                      </m:oMathParaPr>
+                      <m:oMath xmlns:m="http://schemas.openxmlformats.org/officeDocument/2006/math">
+                        <m:sSub>
+                          <m:sSubPr>
+                            <m:ctrlPr>
+                              <a:rPr lang="en-US" sz="1400" b="0" i="1" smtClean="0">
+                                <a:latin typeface="Cambria Math" panose="02040503050406030204" pitchFamily="18" charset="0"/>
+                              </a:rPr>
+                            </m:ctrlPr>
+                          </m:sSubPr>
+                          <m:e>
+                            <m:r>
+                              <a:rPr lang="en-US" sz="1400" b="0" i="1" smtClean="0">
+                                <a:latin typeface="Cambria Math" panose="02040503050406030204" pitchFamily="18" charset="0"/>
+                              </a:rPr>
+                              <m:t>𝑂</m:t>
+                            </m:r>
+                          </m:e>
+                          <m:sub>
+                            <m:r>
+                              <a:rPr lang="en-US" sz="1400" b="0" i="1" smtClean="0">
+                                <a:latin typeface="Cambria Math" panose="02040503050406030204" pitchFamily="18" charset="0"/>
+                              </a:rPr>
+                              <m:t>𝑤</m:t>
+                            </m:r>
+                          </m:sub>
+                        </m:sSub>
+                      </m:oMath>
+                    </m:oMathPara>
+                  </a14:m>
+                  <a:endParaRPr lang="fr-CA" dirty="0"/>
+                </a:p>
+              </p:txBody>
+            </p:sp>
+          </mc:Choice>
+          <mc:Fallback>
+            <p:sp>
+              <p:nvSpPr>
+                <p:cNvPr id="104" name="TextBox 103">
+                  <a:extLst>
+                    <a:ext uri="{FF2B5EF4-FFF2-40B4-BE49-F238E27FC236}">
+                      <a16:creationId xmlns:a16="http://schemas.microsoft.com/office/drawing/2014/main" id="{AE65737E-BCE8-4216-B6CE-7D4FD1B08972}"/>
+                    </a:ext>
+                  </a:extLst>
+                </p:cNvPr>
+                <p:cNvSpPr txBox="1">
+                  <a:spLocks noRot="1" noChangeAspect="1" noMove="1" noResize="1" noEditPoints="1" noAdjustHandles="1" noChangeArrowheads="1" noChangeShapeType="1" noTextEdit="1"/>
+                </p:cNvSpPr>
+                <p:nvPr/>
+              </p:nvSpPr>
+              <p:spPr>
+                <a:xfrm>
+                  <a:off x="6236866" y="1800994"/>
+                  <a:ext cx="264303" cy="215444"/>
+                </a:xfrm>
+                <a:prstGeom prst="rect">
+                  <a:avLst/>
+                </a:prstGeom>
+                <a:blipFill>
+                  <a:blip r:embed="rId14"/>
+                  <a:stretch>
+                    <a:fillRect l="-16279" b="-8333"/>
+                  </a:stretch>
+                </a:blipFill>
+              </p:spPr>
+              <p:txBody>
+                <a:bodyPr/>
+                <a:lstStyle/>
+                <a:p>
+                  <a:r>
+                    <a:rPr lang="fr-CA">
+                      <a:noFill/>
+                    </a:rPr>
+                    <a:t> </a:t>
+                  </a:r>
+                </a:p>
+              </p:txBody>
+            </p:sp>
+          </mc:Fallback>
+        </mc:AlternateContent>
+        <p:cxnSp>
+          <p:nvCxnSpPr>
+            <p:cNvPr id="105" name="Straight Arrow Connector 104">
+              <a:extLst>
+                <a:ext uri="{FF2B5EF4-FFF2-40B4-BE49-F238E27FC236}">
+                  <a16:creationId xmlns:a16="http://schemas.microsoft.com/office/drawing/2014/main" id="{C6BAFB56-0F0B-4E62-9863-E80F18DC58DD}"/>
+                </a:ext>
+              </a:extLst>
+            </p:cNvPr>
+            <p:cNvCxnSpPr>
+              <a:cxnSpLocks/>
+            </p:cNvCxnSpPr>
+            <p:nvPr/>
+          </p:nvCxnSpPr>
+          <p:spPr>
+            <a:xfrm flipV="1">
+              <a:off x="1736836" y="1703870"/>
+              <a:ext cx="972808" cy="162124"/>
+            </a:xfrm>
+            <a:prstGeom prst="straightConnector1">
+              <a:avLst/>
+            </a:prstGeom>
+            <a:ln w="28575">
+              <a:solidFill>
+                <a:srgbClr val="FFC000"/>
+              </a:solidFill>
+              <a:tailEnd type="triangle"/>
+            </a:ln>
+          </p:spPr>
+          <p:style>
+            <a:lnRef idx="1">
+              <a:schemeClr val="accent1"/>
+            </a:lnRef>
+            <a:fillRef idx="0">
+              <a:schemeClr val="accent1"/>
+            </a:fillRef>
+            <a:effectRef idx="0">
+              <a:schemeClr val="accent1"/>
+            </a:effectRef>
+            <a:fontRef idx="minor">
+              <a:schemeClr val="tx1"/>
+            </a:fontRef>
+          </p:style>
+        </p:cxnSp>
+        <mc:AlternateContent xmlns:mc="http://schemas.openxmlformats.org/markup-compatibility/2006">
+          <mc:Choice xmlns:a14="http://schemas.microsoft.com/office/drawing/2010/main" Requires="a14">
+            <p:sp>
+              <p:nvSpPr>
+                <p:cNvPr id="108" name="TextBox 107">
+                  <a:extLst>
+                    <a:ext uri="{FF2B5EF4-FFF2-40B4-BE49-F238E27FC236}">
+                      <a16:creationId xmlns:a16="http://schemas.microsoft.com/office/drawing/2014/main" id="{2745F569-0992-4FA0-8B73-EB97D0932539}"/>
+                    </a:ext>
+                  </a:extLst>
+                </p:cNvPr>
+                <p:cNvSpPr txBox="1"/>
+                <p:nvPr/>
+              </p:nvSpPr>
+              <p:spPr>
+                <a:xfrm>
+                  <a:off x="2242057" y="1497768"/>
+                  <a:ext cx="191784" cy="276999"/>
+                </a:xfrm>
+                <a:prstGeom prst="rect">
+                  <a:avLst/>
+                </a:prstGeom>
+                <a:noFill/>
+              </p:spPr>
+              <p:txBody>
+                <a:bodyPr wrap="none" lIns="0" tIns="0" rIns="0" bIns="0" rtlCol="0">
+                  <a:spAutoFit/>
+                </a:bodyPr>
+                <a:lstStyle/>
+                <a:p>
+                  <a14:m>
+                    <m:oMathPara xmlns:m="http://schemas.openxmlformats.org/officeDocument/2006/math">
+                      <m:oMathParaPr>
+                        <m:jc m:val="centerGroup"/>
+                      </m:oMathParaPr>
+                      <m:oMath xmlns:m="http://schemas.openxmlformats.org/officeDocument/2006/math">
+                        <m:r>
+                          <a:rPr lang="en-US" b="0" i="1" smtClean="0">
+                            <a:latin typeface="Cambria Math" panose="02040503050406030204" pitchFamily="18" charset="0"/>
+                          </a:rPr>
+                          <m:t>𝑢</m:t>
+                        </m:r>
+                      </m:oMath>
+                    </m:oMathPara>
+                  </a14:m>
+                  <a:endParaRPr lang="fr-CA" dirty="0"/>
+                </a:p>
+              </p:txBody>
+            </p:sp>
+          </mc:Choice>
+          <mc:Fallback>
+            <p:sp>
+              <p:nvSpPr>
+                <p:cNvPr id="108" name="TextBox 107">
+                  <a:extLst>
+                    <a:ext uri="{FF2B5EF4-FFF2-40B4-BE49-F238E27FC236}">
+                      <a16:creationId xmlns:a16="http://schemas.microsoft.com/office/drawing/2014/main" id="{2745F569-0992-4FA0-8B73-EB97D0932539}"/>
+                    </a:ext>
+                  </a:extLst>
+                </p:cNvPr>
+                <p:cNvSpPr txBox="1">
+                  <a:spLocks noRot="1" noChangeAspect="1" noMove="1" noResize="1" noEditPoints="1" noAdjustHandles="1" noChangeArrowheads="1" noChangeShapeType="1" noTextEdit="1"/>
+                </p:cNvSpPr>
+                <p:nvPr/>
+              </p:nvSpPr>
+              <p:spPr>
+                <a:xfrm>
+                  <a:off x="2242057" y="1497768"/>
+                  <a:ext cx="191784" cy="276999"/>
+                </a:xfrm>
+                <a:prstGeom prst="rect">
+                  <a:avLst/>
+                </a:prstGeom>
+                <a:blipFill>
+                  <a:blip r:embed="rId15"/>
+                  <a:stretch>
+                    <a:fillRect l="-19355" r="-16129"/>
+                  </a:stretch>
+                </a:blipFill>
+              </p:spPr>
+              <p:txBody>
+                <a:bodyPr/>
+                <a:lstStyle/>
+                <a:p>
+                  <a:r>
+                    <a:rPr lang="fr-CA">
+                      <a:noFill/>
+                    </a:rPr>
+                    <a:t> </a:t>
+                  </a:r>
+                </a:p>
+              </p:txBody>
+            </p:sp>
+          </mc:Fallback>
+        </mc:AlternateContent>
+        <p:cxnSp>
+          <p:nvCxnSpPr>
+            <p:cNvPr id="5" name="Straight Arrow Connector 4">
+              <a:extLst>
+                <a:ext uri="{FF2B5EF4-FFF2-40B4-BE49-F238E27FC236}">
+                  <a16:creationId xmlns:a16="http://schemas.microsoft.com/office/drawing/2014/main" id="{7FCA2177-4928-4636-9DA7-29C011C8BFE2}"/>
+                </a:ext>
+              </a:extLst>
+            </p:cNvPr>
+            <p:cNvCxnSpPr>
+              <a:cxnSpLocks/>
+            </p:cNvCxnSpPr>
+            <p:nvPr/>
+          </p:nvCxnSpPr>
+          <p:spPr>
+            <a:xfrm>
+              <a:off x="1732257" y="1880018"/>
+              <a:ext cx="977387" cy="0"/>
+            </a:xfrm>
+            <a:prstGeom prst="straightConnector1">
+              <a:avLst/>
+            </a:prstGeom>
+            <a:ln w="28575">
+              <a:solidFill>
+                <a:schemeClr val="accent1">
+                  <a:lumMod val="75000"/>
+                </a:schemeClr>
+              </a:solidFill>
+              <a:tailEnd type="triangle"/>
+            </a:ln>
+          </p:spPr>
+          <p:style>
+            <a:lnRef idx="1">
+              <a:schemeClr val="accent1"/>
+            </a:lnRef>
+            <a:fillRef idx="0">
+              <a:schemeClr val="accent1"/>
+            </a:fillRef>
+            <a:effectRef idx="0">
+              <a:schemeClr val="accent1"/>
+            </a:effectRef>
+            <a:fontRef idx="minor">
+              <a:schemeClr val="tx1"/>
+            </a:fontRef>
+          </p:style>
+        </p:cxnSp>
+        <p:cxnSp>
+          <p:nvCxnSpPr>
+            <p:cNvPr id="7" name="Straight Arrow Connector 6">
+              <a:extLst>
+                <a:ext uri="{FF2B5EF4-FFF2-40B4-BE49-F238E27FC236}">
+                  <a16:creationId xmlns:a16="http://schemas.microsoft.com/office/drawing/2014/main" id="{41F26948-D952-4F77-BC34-ED52341E229B}"/>
+                </a:ext>
+              </a:extLst>
+            </p:cNvPr>
+            <p:cNvCxnSpPr>
+              <a:cxnSpLocks/>
+            </p:cNvCxnSpPr>
+            <p:nvPr/>
+          </p:nvCxnSpPr>
+          <p:spPr>
+            <a:xfrm>
+              <a:off x="1732256" y="1875575"/>
+              <a:ext cx="608272" cy="473343"/>
+            </a:xfrm>
+            <a:prstGeom prst="straightConnector1">
+              <a:avLst/>
+            </a:prstGeom>
+            <a:ln w="28575">
+              <a:solidFill>
+                <a:srgbClr val="FF0000"/>
+              </a:solidFill>
+              <a:tailEnd type="triangle"/>
+            </a:ln>
+          </p:spPr>
+          <p:style>
+            <a:lnRef idx="1">
+              <a:schemeClr val="accent1"/>
+            </a:lnRef>
+            <a:fillRef idx="0">
+              <a:schemeClr val="accent1"/>
+            </a:fillRef>
+            <a:effectRef idx="0">
+              <a:schemeClr val="accent1"/>
+            </a:effectRef>
+            <a:fontRef idx="minor">
+              <a:schemeClr val="tx1"/>
+            </a:fontRef>
+          </p:style>
+        </p:cxnSp>
+      </p:grpSp>
+    </p:spTree>
+    <p:extLst>
+      <p:ext uri="{BB962C8B-B14F-4D97-AF65-F5344CB8AC3E}">
+        <p14:creationId xmlns:p14="http://schemas.microsoft.com/office/powerpoint/2010/main" val="818361562"/>
+      </p:ext>
+    </p:extLst>
+  </p:cSld>
+  <p:clrMapOvr>
+    <a:masterClrMapping/>
+  </p:clrMapOvr>
+</p:sld>
+</file>
+
+<file path=ppt/slides/slide8.xml><?xml version="1.0" encoding="utf-8"?>
 <p:sld xmlns:a="http://schemas.openxmlformats.org/drawingml/2006/main" xmlns:r="http://schemas.openxmlformats.org/officeDocument/2006/relationships" xmlns:p="http://schemas.openxmlformats.org/presentationml/2006/main">
   <p:cSld>
     <p:spTree>
@@ -6564,6 +10897,11 @@
             <a:prstGeom prst="rect">
               <a:avLst/>
             </a:prstGeom>
+            <a:solidFill>
+              <a:srgbClr val="FF0000">
+                <a:alpha val="15000"/>
+              </a:srgbClr>
+            </a:solidFill>
           </p:spPr>
         </p:pic>
         <p:sp>
@@ -6738,7 +11076,7 @@
 </p:sld>
 </file>
 
-<file path=ppt/slides/slide6.xml><?xml version="1.0" encoding="utf-8"?>
+<file path=ppt/slides/slide9.xml><?xml version="1.0" encoding="utf-8"?>
 <p:sld xmlns:a="http://schemas.openxmlformats.org/drawingml/2006/main" xmlns:r="http://schemas.openxmlformats.org/officeDocument/2006/relationships" xmlns:p="http://schemas.openxmlformats.org/presentationml/2006/main">
   <p:cSld>
     <p:spTree>

</xml_diff>